<commit_message>
Updating the Final Slide of the presentation and adding a PDF
</commit_message>
<xml_diff>
--- a/presentations/Intel-Strategy-and-Dev-Program-for-IIoT.pptx
+++ b/presentations/Intel-Strategy-and-Dev-Program-for-IIoT.pptx
@@ -17022,7 +17022,7 @@
           <p:cNvPr id="2" name="Title 1">
             <a:extLst>
               <a:ext uri="{FF2B5EF4-FFF2-40B4-BE49-F238E27FC236}">
-                <a16:creationId xmlns:a16="http://schemas.microsoft.com/office/drawing/2014/main" xmlns="" id="{E4C28C6B-778E-EC49-A80B-7413D44B7BAF}"/>
+                <a16:creationId xmlns="" xmlns:a16="http://schemas.microsoft.com/office/drawing/2014/main" id="{E4C28C6B-778E-EC49-A80B-7413D44B7BAF}"/>
               </a:ext>
             </a:extLst>
           </p:cNvPr>
@@ -17055,7 +17055,7 @@
           <p:cNvPr id="5" name="Slide Number Placeholder 4">
             <a:extLst>
               <a:ext uri="{FF2B5EF4-FFF2-40B4-BE49-F238E27FC236}">
-                <a16:creationId xmlns:a16="http://schemas.microsoft.com/office/drawing/2014/main" xmlns="" id="{731A5867-21D5-7047-81DA-28F21F1EF8F1}"/>
+                <a16:creationId xmlns="" xmlns:a16="http://schemas.microsoft.com/office/drawing/2014/main" id="{731A5867-21D5-7047-81DA-28F21F1EF8F1}"/>
               </a:ext>
             </a:extLst>
           </p:cNvPr>
@@ -17122,7 +17122,7 @@
           <p:cNvPr id="32" name="Group 31">
             <a:extLst>
               <a:ext uri="{FF2B5EF4-FFF2-40B4-BE49-F238E27FC236}">
-                <a16:creationId xmlns:a16="http://schemas.microsoft.com/office/drawing/2014/main" xmlns="" id="{0C1ADFB6-10A1-4EFC-97AC-2B63DDD07356}"/>
+                <a16:creationId xmlns="" xmlns:a16="http://schemas.microsoft.com/office/drawing/2014/main" id="{0C1ADFB6-10A1-4EFC-97AC-2B63DDD07356}"/>
               </a:ext>
             </a:extLst>
           </p:cNvPr>
@@ -17227,7 +17227,7 @@
             <p:cNvPr id="3" name="Rectangle 2">
               <a:extLst>
                 <a:ext uri="{FF2B5EF4-FFF2-40B4-BE49-F238E27FC236}">
-                  <a16:creationId xmlns:a16="http://schemas.microsoft.com/office/drawing/2014/main" xmlns="" id="{E2B5B2E2-4BA4-4BA7-A6D1-AEE5CC8E4DEF}"/>
+                  <a16:creationId xmlns="" xmlns:a16="http://schemas.microsoft.com/office/drawing/2014/main" id="{E2B5B2E2-4BA4-4BA7-A6D1-AEE5CC8E4DEF}"/>
                 </a:ext>
               </a:extLst>
             </p:cNvPr>
@@ -17276,7 +17276,7 @@
           <p:cNvPr id="33" name="Group 32">
             <a:extLst>
               <a:ext uri="{FF2B5EF4-FFF2-40B4-BE49-F238E27FC236}">
-                <a16:creationId xmlns:a16="http://schemas.microsoft.com/office/drawing/2014/main" xmlns="" id="{6A1CD87A-E9AE-4A01-B360-1F9BC6481B16}"/>
+                <a16:creationId xmlns="" xmlns:a16="http://schemas.microsoft.com/office/drawing/2014/main" id="{6A1CD87A-E9AE-4A01-B360-1F9BC6481B16}"/>
               </a:ext>
             </a:extLst>
           </p:cNvPr>
@@ -17330,7 +17330,7 @@
             <p:cNvPr id="18" name="Picture 17">
               <a:extLst>
                 <a:ext uri="{FF2B5EF4-FFF2-40B4-BE49-F238E27FC236}">
-                  <a16:creationId xmlns:a16="http://schemas.microsoft.com/office/drawing/2014/main" xmlns="" id="{65849AD0-D6DA-5444-AB0D-539B8B0B9021}"/>
+                  <a16:creationId xmlns="" xmlns:a16="http://schemas.microsoft.com/office/drawing/2014/main" id="{65849AD0-D6DA-5444-AB0D-539B8B0B9021}"/>
                 </a:ext>
               </a:extLst>
             </p:cNvPr>
@@ -17393,7 +17393,7 @@
             <p:cNvPr id="4" name="Rectangle 3">
               <a:extLst>
                 <a:ext uri="{FF2B5EF4-FFF2-40B4-BE49-F238E27FC236}">
-                  <a16:creationId xmlns:a16="http://schemas.microsoft.com/office/drawing/2014/main" xmlns="" id="{BA23FE24-9C6B-40DD-B22B-7E87069340A0}"/>
+                  <a16:creationId xmlns="" xmlns:a16="http://schemas.microsoft.com/office/drawing/2014/main" id="{BA23FE24-9C6B-40DD-B22B-7E87069340A0}"/>
                 </a:ext>
               </a:extLst>
             </p:cNvPr>
@@ -17433,7 +17433,7 @@
           <p:cNvPr id="34" name="Group 33">
             <a:extLst>
               <a:ext uri="{FF2B5EF4-FFF2-40B4-BE49-F238E27FC236}">
-                <a16:creationId xmlns:a16="http://schemas.microsoft.com/office/drawing/2014/main" xmlns="" id="{56D98D5C-2EA7-44D8-84A3-2BEAD1D5199F}"/>
+                <a16:creationId xmlns="" xmlns:a16="http://schemas.microsoft.com/office/drawing/2014/main" id="{56D98D5C-2EA7-44D8-84A3-2BEAD1D5199F}"/>
               </a:ext>
             </a:extLst>
           </p:cNvPr>
@@ -17535,7 +17535,7 @@
             <p:cNvPr id="6" name="Rectangle 5">
               <a:extLst>
                 <a:ext uri="{FF2B5EF4-FFF2-40B4-BE49-F238E27FC236}">
-                  <a16:creationId xmlns:a16="http://schemas.microsoft.com/office/drawing/2014/main" xmlns="" id="{C9E68FB0-9191-4C59-95BD-26E1DB963CEC}"/>
+                  <a16:creationId xmlns="" xmlns:a16="http://schemas.microsoft.com/office/drawing/2014/main" id="{C9E68FB0-9191-4C59-95BD-26E1DB963CEC}"/>
                 </a:ext>
               </a:extLst>
             </p:cNvPr>
@@ -17586,7 +17586,7 @@
           <p:cNvPr id="35" name="Group 34">
             <a:extLst>
               <a:ext uri="{FF2B5EF4-FFF2-40B4-BE49-F238E27FC236}">
-                <a16:creationId xmlns:a16="http://schemas.microsoft.com/office/drawing/2014/main" xmlns="" id="{17A00012-937C-460B-B1B4-CF3606A12F8C}"/>
+                <a16:creationId xmlns="" xmlns:a16="http://schemas.microsoft.com/office/drawing/2014/main" id="{17A00012-937C-460B-B1B4-CF3606A12F8C}"/>
               </a:ext>
             </a:extLst>
           </p:cNvPr>
@@ -17697,7 +17697,7 @@
             <p:cNvPr id="8" name="Rectangle 7">
               <a:extLst>
                 <a:ext uri="{FF2B5EF4-FFF2-40B4-BE49-F238E27FC236}">
-                  <a16:creationId xmlns:a16="http://schemas.microsoft.com/office/drawing/2014/main" xmlns="" id="{05D9921D-7134-41FE-9C96-8B0D6FED7C68}"/>
+                  <a16:creationId xmlns="" xmlns:a16="http://schemas.microsoft.com/office/drawing/2014/main" id="{05D9921D-7134-41FE-9C96-8B0D6FED7C68}"/>
                 </a:ext>
               </a:extLst>
             </p:cNvPr>
@@ -18014,6 +18014,38 @@
           <a:chExt cx="0" cy="0"/>
         </a:xfrm>
       </p:grpSpPr>
+      <p:sp>
+        <p:nvSpPr>
+          <p:cNvPr id="2" name="Title 1"/>
+          <p:cNvSpPr>
+            <a:spLocks noGrp="1"/>
+          </p:cNvSpPr>
+          <p:nvPr>
+            <p:ph type="title" idx="4294967295"/>
+          </p:nvPr>
+        </p:nvSpPr>
+        <p:spPr>
+          <a:xfrm>
+            <a:off x="0" y="7143912"/>
+            <a:ext cx="11248101" cy="652486"/>
+          </a:xfrm>
+        </p:spPr>
+        <p:txBody>
+          <a:bodyPr/>
+          <a:lstStyle/>
+          <a:p>
+            <a:r>
+              <a:rPr lang="en-US" dirty="0" smtClean="0"/>
+              <a:t>Intel Final</a:t>
+            </a:r>
+            <a:r>
+              <a:rPr lang="en-US" baseline="0" dirty="0" smtClean="0"/>
+              <a:t> Slide</a:t>
+            </a:r>
+            <a:endParaRPr lang="en-US" dirty="0"/>
+          </a:p>
+        </p:txBody>
+      </p:sp>
     </p:spTree>
     <p:extLst>
       <p:ext uri="{BB962C8B-B14F-4D97-AF65-F5344CB8AC3E}">
@@ -18036,6 +18068,13 @@
       </p:transition>
     </mc:Fallback>
   </mc:AlternateContent>
+  <p:timing>
+    <p:tnLst>
+      <p:par>
+        <p:cTn id="1" dur="indefinite" restart="never" nodeType="tmRoot"/>
+      </p:par>
+    </p:tnLst>
+  </p:timing>
 </p:sld>
 </file>
 
@@ -18168,7 +18207,7 @@
           <p:cNvPr id="6" name="Slide Number Placeholder 4">
             <a:extLst>
               <a:ext uri="{FF2B5EF4-FFF2-40B4-BE49-F238E27FC236}">
-                <a16:creationId xmlns:a16="http://schemas.microsoft.com/office/drawing/2014/main" xmlns="" id="{A2CC5965-A810-4428-AF69-DDA19DFEF8BC}"/>
+                <a16:creationId xmlns="" xmlns:a16="http://schemas.microsoft.com/office/drawing/2014/main" id="{A2CC5965-A810-4428-AF69-DDA19DFEF8BC}"/>
               </a:ext>
             </a:extLst>
           </p:cNvPr>
@@ -18365,7 +18404,7 @@
           <p:cNvPr id="2" name="Title 1">
             <a:extLst>
               <a:ext uri="{FF2B5EF4-FFF2-40B4-BE49-F238E27FC236}">
-                <a16:creationId xmlns:a16="http://schemas.microsoft.com/office/drawing/2014/main" xmlns="" id="{FACF73CC-5842-B444-AA52-F8B2859561F6}"/>
+                <a16:creationId xmlns="" xmlns:a16="http://schemas.microsoft.com/office/drawing/2014/main" id="{FACF73CC-5842-B444-AA52-F8B2859561F6}"/>
               </a:ext>
             </a:extLst>
           </p:cNvPr>
@@ -18393,7 +18432,7 @@
           <p:cNvPr id="5" name="Slide Number Placeholder 4">
             <a:extLst>
               <a:ext uri="{FF2B5EF4-FFF2-40B4-BE49-F238E27FC236}">
-                <a16:creationId xmlns:a16="http://schemas.microsoft.com/office/drawing/2014/main" xmlns="" id="{4A9B822A-75E2-EE41-ACC5-79CAF32923C3}"/>
+                <a16:creationId xmlns="" xmlns:a16="http://schemas.microsoft.com/office/drawing/2014/main" id="{4A9B822A-75E2-EE41-ACC5-79CAF32923C3}"/>
               </a:ext>
             </a:extLst>
           </p:cNvPr>
@@ -18438,7 +18477,7 @@
           <p:cNvPr id="4" name="Arrow: Circular 3">
             <a:extLst>
               <a:ext uri="{FF2B5EF4-FFF2-40B4-BE49-F238E27FC236}">
-                <a16:creationId xmlns:a16="http://schemas.microsoft.com/office/drawing/2014/main" xmlns="" id="{EF1EFB53-1824-4F68-A0A2-4071EC20A426}"/>
+                <a16:creationId xmlns="" xmlns:a16="http://schemas.microsoft.com/office/drawing/2014/main" id="{EF1EFB53-1824-4F68-A0A2-4071EC20A426}"/>
               </a:ext>
             </a:extLst>
           </p:cNvPr>
@@ -18514,7 +18553,7 @@
           <p:cNvPr id="10" name="Arrow: Circular 9">
             <a:extLst>
               <a:ext uri="{FF2B5EF4-FFF2-40B4-BE49-F238E27FC236}">
-                <a16:creationId xmlns:a16="http://schemas.microsoft.com/office/drawing/2014/main" xmlns="" id="{799F586B-B4A1-45AA-99FA-C9342D2CA027}"/>
+                <a16:creationId xmlns="" xmlns:a16="http://schemas.microsoft.com/office/drawing/2014/main" id="{799F586B-B4A1-45AA-99FA-C9342D2CA027}"/>
               </a:ext>
             </a:extLst>
           </p:cNvPr>
@@ -18587,7 +18626,7 @@
           <p:cNvPr id="3" name="Group 2">
             <a:extLst>
               <a:ext uri="{FF2B5EF4-FFF2-40B4-BE49-F238E27FC236}">
-                <a16:creationId xmlns:a16="http://schemas.microsoft.com/office/drawing/2014/main" xmlns="" id="{2CA20B68-F42B-4E72-920D-4E780C3AEFCE}"/>
+                <a16:creationId xmlns="" xmlns:a16="http://schemas.microsoft.com/office/drawing/2014/main" id="{2CA20B68-F42B-4E72-920D-4E780C3AEFCE}"/>
               </a:ext>
             </a:extLst>
           </p:cNvPr>
@@ -18607,7 +18646,7 @@
             <p:cNvPr id="28" name="Oval 27">
               <a:extLst>
                 <a:ext uri="{FF2B5EF4-FFF2-40B4-BE49-F238E27FC236}">
-                  <a16:creationId xmlns:a16="http://schemas.microsoft.com/office/drawing/2014/main" xmlns="" id="{A545E8B5-DAAB-47F1-9F73-2F2E22116C43}"/>
+                  <a16:creationId xmlns="" xmlns:a16="http://schemas.microsoft.com/office/drawing/2014/main" id="{A545E8B5-DAAB-47F1-9F73-2F2E22116C43}"/>
                 </a:ext>
               </a:extLst>
             </p:cNvPr>
@@ -18661,7 +18700,7 @@
             <p:cNvPr id="31" name="TextBox 30">
               <a:extLst>
                 <a:ext uri="{FF2B5EF4-FFF2-40B4-BE49-F238E27FC236}">
-                  <a16:creationId xmlns:a16="http://schemas.microsoft.com/office/drawing/2014/main" xmlns="" id="{D0795A7D-58B0-498B-B9A1-B356623AC5AB}"/>
+                  <a16:creationId xmlns="" xmlns:a16="http://schemas.microsoft.com/office/drawing/2014/main" id="{D0795A7D-58B0-498B-B9A1-B356623AC5AB}"/>
                 </a:ext>
               </a:extLst>
             </p:cNvPr>
@@ -18717,7 +18756,7 @@
           <p:cNvPr id="6" name="Group 5">
             <a:extLst>
               <a:ext uri="{FF2B5EF4-FFF2-40B4-BE49-F238E27FC236}">
-                <a16:creationId xmlns:a16="http://schemas.microsoft.com/office/drawing/2014/main" xmlns="" id="{0E33E798-E2B8-4C48-9680-D4FC46417087}"/>
+                <a16:creationId xmlns="" xmlns:a16="http://schemas.microsoft.com/office/drawing/2014/main" id="{0E33E798-E2B8-4C48-9680-D4FC46417087}"/>
               </a:ext>
             </a:extLst>
           </p:cNvPr>
@@ -18737,7 +18776,7 @@
             <p:cNvPr id="23" name="Oval 22">
               <a:extLst>
                 <a:ext uri="{FF2B5EF4-FFF2-40B4-BE49-F238E27FC236}">
-                  <a16:creationId xmlns:a16="http://schemas.microsoft.com/office/drawing/2014/main" xmlns="" id="{1BEE176C-3D1C-4829-A579-F432414F9AEB}"/>
+                  <a16:creationId xmlns="" xmlns:a16="http://schemas.microsoft.com/office/drawing/2014/main" id="{1BEE176C-3D1C-4829-A579-F432414F9AEB}"/>
                 </a:ext>
               </a:extLst>
             </p:cNvPr>
@@ -18791,7 +18830,7 @@
             <p:cNvPr id="32" name="TextBox 31">
               <a:extLst>
                 <a:ext uri="{FF2B5EF4-FFF2-40B4-BE49-F238E27FC236}">
-                  <a16:creationId xmlns:a16="http://schemas.microsoft.com/office/drawing/2014/main" xmlns="" id="{3038B85C-D2C8-473C-9328-AA625BC93DEB}"/>
+                  <a16:creationId xmlns="" xmlns:a16="http://schemas.microsoft.com/office/drawing/2014/main" id="{3038B85C-D2C8-473C-9328-AA625BC93DEB}"/>
                 </a:ext>
               </a:extLst>
             </p:cNvPr>
@@ -18832,7 +18871,7 @@
           <p:cNvPr id="35" name="TextBox 34">
             <a:extLst>
               <a:ext uri="{FF2B5EF4-FFF2-40B4-BE49-F238E27FC236}">
-                <a16:creationId xmlns:a16="http://schemas.microsoft.com/office/drawing/2014/main" xmlns="" id="{37362E30-01EF-46F0-88B0-051F1BCFDE28}"/>
+                <a16:creationId xmlns="" xmlns:a16="http://schemas.microsoft.com/office/drawing/2014/main" id="{37362E30-01EF-46F0-88B0-051F1BCFDE28}"/>
               </a:ext>
             </a:extLst>
           </p:cNvPr>
@@ -18879,7 +18918,7 @@
           <p:cNvPr id="47" name="TextBox 46">
             <a:extLst>
               <a:ext uri="{FF2B5EF4-FFF2-40B4-BE49-F238E27FC236}">
-                <a16:creationId xmlns:a16="http://schemas.microsoft.com/office/drawing/2014/main" xmlns="" id="{2F1F5975-B535-4B80-B36D-F35B520EDDFC}"/>
+                <a16:creationId xmlns="" xmlns:a16="http://schemas.microsoft.com/office/drawing/2014/main" id="{2F1F5975-B535-4B80-B36D-F35B520EDDFC}"/>
               </a:ext>
             </a:extLst>
           </p:cNvPr>
@@ -18972,7 +19011,7 @@
           <p:cNvPr id="37" name="Group 36">
             <a:extLst>
               <a:ext uri="{FF2B5EF4-FFF2-40B4-BE49-F238E27FC236}">
-                <a16:creationId xmlns:a16="http://schemas.microsoft.com/office/drawing/2014/main" xmlns="" id="{13487262-9949-42AE-92DC-C9EE9AE07FDD}"/>
+                <a16:creationId xmlns="" xmlns:a16="http://schemas.microsoft.com/office/drawing/2014/main" id="{13487262-9949-42AE-92DC-C9EE9AE07FDD}"/>
               </a:ext>
             </a:extLst>
           </p:cNvPr>
@@ -18992,7 +19031,7 @@
             <p:cNvPr id="48" name="Oval 47">
               <a:extLst>
                 <a:ext uri="{FF2B5EF4-FFF2-40B4-BE49-F238E27FC236}">
-                  <a16:creationId xmlns:a16="http://schemas.microsoft.com/office/drawing/2014/main" xmlns="" id="{FA5EC9D7-D680-4577-BC49-336CB60B5AC2}"/>
+                  <a16:creationId xmlns="" xmlns:a16="http://schemas.microsoft.com/office/drawing/2014/main" id="{FA5EC9D7-D680-4577-BC49-336CB60B5AC2}"/>
                 </a:ext>
               </a:extLst>
             </p:cNvPr>
@@ -19046,7 +19085,7 @@
             <p:cNvPr id="49" name="TextBox 48">
               <a:extLst>
                 <a:ext uri="{FF2B5EF4-FFF2-40B4-BE49-F238E27FC236}">
-                  <a16:creationId xmlns:a16="http://schemas.microsoft.com/office/drawing/2014/main" xmlns="" id="{992B661E-5AA1-4642-82ED-D01D5ADB614B}"/>
+                  <a16:creationId xmlns="" xmlns:a16="http://schemas.microsoft.com/office/drawing/2014/main" id="{992B661E-5AA1-4642-82ED-D01D5ADB614B}"/>
                 </a:ext>
               </a:extLst>
             </p:cNvPr>
@@ -19091,7 +19130,7 @@
           <p:cNvPr id="50" name="TextBox 49">
             <a:extLst>
               <a:ext uri="{FF2B5EF4-FFF2-40B4-BE49-F238E27FC236}">
-                <a16:creationId xmlns:a16="http://schemas.microsoft.com/office/drawing/2014/main" xmlns="" id="{966223FD-18E7-46AA-B0FE-CB33B6DF04EF}"/>
+                <a16:creationId xmlns="" xmlns:a16="http://schemas.microsoft.com/office/drawing/2014/main" id="{966223FD-18E7-46AA-B0FE-CB33B6DF04EF}"/>
               </a:ext>
             </a:extLst>
           </p:cNvPr>
@@ -19131,7 +19170,7 @@
           <p:cNvPr id="51" name="Arrow: Circular 50">
             <a:extLst>
               <a:ext uri="{FF2B5EF4-FFF2-40B4-BE49-F238E27FC236}">
-                <a16:creationId xmlns:a16="http://schemas.microsoft.com/office/drawing/2014/main" xmlns="" id="{9B4FD1A2-B37A-4EFC-9E86-FB42ED0E33E5}"/>
+                <a16:creationId xmlns="" xmlns:a16="http://schemas.microsoft.com/office/drawing/2014/main" id="{9B4FD1A2-B37A-4EFC-9E86-FB42ED0E33E5}"/>
               </a:ext>
             </a:extLst>
           </p:cNvPr>
@@ -19193,7 +19232,7 @@
           <p:cNvPr id="52" name="TextBox 51">
             <a:extLst>
               <a:ext uri="{FF2B5EF4-FFF2-40B4-BE49-F238E27FC236}">
-                <a16:creationId xmlns:a16="http://schemas.microsoft.com/office/drawing/2014/main" xmlns="" id="{A9603462-3B71-454B-8AB8-210271D7E889}"/>
+                <a16:creationId xmlns="" xmlns:a16="http://schemas.microsoft.com/office/drawing/2014/main" id="{A9603462-3B71-454B-8AB8-210271D7E889}"/>
               </a:ext>
             </a:extLst>
           </p:cNvPr>
@@ -19237,7 +19276,7 @@
           <p:cNvPr id="53" name="Arrow: Circular 52">
             <a:extLst>
               <a:ext uri="{FF2B5EF4-FFF2-40B4-BE49-F238E27FC236}">
-                <a16:creationId xmlns:a16="http://schemas.microsoft.com/office/drawing/2014/main" xmlns="" id="{F82396A3-FB72-457A-8070-CF32B3F52D05}"/>
+                <a16:creationId xmlns="" xmlns:a16="http://schemas.microsoft.com/office/drawing/2014/main" id="{F82396A3-FB72-457A-8070-CF32B3F52D05}"/>
               </a:ext>
             </a:extLst>
           </p:cNvPr>
@@ -19308,7 +19347,7 @@
           <p:cNvPr id="54" name="TextBox 53">
             <a:extLst>
               <a:ext uri="{FF2B5EF4-FFF2-40B4-BE49-F238E27FC236}">
-                <a16:creationId xmlns:a16="http://schemas.microsoft.com/office/drawing/2014/main" xmlns="" id="{BB6563D8-71C0-4375-A53A-7B92BED6F2BA}"/>
+                <a16:creationId xmlns="" xmlns:a16="http://schemas.microsoft.com/office/drawing/2014/main" id="{BB6563D8-71C0-4375-A53A-7B92BED6F2BA}"/>
               </a:ext>
             </a:extLst>
           </p:cNvPr>
@@ -19352,7 +19391,7 @@
           <p:cNvPr id="55" name="TextBox 54">
             <a:extLst>
               <a:ext uri="{FF2B5EF4-FFF2-40B4-BE49-F238E27FC236}">
-                <a16:creationId xmlns:a16="http://schemas.microsoft.com/office/drawing/2014/main" xmlns="" id="{ADF7AD79-529A-4C9B-B501-D651746AE6E5}"/>
+                <a16:creationId xmlns="" xmlns:a16="http://schemas.microsoft.com/office/drawing/2014/main" id="{ADF7AD79-529A-4C9B-B501-D651746AE6E5}"/>
               </a:ext>
             </a:extLst>
           </p:cNvPr>
@@ -19396,7 +19435,7 @@
           <p:cNvPr id="27" name="Arrow: Circular 26">
             <a:extLst>
               <a:ext uri="{FF2B5EF4-FFF2-40B4-BE49-F238E27FC236}">
-                <a16:creationId xmlns:a16="http://schemas.microsoft.com/office/drawing/2014/main" xmlns="" id="{5E4E934E-5D83-4198-AA0B-F028CD47D915}"/>
+                <a16:creationId xmlns="" xmlns:a16="http://schemas.microsoft.com/office/drawing/2014/main" id="{5E4E934E-5D83-4198-AA0B-F028CD47D915}"/>
               </a:ext>
             </a:extLst>
           </p:cNvPr>
@@ -19460,7 +19499,7 @@
           <p:cNvPr id="29" name="TextBox 28">
             <a:extLst>
               <a:ext uri="{FF2B5EF4-FFF2-40B4-BE49-F238E27FC236}">
-                <a16:creationId xmlns:a16="http://schemas.microsoft.com/office/drawing/2014/main" xmlns="" id="{FB4D8486-8A0C-4714-BCF4-81D877F6C2C8}"/>
+                <a16:creationId xmlns="" xmlns:a16="http://schemas.microsoft.com/office/drawing/2014/main" id="{FB4D8486-8A0C-4714-BCF4-81D877F6C2C8}"/>
               </a:ext>
             </a:extLst>
           </p:cNvPr>
@@ -19515,7 +19554,7 @@
           <p:cNvPr id="30" name="Arrow: Circular 29">
             <a:extLst>
               <a:ext uri="{FF2B5EF4-FFF2-40B4-BE49-F238E27FC236}">
-                <a16:creationId xmlns:a16="http://schemas.microsoft.com/office/drawing/2014/main" xmlns="" id="{07A3702E-7F1A-4B7F-8F11-2F2E609B68FD}"/>
+                <a16:creationId xmlns="" xmlns:a16="http://schemas.microsoft.com/office/drawing/2014/main" id="{07A3702E-7F1A-4B7F-8F11-2F2E609B68FD}"/>
               </a:ext>
             </a:extLst>
           </p:cNvPr>
@@ -19586,7 +19625,7 @@
           <p:cNvPr id="33" name="Arrow: Circular 32">
             <a:extLst>
               <a:ext uri="{FF2B5EF4-FFF2-40B4-BE49-F238E27FC236}">
-                <a16:creationId xmlns:a16="http://schemas.microsoft.com/office/drawing/2014/main" xmlns="" id="{308FC62C-E243-4C2C-81F0-505A22D93148}"/>
+                <a16:creationId xmlns="" xmlns:a16="http://schemas.microsoft.com/office/drawing/2014/main" id="{308FC62C-E243-4C2C-81F0-505A22D93148}"/>
               </a:ext>
             </a:extLst>
           </p:cNvPr>
@@ -19648,7 +19687,7 @@
           <p:cNvPr id="34" name="TextBox 33">
             <a:extLst>
               <a:ext uri="{FF2B5EF4-FFF2-40B4-BE49-F238E27FC236}">
-                <a16:creationId xmlns:a16="http://schemas.microsoft.com/office/drawing/2014/main" xmlns="" id="{524A4B51-05E6-4C5F-B9BD-85474FA80C1B}"/>
+                <a16:creationId xmlns="" xmlns:a16="http://schemas.microsoft.com/office/drawing/2014/main" id="{524A4B51-05E6-4C5F-B9BD-85474FA80C1B}"/>
               </a:ext>
             </a:extLst>
           </p:cNvPr>
@@ -19699,7 +19738,7 @@
           <p:cNvPr id="36" name="Arrow: Circular 35">
             <a:extLst>
               <a:ext uri="{FF2B5EF4-FFF2-40B4-BE49-F238E27FC236}">
-                <a16:creationId xmlns:a16="http://schemas.microsoft.com/office/drawing/2014/main" xmlns="" id="{541D1FF3-C7B8-4591-B875-BCDEFB24305A}"/>
+                <a16:creationId xmlns="" xmlns:a16="http://schemas.microsoft.com/office/drawing/2014/main" id="{541D1FF3-C7B8-4591-B875-BCDEFB24305A}"/>
               </a:ext>
             </a:extLst>
           </p:cNvPr>
@@ -19770,7 +19809,7 @@
           <p:cNvPr id="38" name="Arrow: Circular 37">
             <a:extLst>
               <a:ext uri="{FF2B5EF4-FFF2-40B4-BE49-F238E27FC236}">
-                <a16:creationId xmlns:a16="http://schemas.microsoft.com/office/drawing/2014/main" xmlns="" id="{5BE7C7C3-76F0-498A-9C6B-162B1E6CB4A6}"/>
+                <a16:creationId xmlns="" xmlns:a16="http://schemas.microsoft.com/office/drawing/2014/main" id="{5BE7C7C3-76F0-498A-9C6B-162B1E6CB4A6}"/>
               </a:ext>
             </a:extLst>
           </p:cNvPr>
@@ -19832,7 +19871,7 @@
           <p:cNvPr id="39" name="TextBox 38">
             <a:extLst>
               <a:ext uri="{FF2B5EF4-FFF2-40B4-BE49-F238E27FC236}">
-                <a16:creationId xmlns:a16="http://schemas.microsoft.com/office/drawing/2014/main" xmlns="" id="{C4768057-DEF0-49C9-AED9-90017A6B6E76}"/>
+                <a16:creationId xmlns="" xmlns:a16="http://schemas.microsoft.com/office/drawing/2014/main" id="{C4768057-DEF0-49C9-AED9-90017A6B6E76}"/>
               </a:ext>
             </a:extLst>
           </p:cNvPr>
@@ -19902,7 +19941,7 @@
           <p:cNvPr id="40" name="Arrow: Circular 39">
             <a:extLst>
               <a:ext uri="{FF2B5EF4-FFF2-40B4-BE49-F238E27FC236}">
-                <a16:creationId xmlns:a16="http://schemas.microsoft.com/office/drawing/2014/main" xmlns="" id="{A6D9D948-32C4-46CC-B6B5-324143737174}"/>
+                <a16:creationId xmlns="" xmlns:a16="http://schemas.microsoft.com/office/drawing/2014/main" id="{A6D9D948-32C4-46CC-B6B5-324143737174}"/>
               </a:ext>
             </a:extLst>
           </p:cNvPr>
@@ -19973,7 +20012,7 @@
           <p:cNvPr id="41" name="Arrow: Circular 40">
             <a:extLst>
               <a:ext uri="{FF2B5EF4-FFF2-40B4-BE49-F238E27FC236}">
-                <a16:creationId xmlns:a16="http://schemas.microsoft.com/office/drawing/2014/main" xmlns="" id="{B2221E3A-515C-4CD7-B7FB-AFDDC0D68579}"/>
+                <a16:creationId xmlns="" xmlns:a16="http://schemas.microsoft.com/office/drawing/2014/main" id="{B2221E3A-515C-4CD7-B7FB-AFDDC0D68579}"/>
               </a:ext>
             </a:extLst>
           </p:cNvPr>
@@ -20038,7 +20077,7 @@
           <p:cNvPr id="42" name="TextBox 41">
             <a:extLst>
               <a:ext uri="{FF2B5EF4-FFF2-40B4-BE49-F238E27FC236}">
-                <a16:creationId xmlns:a16="http://schemas.microsoft.com/office/drawing/2014/main" xmlns="" id="{729F4A50-2983-4082-9944-3CA583D608E0}"/>
+                <a16:creationId xmlns="" xmlns:a16="http://schemas.microsoft.com/office/drawing/2014/main" id="{729F4A50-2983-4082-9944-3CA583D608E0}"/>
               </a:ext>
             </a:extLst>
           </p:cNvPr>
@@ -20085,7 +20124,7 @@
           <p:cNvPr id="43" name="Arrow: Circular 42">
             <a:extLst>
               <a:ext uri="{FF2B5EF4-FFF2-40B4-BE49-F238E27FC236}">
-                <a16:creationId xmlns:a16="http://schemas.microsoft.com/office/drawing/2014/main" xmlns="" id="{09D6AB5E-C547-455C-B22D-80BAF8230E85}"/>
+                <a16:creationId xmlns="" xmlns:a16="http://schemas.microsoft.com/office/drawing/2014/main" id="{09D6AB5E-C547-455C-B22D-80BAF8230E85}"/>
               </a:ext>
             </a:extLst>
           </p:cNvPr>
@@ -20156,7 +20195,7 @@
           <p:cNvPr id="15" name="TextBox 14">
             <a:extLst>
               <a:ext uri="{FF2B5EF4-FFF2-40B4-BE49-F238E27FC236}">
-                <a16:creationId xmlns:a16="http://schemas.microsoft.com/office/drawing/2014/main" xmlns="" id="{7D14B4C4-E80E-451C-9C33-F9B5DCCCC3E1}"/>
+                <a16:creationId xmlns="" xmlns:a16="http://schemas.microsoft.com/office/drawing/2014/main" id="{7D14B4C4-E80E-451C-9C33-F9B5DCCCC3E1}"/>
               </a:ext>
             </a:extLst>
           </p:cNvPr>
@@ -20200,7 +20239,7 @@
           <p:cNvPr id="17" name="TextBox 16">
             <a:extLst>
               <a:ext uri="{FF2B5EF4-FFF2-40B4-BE49-F238E27FC236}">
-                <a16:creationId xmlns:a16="http://schemas.microsoft.com/office/drawing/2014/main" xmlns="" id="{56315337-E54F-4367-B0AB-F40316498CDD}"/>
+                <a16:creationId xmlns="" xmlns:a16="http://schemas.microsoft.com/office/drawing/2014/main" id="{56315337-E54F-4367-B0AB-F40316498CDD}"/>
               </a:ext>
             </a:extLst>
           </p:cNvPr>
@@ -20244,7 +20283,7 @@
           <p:cNvPr id="18" name="TextBox 17">
             <a:extLst>
               <a:ext uri="{FF2B5EF4-FFF2-40B4-BE49-F238E27FC236}">
-                <a16:creationId xmlns:a16="http://schemas.microsoft.com/office/drawing/2014/main" xmlns="" id="{39217B59-4AFE-47B6-96E4-C2A75B2C9B42}"/>
+                <a16:creationId xmlns="" xmlns:a16="http://schemas.microsoft.com/office/drawing/2014/main" id="{39217B59-4AFE-47B6-96E4-C2A75B2C9B42}"/>
               </a:ext>
             </a:extLst>
           </p:cNvPr>
@@ -20288,7 +20327,7 @@
           <p:cNvPr id="19" name="TextBox 18">
             <a:extLst>
               <a:ext uri="{FF2B5EF4-FFF2-40B4-BE49-F238E27FC236}">
-                <a16:creationId xmlns:a16="http://schemas.microsoft.com/office/drawing/2014/main" xmlns="" id="{06D567A4-D49C-4045-9CC6-92365672DFF6}"/>
+                <a16:creationId xmlns="" xmlns:a16="http://schemas.microsoft.com/office/drawing/2014/main" id="{06D567A4-D49C-4045-9CC6-92365672DFF6}"/>
               </a:ext>
             </a:extLst>
           </p:cNvPr>
@@ -20332,7 +20371,7 @@
           <p:cNvPr id="44" name="TextBox 43">
             <a:extLst>
               <a:ext uri="{FF2B5EF4-FFF2-40B4-BE49-F238E27FC236}">
-                <a16:creationId xmlns:a16="http://schemas.microsoft.com/office/drawing/2014/main" xmlns="" id="{0A626415-74E1-471E-9AB4-B681A325887B}"/>
+                <a16:creationId xmlns="" xmlns:a16="http://schemas.microsoft.com/office/drawing/2014/main" id="{0A626415-74E1-471E-9AB4-B681A325887B}"/>
               </a:ext>
             </a:extLst>
           </p:cNvPr>
@@ -21953,7 +21992,7 @@
           <p:cNvPr id="23" name="Picture 22">
             <a:extLst>
               <a:ext uri="{FF2B5EF4-FFF2-40B4-BE49-F238E27FC236}">
-                <a16:creationId xmlns:a16="http://schemas.microsoft.com/office/drawing/2014/main" xmlns="" id="{B9405E35-C08D-4F80-A137-036B28E78684}"/>
+                <a16:creationId xmlns="" xmlns:a16="http://schemas.microsoft.com/office/drawing/2014/main" id="{B9405E35-C08D-4F80-A137-036B28E78684}"/>
               </a:ext>
             </a:extLst>
           </p:cNvPr>
@@ -21982,7 +22021,7 @@
           <p:cNvPr id="21" name="Rectangle 20">
             <a:extLst>
               <a:ext uri="{FF2B5EF4-FFF2-40B4-BE49-F238E27FC236}">
-                <a16:creationId xmlns:a16="http://schemas.microsoft.com/office/drawing/2014/main" xmlns="" id="{CD352CD5-70E2-4791-B274-DE988574DD33}"/>
+                <a16:creationId xmlns="" xmlns:a16="http://schemas.microsoft.com/office/drawing/2014/main" id="{CD352CD5-70E2-4791-B274-DE988574DD33}"/>
               </a:ext>
             </a:extLst>
           </p:cNvPr>
@@ -22052,7 +22091,7 @@
           <p:cNvPr id="2" name="Title 1">
             <a:extLst>
               <a:ext uri="{FF2B5EF4-FFF2-40B4-BE49-F238E27FC236}">
-                <a16:creationId xmlns:a16="http://schemas.microsoft.com/office/drawing/2014/main" xmlns="" id="{1EE04D7C-934C-4C06-8A1D-628D6E71A659}"/>
+                <a16:creationId xmlns="" xmlns:a16="http://schemas.microsoft.com/office/drawing/2014/main" id="{1EE04D7C-934C-4C06-8A1D-628D6E71A659}"/>
               </a:ext>
             </a:extLst>
           </p:cNvPr>
@@ -22095,7 +22134,7 @@
           <p:cNvPr id="3" name="Group 2">
             <a:extLst>
               <a:ext uri="{FF2B5EF4-FFF2-40B4-BE49-F238E27FC236}">
-                <a16:creationId xmlns:a16="http://schemas.microsoft.com/office/drawing/2014/main" xmlns="" id="{EABB6D39-2BB3-4787-932E-3B7E9ACB3E61}"/>
+                <a16:creationId xmlns="" xmlns:a16="http://schemas.microsoft.com/office/drawing/2014/main" id="{EABB6D39-2BB3-4787-932E-3B7E9ACB3E61}"/>
               </a:ext>
             </a:extLst>
           </p:cNvPr>
@@ -22115,7 +22154,7 @@
             <p:cNvPr id="10" name="Rounded Rectangle 15">
               <a:extLst>
                 <a:ext uri="{FF2B5EF4-FFF2-40B4-BE49-F238E27FC236}">
-                  <a16:creationId xmlns:a16="http://schemas.microsoft.com/office/drawing/2014/main" xmlns="" id="{99BDB82C-2B0D-4442-8568-B80922E9A94C}"/>
+                  <a16:creationId xmlns="" xmlns:a16="http://schemas.microsoft.com/office/drawing/2014/main" id="{99BDB82C-2B0D-4442-8568-B80922E9A94C}"/>
                 </a:ext>
               </a:extLst>
             </p:cNvPr>
@@ -22206,7 +22245,7 @@
             <p:cNvPr id="11" name="TextBox 10">
               <a:extLst>
                 <a:ext uri="{FF2B5EF4-FFF2-40B4-BE49-F238E27FC236}">
-                  <a16:creationId xmlns:a16="http://schemas.microsoft.com/office/drawing/2014/main" xmlns="" id="{12DBE1DC-BADA-4A45-A951-A5C906B38737}"/>
+                  <a16:creationId xmlns="" xmlns:a16="http://schemas.microsoft.com/office/drawing/2014/main" id="{12DBE1DC-BADA-4A45-A951-A5C906B38737}"/>
                 </a:ext>
               </a:extLst>
             </p:cNvPr>
@@ -22280,7 +22319,7 @@
             <p:cNvPr id="12" name="TextBox 11">
               <a:extLst>
                 <a:ext uri="{FF2B5EF4-FFF2-40B4-BE49-F238E27FC236}">
-                  <a16:creationId xmlns:a16="http://schemas.microsoft.com/office/drawing/2014/main" xmlns="" id="{46AE31CE-48B7-4930-9AFE-291D02965DC6}"/>
+                  <a16:creationId xmlns="" xmlns:a16="http://schemas.microsoft.com/office/drawing/2014/main" id="{46AE31CE-48B7-4930-9AFE-291D02965DC6}"/>
                 </a:ext>
               </a:extLst>
             </p:cNvPr>
@@ -22339,7 +22378,7 @@
             <p:cNvPr id="13" name="TextBox 12">
               <a:extLst>
                 <a:ext uri="{FF2B5EF4-FFF2-40B4-BE49-F238E27FC236}">
-                  <a16:creationId xmlns:a16="http://schemas.microsoft.com/office/drawing/2014/main" xmlns="" id="{E66674D2-00F2-444A-AEEB-FF3FA50D87B3}"/>
+                  <a16:creationId xmlns="" xmlns:a16="http://schemas.microsoft.com/office/drawing/2014/main" id="{E66674D2-00F2-444A-AEEB-FF3FA50D87B3}"/>
                 </a:ext>
               </a:extLst>
             </p:cNvPr>
@@ -22398,7 +22437,7 @@
             <p:cNvPr id="14" name="TextBox 13">
               <a:extLst>
                 <a:ext uri="{FF2B5EF4-FFF2-40B4-BE49-F238E27FC236}">
-                  <a16:creationId xmlns:a16="http://schemas.microsoft.com/office/drawing/2014/main" xmlns="" id="{74846D46-98A5-4A1E-8078-B45021BDE10F}"/>
+                  <a16:creationId xmlns="" xmlns:a16="http://schemas.microsoft.com/office/drawing/2014/main" id="{74846D46-98A5-4A1E-8078-B45021BDE10F}"/>
                 </a:ext>
               </a:extLst>
             </p:cNvPr>
@@ -22442,7 +22481,7 @@
             <p:cNvPr id="16" name="Rectangle 15">
               <a:extLst>
                 <a:ext uri="{FF2B5EF4-FFF2-40B4-BE49-F238E27FC236}">
-                  <a16:creationId xmlns:a16="http://schemas.microsoft.com/office/drawing/2014/main" xmlns="" id="{D1620322-7C93-4FF7-805E-963D8B61C251}"/>
+                  <a16:creationId xmlns="" xmlns:a16="http://schemas.microsoft.com/office/drawing/2014/main" id="{D1620322-7C93-4FF7-805E-963D8B61C251}"/>
                 </a:ext>
               </a:extLst>
             </p:cNvPr>
@@ -22495,7 +22534,7 @@
             <p:cNvPr id="17" name="Rectangle 16">
               <a:extLst>
                 <a:ext uri="{FF2B5EF4-FFF2-40B4-BE49-F238E27FC236}">
-                  <a16:creationId xmlns:a16="http://schemas.microsoft.com/office/drawing/2014/main" xmlns="" id="{44113ECF-77DE-4858-AE0B-36687CECAB27}"/>
+                  <a16:creationId xmlns="" xmlns:a16="http://schemas.microsoft.com/office/drawing/2014/main" id="{44113ECF-77DE-4858-AE0B-36687CECAB27}"/>
                 </a:ext>
               </a:extLst>
             </p:cNvPr>
@@ -22571,7 +22610,7 @@
             <p:cNvPr id="18" name="Rectangle 17">
               <a:extLst>
                 <a:ext uri="{FF2B5EF4-FFF2-40B4-BE49-F238E27FC236}">
-                  <a16:creationId xmlns:a16="http://schemas.microsoft.com/office/drawing/2014/main" xmlns="" id="{7A9617A7-A0B3-4946-B500-3464A0050E9B}"/>
+                  <a16:creationId xmlns="" xmlns:a16="http://schemas.microsoft.com/office/drawing/2014/main" id="{7A9617A7-A0B3-4946-B500-3464A0050E9B}"/>
                 </a:ext>
               </a:extLst>
             </p:cNvPr>
@@ -22624,7 +22663,7 @@
             <p:cNvPr id="19" name="Rectangle 18">
               <a:extLst>
                 <a:ext uri="{FF2B5EF4-FFF2-40B4-BE49-F238E27FC236}">
-                  <a16:creationId xmlns:a16="http://schemas.microsoft.com/office/drawing/2014/main" xmlns="" id="{B3E5C5E1-178A-46B8-8DFE-CD5A02D73437}"/>
+                  <a16:creationId xmlns="" xmlns:a16="http://schemas.microsoft.com/office/drawing/2014/main" id="{B3E5C5E1-178A-46B8-8DFE-CD5A02D73437}"/>
                 </a:ext>
               </a:extLst>
             </p:cNvPr>
@@ -22678,7 +22717,7 @@
           <p:cNvPr id="15" name="Slide Number Placeholder 4">
             <a:extLst>
               <a:ext uri="{FF2B5EF4-FFF2-40B4-BE49-F238E27FC236}">
-                <a16:creationId xmlns:a16="http://schemas.microsoft.com/office/drawing/2014/main" xmlns="" id="{E0143BCE-5809-4339-B731-3ED1FCB5CB9A}"/>
+                <a16:creationId xmlns="" xmlns:a16="http://schemas.microsoft.com/office/drawing/2014/main" id="{E0143BCE-5809-4339-B731-3ED1FCB5CB9A}"/>
               </a:ext>
             </a:extLst>
           </p:cNvPr>
@@ -22880,7 +22919,7 @@
           <p:cNvPr id="27" name="Rounded Rectangle 50">
             <a:extLst>
               <a:ext uri="{FF2B5EF4-FFF2-40B4-BE49-F238E27FC236}">
-                <a16:creationId xmlns:a16="http://schemas.microsoft.com/office/drawing/2014/main" xmlns="" id="{E269E63E-C4AD-4DDC-A199-5D6645A42CD6}"/>
+                <a16:creationId xmlns="" xmlns:a16="http://schemas.microsoft.com/office/drawing/2014/main" id="{E269E63E-C4AD-4DDC-A199-5D6645A42CD6}"/>
               </a:ext>
             </a:extLst>
           </p:cNvPr>
@@ -22934,7 +22973,7 @@
           <p:cNvPr id="28" name="Rectangle 27">
             <a:extLst>
               <a:ext uri="{FF2B5EF4-FFF2-40B4-BE49-F238E27FC236}">
-                <a16:creationId xmlns:a16="http://schemas.microsoft.com/office/drawing/2014/main" xmlns="" id="{A7C03315-E453-441F-9D54-42C8FEC6F7EA}"/>
+                <a16:creationId xmlns="" xmlns:a16="http://schemas.microsoft.com/office/drawing/2014/main" id="{A7C03315-E453-441F-9D54-42C8FEC6F7EA}"/>
               </a:ext>
             </a:extLst>
           </p:cNvPr>
@@ -22988,7 +23027,7 @@
           <p:cNvPr id="29" name="Rounded Rectangle 50">
             <a:extLst>
               <a:ext uri="{FF2B5EF4-FFF2-40B4-BE49-F238E27FC236}">
-                <a16:creationId xmlns:a16="http://schemas.microsoft.com/office/drawing/2014/main" xmlns="" id="{7C3D6061-1748-41B4-B891-A7C3618AF9B9}"/>
+                <a16:creationId xmlns="" xmlns:a16="http://schemas.microsoft.com/office/drawing/2014/main" id="{7C3D6061-1748-41B4-B891-A7C3618AF9B9}"/>
               </a:ext>
             </a:extLst>
           </p:cNvPr>
@@ -23036,7 +23075,7 @@
           <p:cNvPr id="30" name="Rounded Rectangle 50">
             <a:extLst>
               <a:ext uri="{FF2B5EF4-FFF2-40B4-BE49-F238E27FC236}">
-                <a16:creationId xmlns:a16="http://schemas.microsoft.com/office/drawing/2014/main" xmlns="" id="{70496BE9-B009-42B7-BBDE-9B1126D7A161}"/>
+                <a16:creationId xmlns="" xmlns:a16="http://schemas.microsoft.com/office/drawing/2014/main" id="{70496BE9-B009-42B7-BBDE-9B1126D7A161}"/>
               </a:ext>
             </a:extLst>
           </p:cNvPr>
@@ -23093,7 +23132,7 @@
           <p:cNvPr id="31" name="Rounded Rectangle 50">
             <a:extLst>
               <a:ext uri="{FF2B5EF4-FFF2-40B4-BE49-F238E27FC236}">
-                <a16:creationId xmlns:a16="http://schemas.microsoft.com/office/drawing/2014/main" xmlns="" id="{2BB603A2-A19D-4C04-9388-4BB9CF32B4FB}"/>
+                <a16:creationId xmlns="" xmlns:a16="http://schemas.microsoft.com/office/drawing/2014/main" id="{2BB603A2-A19D-4C04-9388-4BB9CF32B4FB}"/>
               </a:ext>
             </a:extLst>
           </p:cNvPr>
@@ -23141,7 +23180,7 @@
           <p:cNvPr id="32" name="Picture 4" descr="Image result for arduino create logo">
             <a:extLst>
               <a:ext uri="{FF2B5EF4-FFF2-40B4-BE49-F238E27FC236}">
-                <a16:creationId xmlns:a16="http://schemas.microsoft.com/office/drawing/2014/main" xmlns="" id="{7F6C0F33-5638-49A8-BE81-85A46941558D}"/>
+                <a16:creationId xmlns="" xmlns:a16="http://schemas.microsoft.com/office/drawing/2014/main" id="{7F6C0F33-5638-49A8-BE81-85A46941558D}"/>
               </a:ext>
             </a:extLst>
           </p:cNvPr>
@@ -23188,7 +23227,7 @@
           <p:cNvPr id="33" name="Picture 12" descr="Image result for intel system studio logo">
             <a:extLst>
               <a:ext uri="{FF2B5EF4-FFF2-40B4-BE49-F238E27FC236}">
-                <a16:creationId xmlns:a16="http://schemas.microsoft.com/office/drawing/2014/main" xmlns="" id="{D3071ABB-96D2-4424-B400-EA35E8813927}"/>
+                <a16:creationId xmlns="" xmlns:a16="http://schemas.microsoft.com/office/drawing/2014/main" id="{D3071ABB-96D2-4424-B400-EA35E8813927}"/>
               </a:ext>
             </a:extLst>
           </p:cNvPr>
@@ -23235,7 +23274,7 @@
           <p:cNvPr id="34" name="Rectangle 33">
             <a:extLst>
               <a:ext uri="{FF2B5EF4-FFF2-40B4-BE49-F238E27FC236}">
-                <a16:creationId xmlns:a16="http://schemas.microsoft.com/office/drawing/2014/main" xmlns="" id="{DD7BCBA0-6439-498E-B604-7298DF54B26E}"/>
+                <a16:creationId xmlns="" xmlns:a16="http://schemas.microsoft.com/office/drawing/2014/main" id="{DD7BCBA0-6439-498E-B604-7298DF54B26E}"/>
               </a:ext>
             </a:extLst>
           </p:cNvPr>
@@ -23296,7 +23335,7 @@
           <p:cNvPr id="35" name="Rectangle 34">
             <a:extLst>
               <a:ext uri="{FF2B5EF4-FFF2-40B4-BE49-F238E27FC236}">
-                <a16:creationId xmlns:a16="http://schemas.microsoft.com/office/drawing/2014/main" xmlns="" id="{56A5446F-7B73-41D2-88C1-3359C5BC8F04}"/>
+                <a16:creationId xmlns="" xmlns:a16="http://schemas.microsoft.com/office/drawing/2014/main" id="{56A5446F-7B73-41D2-88C1-3359C5BC8F04}"/>
               </a:ext>
             </a:extLst>
           </p:cNvPr>
@@ -23371,7 +23410,7 @@
           <p:cNvPr id="36" name="Rectangle 35">
             <a:extLst>
               <a:ext uri="{FF2B5EF4-FFF2-40B4-BE49-F238E27FC236}">
-                <a16:creationId xmlns:a16="http://schemas.microsoft.com/office/drawing/2014/main" xmlns="" id="{71F2FF01-682F-4841-81C2-E3F7596330E2}"/>
+                <a16:creationId xmlns="" xmlns:a16="http://schemas.microsoft.com/office/drawing/2014/main" id="{71F2FF01-682F-4841-81C2-E3F7596330E2}"/>
               </a:ext>
             </a:extLst>
           </p:cNvPr>
@@ -23433,7 +23472,7 @@
           <p:cNvPr id="37" name="Picture 36">
             <a:extLst>
               <a:ext uri="{FF2B5EF4-FFF2-40B4-BE49-F238E27FC236}">
-                <a16:creationId xmlns:a16="http://schemas.microsoft.com/office/drawing/2014/main" xmlns="" id="{0BDEFC21-93AC-4E1B-9E3F-CB6A12B7E80C}"/>
+                <a16:creationId xmlns="" xmlns:a16="http://schemas.microsoft.com/office/drawing/2014/main" id="{0BDEFC21-93AC-4E1B-9E3F-CB6A12B7E80C}"/>
               </a:ext>
             </a:extLst>
           </p:cNvPr>
@@ -23463,7 +23502,7 @@
           <p:cNvPr id="38" name="Picture 37">
             <a:extLst>
               <a:ext uri="{FF2B5EF4-FFF2-40B4-BE49-F238E27FC236}">
-                <a16:creationId xmlns:a16="http://schemas.microsoft.com/office/drawing/2014/main" xmlns="" id="{AF1593E9-3A68-4DDA-B2A6-435A148F1ED4}"/>
+                <a16:creationId xmlns="" xmlns:a16="http://schemas.microsoft.com/office/drawing/2014/main" id="{AF1593E9-3A68-4DDA-B2A6-435A148F1ED4}"/>
               </a:ext>
             </a:extLst>
           </p:cNvPr>
@@ -23493,7 +23532,7 @@
           <p:cNvPr id="39" name="Rectangle 38">
             <a:extLst>
               <a:ext uri="{FF2B5EF4-FFF2-40B4-BE49-F238E27FC236}">
-                <a16:creationId xmlns:a16="http://schemas.microsoft.com/office/drawing/2014/main" xmlns="" id="{FD70DF3C-CF07-42D2-A805-AE242CE326F7}"/>
+                <a16:creationId xmlns="" xmlns:a16="http://schemas.microsoft.com/office/drawing/2014/main" id="{FD70DF3C-CF07-42D2-A805-AE242CE326F7}"/>
               </a:ext>
             </a:extLst>
           </p:cNvPr>
@@ -23572,7 +23611,7 @@
           <p:cNvPr id="40" name="Rectangle 39">
             <a:extLst>
               <a:ext uri="{FF2B5EF4-FFF2-40B4-BE49-F238E27FC236}">
-                <a16:creationId xmlns:a16="http://schemas.microsoft.com/office/drawing/2014/main" xmlns="" id="{892064D2-9F02-4BF8-83AE-6C5A681E9B4D}"/>
+                <a16:creationId xmlns="" xmlns:a16="http://schemas.microsoft.com/office/drawing/2014/main" id="{892064D2-9F02-4BF8-83AE-6C5A681E9B4D}"/>
               </a:ext>
             </a:extLst>
           </p:cNvPr>
@@ -23633,7 +23672,7 @@
           <p:cNvPr id="41" name="Rectangle 40">
             <a:extLst>
               <a:ext uri="{FF2B5EF4-FFF2-40B4-BE49-F238E27FC236}">
-                <a16:creationId xmlns:a16="http://schemas.microsoft.com/office/drawing/2014/main" xmlns="" id="{BA2D0DA9-8BAE-4FD6-A742-8442C1C6C0E3}"/>
+                <a16:creationId xmlns="" xmlns:a16="http://schemas.microsoft.com/office/drawing/2014/main" id="{BA2D0DA9-8BAE-4FD6-A742-8442C1C6C0E3}"/>
               </a:ext>
             </a:extLst>
           </p:cNvPr>
@@ -23678,7 +23717,7 @@
           <p:cNvPr id="42" name="Rectangle 41">
             <a:extLst>
               <a:ext uri="{FF2B5EF4-FFF2-40B4-BE49-F238E27FC236}">
-                <a16:creationId xmlns:a16="http://schemas.microsoft.com/office/drawing/2014/main" xmlns="" id="{589D1699-C63E-4EC4-B246-128247FB335C}"/>
+                <a16:creationId xmlns="" xmlns:a16="http://schemas.microsoft.com/office/drawing/2014/main" id="{589D1699-C63E-4EC4-B246-128247FB335C}"/>
               </a:ext>
             </a:extLst>
           </p:cNvPr>
@@ -23723,7 +23762,7 @@
           <p:cNvPr id="43" name="Rectangle 42">
             <a:extLst>
               <a:ext uri="{FF2B5EF4-FFF2-40B4-BE49-F238E27FC236}">
-                <a16:creationId xmlns:a16="http://schemas.microsoft.com/office/drawing/2014/main" xmlns="" id="{ADD94120-20B8-403E-B577-C0A50F0B87B2}"/>
+                <a16:creationId xmlns="" xmlns:a16="http://schemas.microsoft.com/office/drawing/2014/main" id="{ADD94120-20B8-403E-B577-C0A50F0B87B2}"/>
               </a:ext>
             </a:extLst>
           </p:cNvPr>
@@ -23768,7 +23807,7 @@
           <p:cNvPr id="44" name="Picture 43">
             <a:extLst>
               <a:ext uri="{FF2B5EF4-FFF2-40B4-BE49-F238E27FC236}">
-                <a16:creationId xmlns:a16="http://schemas.microsoft.com/office/drawing/2014/main" xmlns="" id="{0B4AF8C2-F312-45B2-ACA5-6614C1229122}"/>
+                <a16:creationId xmlns="" xmlns:a16="http://schemas.microsoft.com/office/drawing/2014/main" id="{0B4AF8C2-F312-45B2-ACA5-6614C1229122}"/>
               </a:ext>
             </a:extLst>
           </p:cNvPr>
@@ -23797,7 +23836,7 @@
           <p:cNvPr id="45" name="Slide Number Placeholder 4">
             <a:extLst>
               <a:ext uri="{FF2B5EF4-FFF2-40B4-BE49-F238E27FC236}">
-                <a16:creationId xmlns:a16="http://schemas.microsoft.com/office/drawing/2014/main" xmlns="" id="{3ED74A7D-0D3E-47B9-A187-847354E8C7BE}"/>
+                <a16:creationId xmlns="" xmlns:a16="http://schemas.microsoft.com/office/drawing/2014/main" id="{3ED74A7D-0D3E-47B9-A187-847354E8C7BE}"/>
               </a:ext>
             </a:extLst>
           </p:cNvPr>
@@ -23889,7 +23928,7 @@
           <p:cNvPr id="2" name="Title 1">
             <a:extLst>
               <a:ext uri="{FF2B5EF4-FFF2-40B4-BE49-F238E27FC236}">
-                <a16:creationId xmlns:a16="http://schemas.microsoft.com/office/drawing/2014/main" xmlns="" id="{3BF9101D-7C12-F545-8521-C4101CBDEC91}"/>
+                <a16:creationId xmlns="" xmlns:a16="http://schemas.microsoft.com/office/drawing/2014/main" id="{3BF9101D-7C12-F545-8521-C4101CBDEC91}"/>
               </a:ext>
             </a:extLst>
           </p:cNvPr>
@@ -23917,7 +23956,7 @@
           <p:cNvPr id="17" name="Circular Arrow 24">
             <a:extLst>
               <a:ext uri="{FF2B5EF4-FFF2-40B4-BE49-F238E27FC236}">
-                <a16:creationId xmlns:a16="http://schemas.microsoft.com/office/drawing/2014/main" xmlns="" id="{33CE4F94-9690-4A3E-B9EA-CC4AC0D71CA5}"/>
+                <a16:creationId xmlns="" xmlns:a16="http://schemas.microsoft.com/office/drawing/2014/main" id="{33CE4F94-9690-4A3E-B9EA-CC4AC0D71CA5}"/>
               </a:ext>
             </a:extLst>
           </p:cNvPr>
@@ -23975,7 +24014,7 @@
           <p:cNvPr id="18" name="Circular Arrow 25">
             <a:extLst>
               <a:ext uri="{FF2B5EF4-FFF2-40B4-BE49-F238E27FC236}">
-                <a16:creationId xmlns:a16="http://schemas.microsoft.com/office/drawing/2014/main" xmlns="" id="{A6385A16-0114-4382-82EB-E2B97EE4EA8F}"/>
+                <a16:creationId xmlns="" xmlns:a16="http://schemas.microsoft.com/office/drawing/2014/main" id="{A6385A16-0114-4382-82EB-E2B97EE4EA8F}"/>
               </a:ext>
             </a:extLst>
           </p:cNvPr>
@@ -24033,7 +24072,7 @@
           <p:cNvPr id="19" name="Picture 4" descr="Image result for arduino create logo">
             <a:extLst>
               <a:ext uri="{FF2B5EF4-FFF2-40B4-BE49-F238E27FC236}">
-                <a16:creationId xmlns:a16="http://schemas.microsoft.com/office/drawing/2014/main" xmlns="" id="{5BA1F566-8663-48C0-AF4A-2E8ED3A051AC}"/>
+                <a16:creationId xmlns="" xmlns:a16="http://schemas.microsoft.com/office/drawing/2014/main" id="{5BA1F566-8663-48C0-AF4A-2E8ED3A051AC}"/>
               </a:ext>
             </a:extLst>
           </p:cNvPr>
@@ -24080,7 +24119,7 @@
           <p:cNvPr id="20" name="TextBox 19">
             <a:extLst>
               <a:ext uri="{FF2B5EF4-FFF2-40B4-BE49-F238E27FC236}">
-                <a16:creationId xmlns:a16="http://schemas.microsoft.com/office/drawing/2014/main" xmlns="" id="{AAE33BDC-1132-4330-B49B-304B167ACFB9}"/>
+                <a16:creationId xmlns="" xmlns:a16="http://schemas.microsoft.com/office/drawing/2014/main" id="{AAE33BDC-1132-4330-B49B-304B167ACFB9}"/>
               </a:ext>
             </a:extLst>
           </p:cNvPr>
@@ -24261,7 +24300,7 @@
           <p:cNvPr id="21" name="Picture 12" descr="Image result for intel system studio logo">
             <a:extLst>
               <a:ext uri="{FF2B5EF4-FFF2-40B4-BE49-F238E27FC236}">
-                <a16:creationId xmlns:a16="http://schemas.microsoft.com/office/drawing/2014/main" xmlns="" id="{13DEB3D1-EB08-48A4-975F-3B4D2A2C4A7A}"/>
+                <a16:creationId xmlns="" xmlns:a16="http://schemas.microsoft.com/office/drawing/2014/main" id="{13DEB3D1-EB08-48A4-975F-3B4D2A2C4A7A}"/>
               </a:ext>
             </a:extLst>
           </p:cNvPr>
@@ -24308,7 +24347,7 @@
           <p:cNvPr id="22" name="TextBox 21">
             <a:extLst>
               <a:ext uri="{FF2B5EF4-FFF2-40B4-BE49-F238E27FC236}">
-                <a16:creationId xmlns:a16="http://schemas.microsoft.com/office/drawing/2014/main" xmlns="" id="{5D7AB35B-430F-449E-986D-263BD18138D7}"/>
+                <a16:creationId xmlns="" xmlns:a16="http://schemas.microsoft.com/office/drawing/2014/main" id="{5D7AB35B-430F-449E-986D-263BD18138D7}"/>
               </a:ext>
             </a:extLst>
           </p:cNvPr>
@@ -24489,7 +24528,7 @@
           <p:cNvPr id="23" name="Slide Number Placeholder 4">
             <a:extLst>
               <a:ext uri="{FF2B5EF4-FFF2-40B4-BE49-F238E27FC236}">
-                <a16:creationId xmlns:a16="http://schemas.microsoft.com/office/drawing/2014/main" xmlns="" id="{E583EABD-40FC-4914-B932-1DE198B1A588}"/>
+                <a16:creationId xmlns="" xmlns:a16="http://schemas.microsoft.com/office/drawing/2014/main" id="{E583EABD-40FC-4914-B932-1DE198B1A588}"/>
               </a:ext>
             </a:extLst>
           </p:cNvPr>
@@ -24884,7 +24923,7 @@
           <p:cNvPr id="2" name="Title 1">
             <a:extLst>
               <a:ext uri="{FF2B5EF4-FFF2-40B4-BE49-F238E27FC236}">
-                <a16:creationId xmlns:a16="http://schemas.microsoft.com/office/drawing/2014/main" xmlns="" id="{B33A0AE8-5F72-404F-9460-5B8781F449A9}"/>
+                <a16:creationId xmlns="" xmlns:a16="http://schemas.microsoft.com/office/drawing/2014/main" id="{B33A0AE8-5F72-404F-9460-5B8781F449A9}"/>
               </a:ext>
             </a:extLst>
           </p:cNvPr>
@@ -24917,7 +24956,7 @@
           <p:cNvPr id="14" name="Group 13">
             <a:extLst>
               <a:ext uri="{FF2B5EF4-FFF2-40B4-BE49-F238E27FC236}">
-                <a16:creationId xmlns:a16="http://schemas.microsoft.com/office/drawing/2014/main" xmlns="" id="{1EA2520D-D3A0-4ED4-99FF-FFBBBEA14E22}"/>
+                <a16:creationId xmlns="" xmlns:a16="http://schemas.microsoft.com/office/drawing/2014/main" id="{1EA2520D-D3A0-4ED4-99FF-FFBBBEA14E22}"/>
               </a:ext>
             </a:extLst>
           </p:cNvPr>
@@ -24937,7 +24976,7 @@
             <p:cNvPr id="30" name="Rounded Rectangle 50">
               <a:extLst>
                 <a:ext uri="{FF2B5EF4-FFF2-40B4-BE49-F238E27FC236}">
-                  <a16:creationId xmlns:a16="http://schemas.microsoft.com/office/drawing/2014/main" xmlns="" id="{FC45E4F6-93F3-4CFA-88F3-17E715C9325D}"/>
+                  <a16:creationId xmlns="" xmlns:a16="http://schemas.microsoft.com/office/drawing/2014/main" id="{FC45E4F6-93F3-4CFA-88F3-17E715C9325D}"/>
                 </a:ext>
               </a:extLst>
             </p:cNvPr>
@@ -24991,7 +25030,7 @@
             <p:cNvPr id="11" name="Rectangle 10">
               <a:extLst>
                 <a:ext uri="{FF2B5EF4-FFF2-40B4-BE49-F238E27FC236}">
-                  <a16:creationId xmlns:a16="http://schemas.microsoft.com/office/drawing/2014/main" xmlns="" id="{F0DEBBAE-39CA-423D-8F3B-3BDFE4790F68}"/>
+                  <a16:creationId xmlns="" xmlns:a16="http://schemas.microsoft.com/office/drawing/2014/main" id="{F0DEBBAE-39CA-423D-8F3B-3BDFE4790F68}"/>
                 </a:ext>
               </a:extLst>
             </p:cNvPr>
@@ -25048,7 +25087,7 @@
             <p:cNvPr id="5" name="Picture 4">
               <a:extLst>
                 <a:ext uri="{FF2B5EF4-FFF2-40B4-BE49-F238E27FC236}">
-                  <a16:creationId xmlns:a16="http://schemas.microsoft.com/office/drawing/2014/main" xmlns="" id="{9E3085EE-F337-4B72-AACC-ED2EA061F2AA}"/>
+                  <a16:creationId xmlns="" xmlns:a16="http://schemas.microsoft.com/office/drawing/2014/main" id="{9E3085EE-F337-4B72-AACC-ED2EA061F2AA}"/>
                 </a:ext>
               </a:extLst>
             </p:cNvPr>
@@ -25214,7 +25253,7 @@
           <p:cNvPr id="8" name="Group 7">
             <a:extLst>
               <a:ext uri="{FF2B5EF4-FFF2-40B4-BE49-F238E27FC236}">
-                <a16:creationId xmlns:a16="http://schemas.microsoft.com/office/drawing/2014/main" xmlns="" id="{C393EFA0-B9F6-41EB-A86D-65295F31F02F}"/>
+                <a16:creationId xmlns="" xmlns:a16="http://schemas.microsoft.com/office/drawing/2014/main" id="{C393EFA0-B9F6-41EB-A86D-65295F31F02F}"/>
               </a:ext>
             </a:extLst>
           </p:cNvPr>
@@ -25234,7 +25273,7 @@
             <p:cNvPr id="31" name="Rounded Rectangle 50">
               <a:extLst>
                 <a:ext uri="{FF2B5EF4-FFF2-40B4-BE49-F238E27FC236}">
-                  <a16:creationId xmlns:a16="http://schemas.microsoft.com/office/drawing/2014/main" xmlns="" id="{0B293476-29C2-4F2C-97E8-3FA40573CBCB}"/>
+                  <a16:creationId xmlns="" xmlns:a16="http://schemas.microsoft.com/office/drawing/2014/main" id="{0B293476-29C2-4F2C-97E8-3FA40573CBCB}"/>
                 </a:ext>
               </a:extLst>
             </p:cNvPr>
@@ -25288,7 +25327,7 @@
             <p:cNvPr id="13" name="Rectangle 12">
               <a:extLst>
                 <a:ext uri="{FF2B5EF4-FFF2-40B4-BE49-F238E27FC236}">
-                  <a16:creationId xmlns:a16="http://schemas.microsoft.com/office/drawing/2014/main" xmlns="" id="{E5A806FA-A273-4C97-B3F7-2DCE1834129B}"/>
+                  <a16:creationId xmlns="" xmlns:a16="http://schemas.microsoft.com/office/drawing/2014/main" id="{E5A806FA-A273-4C97-B3F7-2DCE1834129B}"/>
                 </a:ext>
               </a:extLst>
             </p:cNvPr>
@@ -25472,7 +25511,7 @@
           <p:cNvPr id="12" name="Group 11">
             <a:extLst>
               <a:ext uri="{FF2B5EF4-FFF2-40B4-BE49-F238E27FC236}">
-                <a16:creationId xmlns:a16="http://schemas.microsoft.com/office/drawing/2014/main" xmlns="" id="{FD8297AB-0D31-44DC-91DF-CDD437913D63}"/>
+                <a16:creationId xmlns="" xmlns:a16="http://schemas.microsoft.com/office/drawing/2014/main" id="{FD8297AB-0D31-44DC-91DF-CDD437913D63}"/>
               </a:ext>
             </a:extLst>
           </p:cNvPr>
@@ -25492,7 +25531,7 @@
             <p:cNvPr id="29" name="Rounded Rectangle 50">
               <a:extLst>
                 <a:ext uri="{FF2B5EF4-FFF2-40B4-BE49-F238E27FC236}">
-                  <a16:creationId xmlns:a16="http://schemas.microsoft.com/office/drawing/2014/main" xmlns="" id="{989CA1E5-02C6-4303-B105-96F9D22833FB}"/>
+                  <a16:creationId xmlns="" xmlns:a16="http://schemas.microsoft.com/office/drawing/2014/main" id="{989CA1E5-02C6-4303-B105-96F9D22833FB}"/>
                 </a:ext>
               </a:extLst>
             </p:cNvPr>
@@ -25546,7 +25585,7 @@
             <p:cNvPr id="10" name="Picture 9">
               <a:extLst>
                 <a:ext uri="{FF2B5EF4-FFF2-40B4-BE49-F238E27FC236}">
-                  <a16:creationId xmlns:a16="http://schemas.microsoft.com/office/drawing/2014/main" xmlns="" id="{3E1D15D3-82C6-4F66-9B26-DC1DE44A17C4}"/>
+                  <a16:creationId xmlns="" xmlns:a16="http://schemas.microsoft.com/office/drawing/2014/main" id="{3E1D15D3-82C6-4F66-9B26-DC1DE44A17C4}"/>
                 </a:ext>
               </a:extLst>
             </p:cNvPr>
@@ -25576,7 +25615,7 @@
             <p:cNvPr id="23" name="Rectangle 22">
               <a:extLst>
                 <a:ext uri="{FF2B5EF4-FFF2-40B4-BE49-F238E27FC236}">
-                  <a16:creationId xmlns:a16="http://schemas.microsoft.com/office/drawing/2014/main" xmlns="" id="{E5A806FA-A273-4C97-B3F7-2DCE1834129B}"/>
+                  <a16:creationId xmlns="" xmlns:a16="http://schemas.microsoft.com/office/drawing/2014/main" id="{E5A806FA-A273-4C97-B3F7-2DCE1834129B}"/>
                 </a:ext>
               </a:extLst>
             </p:cNvPr>
@@ -25736,7 +25775,7 @@
           <p:cNvPr id="20" name="Slide Number Placeholder 4">
             <a:extLst>
               <a:ext uri="{FF2B5EF4-FFF2-40B4-BE49-F238E27FC236}">
-                <a16:creationId xmlns:a16="http://schemas.microsoft.com/office/drawing/2014/main" xmlns="" id="{3E6BBC28-5D37-4A1A-99BE-80F48E2BFDAF}"/>
+                <a16:creationId xmlns="" xmlns:a16="http://schemas.microsoft.com/office/drawing/2014/main" id="{3E6BBC28-5D37-4A1A-99BE-80F48E2BFDAF}"/>
               </a:ext>
             </a:extLst>
           </p:cNvPr>
@@ -25786,7 +25825,7 @@
           <p:cNvPr id="15" name="Group 14">
             <a:extLst>
               <a:ext uri="{FF2B5EF4-FFF2-40B4-BE49-F238E27FC236}">
-                <a16:creationId xmlns:a16="http://schemas.microsoft.com/office/drawing/2014/main" xmlns="" id="{828A8C78-7BCE-4A60-A188-9362AC87D7F9}"/>
+                <a16:creationId xmlns="" xmlns:a16="http://schemas.microsoft.com/office/drawing/2014/main" id="{828A8C78-7BCE-4A60-A188-9362AC87D7F9}"/>
               </a:ext>
             </a:extLst>
           </p:cNvPr>
@@ -25806,7 +25845,7 @@
             <p:cNvPr id="3" name="Arrow: Left-Right 2">
               <a:extLst>
                 <a:ext uri="{FF2B5EF4-FFF2-40B4-BE49-F238E27FC236}">
-                  <a16:creationId xmlns:a16="http://schemas.microsoft.com/office/drawing/2014/main" xmlns="" id="{263CC668-AFFB-4386-83A1-87CF658B98DD}"/>
+                  <a16:creationId xmlns="" xmlns:a16="http://schemas.microsoft.com/office/drawing/2014/main" id="{263CC668-AFFB-4386-83A1-87CF658B98DD}"/>
                 </a:ext>
               </a:extLst>
             </p:cNvPr>
@@ -25861,7 +25900,7 @@
             <p:cNvPr id="32" name="Pentagon 14">
               <a:extLst>
                 <a:ext uri="{FF2B5EF4-FFF2-40B4-BE49-F238E27FC236}">
-                  <a16:creationId xmlns:a16="http://schemas.microsoft.com/office/drawing/2014/main" xmlns="" id="{A013EE47-00CE-4512-9109-E5ADC2E9AA7F}"/>
+                  <a16:creationId xmlns="" xmlns:a16="http://schemas.microsoft.com/office/drawing/2014/main" id="{A013EE47-00CE-4512-9109-E5ADC2E9AA7F}"/>
                 </a:ext>
               </a:extLst>
             </p:cNvPr>
@@ -26190,7 +26229,7 @@
           <p:cNvPr id="2" name="Title 1">
             <a:extLst>
               <a:ext uri="{FF2B5EF4-FFF2-40B4-BE49-F238E27FC236}">
-                <a16:creationId xmlns:a16="http://schemas.microsoft.com/office/drawing/2014/main" xmlns="" id="{9E16840E-A609-9A45-8261-E71A907675FB}"/>
+                <a16:creationId xmlns="" xmlns:a16="http://schemas.microsoft.com/office/drawing/2014/main" id="{9E16840E-A609-9A45-8261-E71A907675FB}"/>
               </a:ext>
             </a:extLst>
           </p:cNvPr>
@@ -26223,7 +26262,7 @@
           <p:cNvPr id="7" name="Group 6">
             <a:extLst>
               <a:ext uri="{FF2B5EF4-FFF2-40B4-BE49-F238E27FC236}">
-                <a16:creationId xmlns:a16="http://schemas.microsoft.com/office/drawing/2014/main" xmlns="" id="{3E0F312C-9F5A-4534-9667-19B28AF7312F}"/>
+                <a16:creationId xmlns="" xmlns:a16="http://schemas.microsoft.com/office/drawing/2014/main" id="{3E0F312C-9F5A-4534-9667-19B28AF7312F}"/>
               </a:ext>
             </a:extLst>
           </p:cNvPr>
@@ -26243,7 +26282,7 @@
             <p:cNvPr id="20" name="Rounded Rectangle 50">
               <a:extLst>
                 <a:ext uri="{FF2B5EF4-FFF2-40B4-BE49-F238E27FC236}">
-                  <a16:creationId xmlns:a16="http://schemas.microsoft.com/office/drawing/2014/main" xmlns="" id="{A35A9723-856A-495B-A1CA-33FD80B37C46}"/>
+                  <a16:creationId xmlns="" xmlns:a16="http://schemas.microsoft.com/office/drawing/2014/main" id="{A35A9723-856A-495B-A1CA-33FD80B37C46}"/>
                 </a:ext>
               </a:extLst>
             </p:cNvPr>
@@ -26297,7 +26336,7 @@
             <p:cNvPr id="5" name="Rectangle 4">
               <a:extLst>
                 <a:ext uri="{FF2B5EF4-FFF2-40B4-BE49-F238E27FC236}">
-                  <a16:creationId xmlns:a16="http://schemas.microsoft.com/office/drawing/2014/main" xmlns="" id="{EB953D86-1ED4-4774-AF58-57F21FF5570C}"/>
+                  <a16:creationId xmlns="" xmlns:a16="http://schemas.microsoft.com/office/drawing/2014/main" id="{EB953D86-1ED4-4774-AF58-57F21FF5570C}"/>
                 </a:ext>
               </a:extLst>
             </p:cNvPr>
@@ -26405,7 +26444,7 @@
             <p:cNvPr id="16" name="Rectangle 15">
               <a:extLst>
                 <a:ext uri="{FF2B5EF4-FFF2-40B4-BE49-F238E27FC236}">
-                  <a16:creationId xmlns:a16="http://schemas.microsoft.com/office/drawing/2014/main" xmlns="" id="{6D7C18F4-168B-4500-8D4A-D58D974991A4}"/>
+                  <a16:creationId xmlns="" xmlns:a16="http://schemas.microsoft.com/office/drawing/2014/main" id="{6D7C18F4-168B-4500-8D4A-D58D974991A4}"/>
                 </a:ext>
               </a:extLst>
             </p:cNvPr>
@@ -26473,7 +26512,7 @@
           <p:cNvPr id="8" name="Group 7">
             <a:extLst>
               <a:ext uri="{FF2B5EF4-FFF2-40B4-BE49-F238E27FC236}">
-                <a16:creationId xmlns:a16="http://schemas.microsoft.com/office/drawing/2014/main" xmlns="" id="{50FF559C-4F01-48FD-A8F9-A4E278CE9D84}"/>
+                <a16:creationId xmlns="" xmlns:a16="http://schemas.microsoft.com/office/drawing/2014/main" id="{50FF559C-4F01-48FD-A8F9-A4E278CE9D84}"/>
               </a:ext>
             </a:extLst>
           </p:cNvPr>
@@ -26493,7 +26532,7 @@
             <p:cNvPr id="27" name="Rounded Rectangle 50">
               <a:extLst>
                 <a:ext uri="{FF2B5EF4-FFF2-40B4-BE49-F238E27FC236}">
-                  <a16:creationId xmlns:a16="http://schemas.microsoft.com/office/drawing/2014/main" xmlns="" id="{E44405A5-7E82-479F-B301-488EF2189B48}"/>
+                  <a16:creationId xmlns="" xmlns:a16="http://schemas.microsoft.com/office/drawing/2014/main" id="{E44405A5-7E82-479F-B301-488EF2189B48}"/>
                 </a:ext>
               </a:extLst>
             </p:cNvPr>
@@ -26547,7 +26586,7 @@
             <p:cNvPr id="6" name="Rectangle 5">
               <a:extLst>
                 <a:ext uri="{FF2B5EF4-FFF2-40B4-BE49-F238E27FC236}">
-                  <a16:creationId xmlns:a16="http://schemas.microsoft.com/office/drawing/2014/main" xmlns="" id="{17911325-B0DC-407B-B23D-ADE1B3977898}"/>
+                  <a16:creationId xmlns="" xmlns:a16="http://schemas.microsoft.com/office/drawing/2014/main" id="{17911325-B0DC-407B-B23D-ADE1B3977898}"/>
                 </a:ext>
               </a:extLst>
             </p:cNvPr>
@@ -26655,7 +26694,7 @@
             <p:cNvPr id="17" name="Rectangle 16">
               <a:extLst>
                 <a:ext uri="{FF2B5EF4-FFF2-40B4-BE49-F238E27FC236}">
-                  <a16:creationId xmlns:a16="http://schemas.microsoft.com/office/drawing/2014/main" xmlns="" id="{59304AA1-1E28-41B7-A7D8-F73D5A7E1EFC}"/>
+                  <a16:creationId xmlns="" xmlns:a16="http://schemas.microsoft.com/office/drawing/2014/main" id="{59304AA1-1E28-41B7-A7D8-F73D5A7E1EFC}"/>
                 </a:ext>
               </a:extLst>
             </p:cNvPr>
@@ -26729,7 +26768,7 @@
           <p:cNvPr id="3" name="Group 2">
             <a:extLst>
               <a:ext uri="{FF2B5EF4-FFF2-40B4-BE49-F238E27FC236}">
-                <a16:creationId xmlns:a16="http://schemas.microsoft.com/office/drawing/2014/main" xmlns="" id="{8CEE8181-A115-4B8B-A520-F659BB2FF4F6}"/>
+                <a16:creationId xmlns="" xmlns:a16="http://schemas.microsoft.com/office/drawing/2014/main" id="{8CEE8181-A115-4B8B-A520-F659BB2FF4F6}"/>
               </a:ext>
             </a:extLst>
           </p:cNvPr>
@@ -26749,7 +26788,7 @@
             <p:cNvPr id="30" name="Rounded Rectangle 50">
               <a:extLst>
                 <a:ext uri="{FF2B5EF4-FFF2-40B4-BE49-F238E27FC236}">
-                  <a16:creationId xmlns:a16="http://schemas.microsoft.com/office/drawing/2014/main" xmlns="" id="{1DA64B8F-BDB5-45AF-A993-3A82AEF8E699}"/>
+                  <a16:creationId xmlns="" xmlns:a16="http://schemas.microsoft.com/office/drawing/2014/main" id="{1DA64B8F-BDB5-45AF-A993-3A82AEF8E699}"/>
                 </a:ext>
               </a:extLst>
             </p:cNvPr>
@@ -26803,7 +26842,7 @@
             <p:cNvPr id="4" name="Rectangle 3">
               <a:extLst>
                 <a:ext uri="{FF2B5EF4-FFF2-40B4-BE49-F238E27FC236}">
-                  <a16:creationId xmlns:a16="http://schemas.microsoft.com/office/drawing/2014/main" xmlns="" id="{EECA6280-7BAE-43DE-A6F3-D5242A2C7949}"/>
+                  <a16:creationId xmlns="" xmlns:a16="http://schemas.microsoft.com/office/drawing/2014/main" id="{EECA6280-7BAE-43DE-A6F3-D5242A2C7949}"/>
                 </a:ext>
               </a:extLst>
             </p:cNvPr>
@@ -26894,7 +26933,7 @@
             <p:cNvPr id="18" name="Rectangle 17">
               <a:extLst>
                 <a:ext uri="{FF2B5EF4-FFF2-40B4-BE49-F238E27FC236}">
-                  <a16:creationId xmlns:a16="http://schemas.microsoft.com/office/drawing/2014/main" xmlns="" id="{53946606-3D7A-4373-A99F-F0F3B5C08BD1}"/>
+                  <a16:creationId xmlns="" xmlns:a16="http://schemas.microsoft.com/office/drawing/2014/main" id="{53946606-3D7A-4373-A99F-F0F3B5C08BD1}"/>
                 </a:ext>
               </a:extLst>
             </p:cNvPr>
@@ -26957,7 +26996,7 @@
           <p:cNvPr id="9" name="Group 8">
             <a:extLst>
               <a:ext uri="{FF2B5EF4-FFF2-40B4-BE49-F238E27FC236}">
-                <a16:creationId xmlns:a16="http://schemas.microsoft.com/office/drawing/2014/main" xmlns="" id="{CAE38BD3-FA08-400E-B59A-FB0AF7A48E82}"/>
+                <a16:creationId xmlns="" xmlns:a16="http://schemas.microsoft.com/office/drawing/2014/main" id="{CAE38BD3-FA08-400E-B59A-FB0AF7A48E82}"/>
               </a:ext>
             </a:extLst>
           </p:cNvPr>
@@ -26977,7 +27016,7 @@
             <p:cNvPr id="28" name="Rounded Rectangle 50">
               <a:extLst>
                 <a:ext uri="{FF2B5EF4-FFF2-40B4-BE49-F238E27FC236}">
-                  <a16:creationId xmlns:a16="http://schemas.microsoft.com/office/drawing/2014/main" xmlns="" id="{213030C5-568D-4C6C-807C-5A3CCF8A7229}"/>
+                  <a16:creationId xmlns="" xmlns:a16="http://schemas.microsoft.com/office/drawing/2014/main" id="{213030C5-568D-4C6C-807C-5A3CCF8A7229}"/>
                 </a:ext>
               </a:extLst>
             </p:cNvPr>
@@ -27031,7 +27070,7 @@
             <p:cNvPr id="22" name="Rectangle 21">
               <a:extLst>
                 <a:ext uri="{FF2B5EF4-FFF2-40B4-BE49-F238E27FC236}">
-                  <a16:creationId xmlns:a16="http://schemas.microsoft.com/office/drawing/2014/main" xmlns="" id="{23624481-7A4A-124F-86D2-1A330BAFA024}"/>
+                  <a16:creationId xmlns="" xmlns:a16="http://schemas.microsoft.com/office/drawing/2014/main" id="{23624481-7A4A-124F-86D2-1A330BAFA024}"/>
                 </a:ext>
               </a:extLst>
             </p:cNvPr>
@@ -27126,7 +27165,7 @@
             <p:cNvPr id="23" name="Rectangle 22">
               <a:extLst>
                 <a:ext uri="{FF2B5EF4-FFF2-40B4-BE49-F238E27FC236}">
-                  <a16:creationId xmlns:a16="http://schemas.microsoft.com/office/drawing/2014/main" xmlns="" id="{B3E29B5E-61DD-A849-B320-BF9E6403BA2D}"/>
+                  <a16:creationId xmlns="" xmlns:a16="http://schemas.microsoft.com/office/drawing/2014/main" id="{B3E29B5E-61DD-A849-B320-BF9E6403BA2D}"/>
                 </a:ext>
               </a:extLst>
             </p:cNvPr>
@@ -27194,7 +27233,7 @@
           <p:cNvPr id="10" name="Group 9">
             <a:extLst>
               <a:ext uri="{FF2B5EF4-FFF2-40B4-BE49-F238E27FC236}">
-                <a16:creationId xmlns:a16="http://schemas.microsoft.com/office/drawing/2014/main" xmlns="" id="{C7785CFC-2BE2-4876-B818-4E90EBC6A6CB}"/>
+                <a16:creationId xmlns="" xmlns:a16="http://schemas.microsoft.com/office/drawing/2014/main" id="{C7785CFC-2BE2-4876-B818-4E90EBC6A6CB}"/>
               </a:ext>
             </a:extLst>
           </p:cNvPr>
@@ -27214,7 +27253,7 @@
             <p:cNvPr id="29" name="Rounded Rectangle 50">
               <a:extLst>
                 <a:ext uri="{FF2B5EF4-FFF2-40B4-BE49-F238E27FC236}">
-                  <a16:creationId xmlns:a16="http://schemas.microsoft.com/office/drawing/2014/main" xmlns="" id="{30FAD36E-6ACE-46B0-AE06-13D7FBA53BC0}"/>
+                  <a16:creationId xmlns="" xmlns:a16="http://schemas.microsoft.com/office/drawing/2014/main" id="{30FAD36E-6ACE-46B0-AE06-13D7FBA53BC0}"/>
                 </a:ext>
               </a:extLst>
             </p:cNvPr>
@@ -27268,7 +27307,7 @@
             <p:cNvPr id="25" name="Rectangle 24">
               <a:extLst>
                 <a:ext uri="{FF2B5EF4-FFF2-40B4-BE49-F238E27FC236}">
-                  <a16:creationId xmlns:a16="http://schemas.microsoft.com/office/drawing/2014/main" xmlns="" id="{D85CCEF3-9BAC-3A4C-A277-2C87E2354400}"/>
+                  <a16:creationId xmlns="" xmlns:a16="http://schemas.microsoft.com/office/drawing/2014/main" id="{D85CCEF3-9BAC-3A4C-A277-2C87E2354400}"/>
                 </a:ext>
               </a:extLst>
             </p:cNvPr>
@@ -27335,7 +27374,7 @@
             <p:cNvPr id="26" name="Rectangle 25">
               <a:extLst>
                 <a:ext uri="{FF2B5EF4-FFF2-40B4-BE49-F238E27FC236}">
-                  <a16:creationId xmlns:a16="http://schemas.microsoft.com/office/drawing/2014/main" xmlns="" id="{AA91D74E-D61C-5145-A52E-049E8DCF55FB}"/>
+                  <a16:creationId xmlns="" xmlns:a16="http://schemas.microsoft.com/office/drawing/2014/main" id="{AA91D74E-D61C-5145-A52E-049E8DCF55FB}"/>
                 </a:ext>
               </a:extLst>
             </p:cNvPr>
@@ -27389,7 +27428,7 @@
           <p:cNvPr id="19" name="Slide Number Placeholder 4">
             <a:extLst>
               <a:ext uri="{FF2B5EF4-FFF2-40B4-BE49-F238E27FC236}">
-                <a16:creationId xmlns:a16="http://schemas.microsoft.com/office/drawing/2014/main" xmlns="" id="{2B28488E-547A-4B01-8D5B-EB16FDF36E15}"/>
+                <a16:creationId xmlns="" xmlns:a16="http://schemas.microsoft.com/office/drawing/2014/main" id="{2B28488E-547A-4B01-8D5B-EB16FDF36E15}"/>
               </a:ext>
             </a:extLst>
           </p:cNvPr>
@@ -27743,7 +27782,7 @@
           <p:cNvPr id="6" name="Group 5">
             <a:extLst>
               <a:ext uri="{FF2B5EF4-FFF2-40B4-BE49-F238E27FC236}">
-                <a16:creationId xmlns:a16="http://schemas.microsoft.com/office/drawing/2014/main" xmlns="" id="{583F7C57-572A-48EA-9B60-BC0A5F9CAE97}"/>
+                <a16:creationId xmlns="" xmlns:a16="http://schemas.microsoft.com/office/drawing/2014/main" id="{583F7C57-572A-48EA-9B60-BC0A5F9CAE97}"/>
               </a:ext>
             </a:extLst>
           </p:cNvPr>
@@ -27763,7 +27802,7 @@
             <p:cNvPr id="49" name="Pentagon 11">
               <a:extLst>
                 <a:ext uri="{FF2B5EF4-FFF2-40B4-BE49-F238E27FC236}">
-                  <a16:creationId xmlns:a16="http://schemas.microsoft.com/office/drawing/2014/main" xmlns="" id="{F591BF96-01E8-42DA-B04A-7AD289CBE578}"/>
+                  <a16:creationId xmlns="" xmlns:a16="http://schemas.microsoft.com/office/drawing/2014/main" id="{F591BF96-01E8-42DA-B04A-7AD289CBE578}"/>
                 </a:ext>
               </a:extLst>
             </p:cNvPr>
@@ -27837,7 +27876,7 @@
             <p:cNvPr id="2" name="Rectangle 1">
               <a:extLst>
                 <a:ext uri="{FF2B5EF4-FFF2-40B4-BE49-F238E27FC236}">
-                  <a16:creationId xmlns:a16="http://schemas.microsoft.com/office/drawing/2014/main" xmlns="" id="{02357776-AE78-435F-B267-6969C90D4DF0}"/>
+                  <a16:creationId xmlns="" xmlns:a16="http://schemas.microsoft.com/office/drawing/2014/main" id="{02357776-AE78-435F-B267-6969C90D4DF0}"/>
                 </a:ext>
               </a:extLst>
             </p:cNvPr>
@@ -27906,7 +27945,7 @@
             <p:cNvPr id="50" name="TextBox 49">
               <a:extLst>
                 <a:ext uri="{FF2B5EF4-FFF2-40B4-BE49-F238E27FC236}">
-                  <a16:creationId xmlns:a16="http://schemas.microsoft.com/office/drawing/2014/main" xmlns="" id="{65C52912-C695-436E-B242-76E393B6D722}"/>
+                  <a16:creationId xmlns="" xmlns:a16="http://schemas.microsoft.com/office/drawing/2014/main" id="{65C52912-C695-436E-B242-76E393B6D722}"/>
                 </a:ext>
               </a:extLst>
             </p:cNvPr>
@@ -27952,7 +27991,7 @@
           <p:cNvPr id="3" name="Group 2">
             <a:extLst>
               <a:ext uri="{FF2B5EF4-FFF2-40B4-BE49-F238E27FC236}">
-                <a16:creationId xmlns:a16="http://schemas.microsoft.com/office/drawing/2014/main" xmlns="" id="{66DD6E8A-B236-4EA9-9C55-229392307D13}"/>
+                <a16:creationId xmlns="" xmlns:a16="http://schemas.microsoft.com/office/drawing/2014/main" id="{66DD6E8A-B236-4EA9-9C55-229392307D13}"/>
               </a:ext>
             </a:extLst>
           </p:cNvPr>
@@ -27972,7 +28011,7 @@
             <p:cNvPr id="54" name="Pentagon 11">
               <a:extLst>
                 <a:ext uri="{FF2B5EF4-FFF2-40B4-BE49-F238E27FC236}">
-                  <a16:creationId xmlns:a16="http://schemas.microsoft.com/office/drawing/2014/main" xmlns="" id="{C53EB407-F223-4FEA-BB41-4E9693252480}"/>
+                  <a16:creationId xmlns="" xmlns:a16="http://schemas.microsoft.com/office/drawing/2014/main" id="{C53EB407-F223-4FEA-BB41-4E9693252480}"/>
                 </a:ext>
               </a:extLst>
             </p:cNvPr>
@@ -28046,7 +28085,7 @@
             <p:cNvPr id="55" name="Rectangle 54">
               <a:extLst>
                 <a:ext uri="{FF2B5EF4-FFF2-40B4-BE49-F238E27FC236}">
-                  <a16:creationId xmlns:a16="http://schemas.microsoft.com/office/drawing/2014/main" xmlns="" id="{340FE98F-FB0F-46F8-9B20-0D50D7718790}"/>
+                  <a16:creationId xmlns="" xmlns:a16="http://schemas.microsoft.com/office/drawing/2014/main" id="{340FE98F-FB0F-46F8-9B20-0D50D7718790}"/>
                 </a:ext>
               </a:extLst>
             </p:cNvPr>
@@ -28119,7 +28158,7 @@
             <p:cNvPr id="56" name="TextBox 55">
               <a:extLst>
                 <a:ext uri="{FF2B5EF4-FFF2-40B4-BE49-F238E27FC236}">
-                  <a16:creationId xmlns:a16="http://schemas.microsoft.com/office/drawing/2014/main" xmlns="" id="{09E0A4DA-AF01-44E7-96BF-4E230FD91AA2}"/>
+                  <a16:creationId xmlns="" xmlns:a16="http://schemas.microsoft.com/office/drawing/2014/main" id="{09E0A4DA-AF01-44E7-96BF-4E230FD91AA2}"/>
                 </a:ext>
               </a:extLst>
             </p:cNvPr>
@@ -28165,7 +28204,7 @@
           <p:cNvPr id="7" name="Group 6">
             <a:extLst>
               <a:ext uri="{FF2B5EF4-FFF2-40B4-BE49-F238E27FC236}">
-                <a16:creationId xmlns:a16="http://schemas.microsoft.com/office/drawing/2014/main" xmlns="" id="{4F6B53E1-B19A-4F08-9867-9CAB55D5D13C}"/>
+                <a16:creationId xmlns="" xmlns:a16="http://schemas.microsoft.com/office/drawing/2014/main" id="{4F6B53E1-B19A-4F08-9867-9CAB55D5D13C}"/>
               </a:ext>
             </a:extLst>
           </p:cNvPr>
@@ -28185,7 +28224,7 @@
             <p:cNvPr id="57" name="Pentagon 11">
               <a:extLst>
                 <a:ext uri="{FF2B5EF4-FFF2-40B4-BE49-F238E27FC236}">
-                  <a16:creationId xmlns:a16="http://schemas.microsoft.com/office/drawing/2014/main" xmlns="" id="{F7E2DF7C-690D-4E82-9363-EFDD6203D99B}"/>
+                  <a16:creationId xmlns="" xmlns:a16="http://schemas.microsoft.com/office/drawing/2014/main" id="{F7E2DF7C-690D-4E82-9363-EFDD6203D99B}"/>
                 </a:ext>
               </a:extLst>
             </p:cNvPr>
@@ -28261,7 +28300,7 @@
             <p:cNvPr id="59" name="TextBox 58">
               <a:extLst>
                 <a:ext uri="{FF2B5EF4-FFF2-40B4-BE49-F238E27FC236}">
-                  <a16:creationId xmlns:a16="http://schemas.microsoft.com/office/drawing/2014/main" xmlns="" id="{8E17D1E1-12A1-47F7-86DB-E19C338C670E}"/>
+                  <a16:creationId xmlns="" xmlns:a16="http://schemas.microsoft.com/office/drawing/2014/main" id="{8E17D1E1-12A1-47F7-86DB-E19C338C670E}"/>
                 </a:ext>
               </a:extLst>
             </p:cNvPr>
@@ -28306,7 +28345,7 @@
             <p:cNvPr id="25" name="Rectangle 24">
               <a:extLst>
                 <a:ext uri="{FF2B5EF4-FFF2-40B4-BE49-F238E27FC236}">
-                  <a16:creationId xmlns:a16="http://schemas.microsoft.com/office/drawing/2014/main" xmlns="" id="{FB184961-9141-B04E-BCCE-DC12E8146F8A}"/>
+                  <a16:creationId xmlns="" xmlns:a16="http://schemas.microsoft.com/office/drawing/2014/main" id="{FB184961-9141-B04E-BCCE-DC12E8146F8A}"/>
                 </a:ext>
               </a:extLst>
             </p:cNvPr>
@@ -28369,7 +28408,7 @@
           <p:cNvPr id="5" name="Group 4">
             <a:extLst>
               <a:ext uri="{FF2B5EF4-FFF2-40B4-BE49-F238E27FC236}">
-                <a16:creationId xmlns:a16="http://schemas.microsoft.com/office/drawing/2014/main" xmlns="" id="{D7613564-8B44-458C-82A9-9B859798CB96}"/>
+                <a16:creationId xmlns="" xmlns:a16="http://schemas.microsoft.com/office/drawing/2014/main" id="{D7613564-8B44-458C-82A9-9B859798CB96}"/>
               </a:ext>
             </a:extLst>
           </p:cNvPr>
@@ -28389,7 +28428,7 @@
             <p:cNvPr id="51" name="Pentagon 11">
               <a:extLst>
                 <a:ext uri="{FF2B5EF4-FFF2-40B4-BE49-F238E27FC236}">
-                  <a16:creationId xmlns:a16="http://schemas.microsoft.com/office/drawing/2014/main" xmlns="" id="{17282381-607C-4C28-8FC7-B5EC7520EE2B}"/>
+                  <a16:creationId xmlns="" xmlns:a16="http://schemas.microsoft.com/office/drawing/2014/main" id="{17282381-607C-4C28-8FC7-B5EC7520EE2B}"/>
                 </a:ext>
               </a:extLst>
             </p:cNvPr>
@@ -28463,7 +28502,7 @@
             <p:cNvPr id="53" name="TextBox 52">
               <a:extLst>
                 <a:ext uri="{FF2B5EF4-FFF2-40B4-BE49-F238E27FC236}">
-                  <a16:creationId xmlns:a16="http://schemas.microsoft.com/office/drawing/2014/main" xmlns="" id="{6AEE4BE0-0F9E-46A3-ACB3-82E558B97F97}"/>
+                  <a16:creationId xmlns="" xmlns:a16="http://schemas.microsoft.com/office/drawing/2014/main" id="{6AEE4BE0-0F9E-46A3-ACB3-82E558B97F97}"/>
                 </a:ext>
               </a:extLst>
             </p:cNvPr>
@@ -28508,7 +28547,7 @@
             <p:cNvPr id="27" name="Rectangle 26">
               <a:extLst>
                 <a:ext uri="{FF2B5EF4-FFF2-40B4-BE49-F238E27FC236}">
-                  <a16:creationId xmlns:a16="http://schemas.microsoft.com/office/drawing/2014/main" xmlns="" id="{30735153-AC3C-424F-97DC-A64D94238193}"/>
+                  <a16:creationId xmlns="" xmlns:a16="http://schemas.microsoft.com/office/drawing/2014/main" id="{30735153-AC3C-424F-97DC-A64D94238193}"/>
                 </a:ext>
               </a:extLst>
             </p:cNvPr>
@@ -28660,7 +28699,7 @@
           <p:cNvPr id="21" name="Picture 20">
             <a:extLst>
               <a:ext uri="{FF2B5EF4-FFF2-40B4-BE49-F238E27FC236}">
-                <a16:creationId xmlns:a16="http://schemas.microsoft.com/office/drawing/2014/main" xmlns="" id="{D73E8D94-FBD2-42D8-8C22-2DF1BEA7B876}"/>
+                <a16:creationId xmlns="" xmlns:a16="http://schemas.microsoft.com/office/drawing/2014/main" id="{D73E8D94-FBD2-42D8-8C22-2DF1BEA7B876}"/>
               </a:ext>
             </a:extLst>
           </p:cNvPr>
@@ -28689,7 +28728,7 @@
           <p:cNvPr id="22" name="Slide Number Placeholder 4">
             <a:extLst>
               <a:ext uri="{FF2B5EF4-FFF2-40B4-BE49-F238E27FC236}">
-                <a16:creationId xmlns:a16="http://schemas.microsoft.com/office/drawing/2014/main" xmlns="" id="{407C5DBA-81E3-46DF-8D2B-DDE0075CEFD3}"/>
+                <a16:creationId xmlns="" xmlns:a16="http://schemas.microsoft.com/office/drawing/2014/main" id="{407C5DBA-81E3-46DF-8D2B-DDE0075CEFD3}"/>
               </a:ext>
             </a:extLst>
           </p:cNvPr>

</xml_diff>

<commit_message>
Fixed a broken URL
</commit_message>
<xml_diff>
--- a/presentations/Intel-Strategy-and-Dev-Program-for-IIoT.pptx
+++ b/presentations/Intel-Strategy-and-Dev-Program-for-IIoT.pptx
@@ -21,7 +21,7 @@
     <p:sldId id="309" r:id="rId12"/>
   </p:sldIdLst>
   <p:sldSz cx="12192000" cy="6858000"/>
-  <p:notesSz cx="6894513" cy="9180513"/>
+  <p:notesSz cx="7010400" cy="9296400"/>
   <p:defaultTextStyle>
     <a:defPPr>
       <a:defRPr lang="en-US"/>
@@ -4375,14 +4375,14 @@
         <p:spPr>
           <a:xfrm>
             <a:off x="0" y="0"/>
-            <a:ext cx="2987622" cy="460620"/>
+            <a:ext cx="3037840" cy="466434"/>
           </a:xfrm>
           <a:prstGeom prst="rect">
             <a:avLst/>
           </a:prstGeom>
         </p:spPr>
         <p:txBody>
-          <a:bodyPr vert="horz" lIns="91851" tIns="45926" rIns="91851" bIns="45926" rtlCol="0"/>
+          <a:bodyPr vert="horz" lIns="93174" tIns="46587" rIns="93174" bIns="46587" rtlCol="0"/>
           <a:lstStyle>
             <a:lvl1pPr algn="l">
               <a:defRPr sz="1200"/>
@@ -4405,15 +4405,15 @@
         </p:nvSpPr>
         <p:spPr>
           <a:xfrm>
-            <a:off x="3905295" y="0"/>
-            <a:ext cx="2987622" cy="460620"/>
+            <a:off x="3970937" y="0"/>
+            <a:ext cx="3037840" cy="466434"/>
           </a:xfrm>
           <a:prstGeom prst="rect">
             <a:avLst/>
           </a:prstGeom>
         </p:spPr>
         <p:txBody>
-          <a:bodyPr vert="horz" lIns="91851" tIns="45926" rIns="91851" bIns="45926" rtlCol="0"/>
+          <a:bodyPr vert="horz" lIns="93174" tIns="46587" rIns="93174" bIns="46587" rtlCol="0"/>
           <a:lstStyle>
             <a:lvl1pPr algn="r">
               <a:defRPr sz="1200"/>
@@ -4422,7 +4422,7 @@
           <a:p>
             <a:fld id="{D58FB21C-80EC-1145-BD26-ACCE9066C53F}" type="datetimeFigureOut">
               <a:rPr lang="en-US" smtClean="0"/>
-              <a:t>9/6/2018</a:t>
+              <a:t>9/14/2018</a:t>
             </a:fld>
             <a:endParaRPr lang="en-US" dirty="0"/>
           </a:p>
@@ -4440,8 +4440,8 @@
         </p:nvSpPr>
         <p:spPr>
           <a:xfrm>
-            <a:off x="692150" y="1147763"/>
-            <a:ext cx="5510213" cy="3098800"/>
+            <a:off x="715963" y="1162050"/>
+            <a:ext cx="5578475" cy="3138488"/>
           </a:xfrm>
           <a:prstGeom prst="rect">
             <a:avLst/>
@@ -4454,7 +4454,7 @@
           </a:ln>
         </p:spPr>
         <p:txBody>
-          <a:bodyPr vert="horz" lIns="91851" tIns="45926" rIns="91851" bIns="45926" rtlCol="0" anchor="ctr"/>
+          <a:bodyPr vert="horz" lIns="93174" tIns="46587" rIns="93174" bIns="46587" rtlCol="0" anchor="ctr"/>
           <a:lstStyle/>
           <a:p>
             <a:endParaRPr lang="en-US" dirty="0"/>
@@ -4473,15 +4473,15 @@
         </p:nvSpPr>
         <p:spPr>
           <a:xfrm>
-            <a:off x="689452" y="4418122"/>
-            <a:ext cx="5515610" cy="3614827"/>
+            <a:off x="701041" y="4473893"/>
+            <a:ext cx="5608320" cy="3660458"/>
           </a:xfrm>
           <a:prstGeom prst="rect">
             <a:avLst/>
           </a:prstGeom>
         </p:spPr>
         <p:txBody>
-          <a:bodyPr vert="horz" lIns="91851" tIns="45926" rIns="91851" bIns="45926" rtlCol="0"/>
+          <a:bodyPr vert="horz" lIns="93174" tIns="46587" rIns="93174" bIns="46587" rtlCol="0"/>
           <a:lstStyle/>
           <a:p>
             <a:pPr lvl="0"/>
@@ -4532,15 +4532,15 @@
         </p:nvSpPr>
         <p:spPr>
           <a:xfrm>
-            <a:off x="0" y="8719895"/>
-            <a:ext cx="2987622" cy="460619"/>
+            <a:off x="0" y="8829968"/>
+            <a:ext cx="3037840" cy="466433"/>
           </a:xfrm>
           <a:prstGeom prst="rect">
             <a:avLst/>
           </a:prstGeom>
         </p:spPr>
         <p:txBody>
-          <a:bodyPr vert="horz" lIns="91851" tIns="45926" rIns="91851" bIns="45926" rtlCol="0" anchor="b"/>
+          <a:bodyPr vert="horz" lIns="93174" tIns="46587" rIns="93174" bIns="46587" rtlCol="0" anchor="b"/>
           <a:lstStyle>
             <a:lvl1pPr algn="l">
               <a:defRPr sz="1200"/>
@@ -4563,15 +4563,15 @@
         </p:nvSpPr>
         <p:spPr>
           <a:xfrm>
-            <a:off x="3905295" y="8719895"/>
-            <a:ext cx="2987622" cy="460619"/>
+            <a:off x="3970937" y="8829968"/>
+            <a:ext cx="3037840" cy="466433"/>
           </a:xfrm>
           <a:prstGeom prst="rect">
             <a:avLst/>
           </a:prstGeom>
         </p:spPr>
         <p:txBody>
-          <a:bodyPr vert="horz" lIns="91851" tIns="45926" rIns="91851" bIns="45926" rtlCol="0" anchor="b"/>
+          <a:bodyPr vert="horz" lIns="93174" tIns="46587" rIns="93174" bIns="46587" rtlCol="0" anchor="b"/>
           <a:lstStyle>
             <a:lvl1pPr algn="r">
               <a:defRPr sz="1200"/>
@@ -4733,9 +4733,9 @@
           <a:bodyPr/>
           <a:lstStyle/>
           <a:p>
-            <a:pPr defTabSz="1243630" eaLnBrk="0" fontAlgn="base" hangingPunct="0">
+            <a:pPr defTabSz="1261538" eaLnBrk="0" fontAlgn="base" hangingPunct="0">
               <a:spcBef>
-                <a:spcPts val="817"/>
+                <a:spcPts val="829"/>
               </a:spcBef>
             </a:pPr>
             <a:endParaRPr lang="en-US" dirty="0"/>
@@ -4757,7 +4757,7 @@
           <a:bodyPr/>
           <a:lstStyle/>
           <a:p>
-            <a:pPr defTabSz="918515">
+            <a:pPr defTabSz="931742">
               <a:defRPr/>
             </a:pPr>
             <a:fld id="{907FB027-EC75-4E10-8A74-6EA12FDCB880}" type="slidenum">
@@ -4767,7 +4767,7 @@
                 </a:solidFill>
                 <a:latin typeface="Arial"/>
               </a:rPr>
-              <a:pPr defTabSz="918515">
+              <a:pPr defTabSz="931742">
                 <a:defRPr/>
               </a:pPr>
               <a:t>1</a:t>
@@ -5034,7 +5034,7 @@
           <a:bodyPr/>
           <a:lstStyle/>
           <a:p>
-            <a:pPr defTabSz="918515">
+            <a:pPr defTabSz="931742">
               <a:defRPr/>
             </a:pPr>
             <a:fld id="{B1683E88-F191-4F69-A29D-62A3EA806C18}" type="slidenum">
@@ -5044,7 +5044,7 @@
                 </a:solidFill>
                 <a:latin typeface="Arial"/>
               </a:rPr>
-              <a:pPr defTabSz="918515">
+              <a:pPr defTabSz="931742">
                 <a:defRPr/>
               </a:pPr>
               <a:t>2</a:t>
@@ -5132,7 +5132,7 @@
             </a:endParaRPr>
           </a:p>
           <a:p>
-            <a:pPr defTabSz="922648">
+            <a:pPr defTabSz="935934">
               <a:defRPr/>
             </a:pPr>
             <a:r>
@@ -5145,7 +5145,7 @@
             </a:r>
           </a:p>
           <a:p>
-            <a:pPr defTabSz="922648">
+            <a:pPr defTabSz="935934">
               <a:defRPr/>
             </a:pPr>
             <a:endParaRPr lang="en-US" dirty="0">
@@ -5155,7 +5155,7 @@
             </a:endParaRPr>
           </a:p>
           <a:p>
-            <a:pPr defTabSz="922648">
+            <a:pPr defTabSz="935934">
               <a:defRPr/>
             </a:pPr>
             <a:r>
@@ -5185,7 +5185,7 @@
             </a:r>
           </a:p>
           <a:p>
-            <a:pPr defTabSz="918515">
+            <a:pPr defTabSz="931742">
               <a:defRPr/>
             </a:pPr>
             <a:endParaRPr lang="en-US" dirty="0">
@@ -5195,7 +5195,7 @@
             </a:endParaRPr>
           </a:p>
           <a:p>
-            <a:pPr defTabSz="918515">
+            <a:pPr defTabSz="931742">
               <a:defRPr/>
             </a:pPr>
             <a:r>
@@ -5208,7 +5208,7 @@
             </a:r>
           </a:p>
           <a:p>
-            <a:pPr defTabSz="918515">
+            <a:pPr defTabSz="931742">
               <a:defRPr/>
             </a:pPr>
             <a:endParaRPr lang="en-US" b="1" dirty="0">
@@ -5218,7 +5218,7 @@
             </a:endParaRPr>
           </a:p>
           <a:p>
-            <a:pPr defTabSz="918515">
+            <a:pPr defTabSz="931742">
               <a:defRPr/>
             </a:pPr>
             <a:endParaRPr lang="en-US" dirty="0">
@@ -5309,7 +5309,7 @@
           <a:bodyPr/>
           <a:lstStyle/>
           <a:p>
-            <a:pPr defTabSz="922648">
+            <a:pPr defTabSz="935934">
               <a:defRPr/>
             </a:pPr>
             <a:r>
@@ -5318,13 +5318,13 @@
             </a:r>
           </a:p>
           <a:p>
-            <a:pPr defTabSz="922648">
+            <a:pPr defTabSz="935934">
               <a:defRPr/>
             </a:pPr>
             <a:endParaRPr lang="en-US" dirty="0"/>
           </a:p>
           <a:p>
-            <a:pPr defTabSz="922648">
+            <a:pPr defTabSz="935934">
               <a:defRPr/>
             </a:pPr>
             <a:r>
@@ -5333,13 +5333,13 @@
             </a:r>
           </a:p>
           <a:p>
-            <a:pPr defTabSz="922648">
+            <a:pPr defTabSz="935934">
               <a:defRPr/>
             </a:pPr>
             <a:endParaRPr lang="en-US" dirty="0"/>
           </a:p>
           <a:p>
-            <a:pPr defTabSz="922648">
+            <a:pPr defTabSz="935934">
               <a:defRPr/>
             </a:pPr>
             <a:r>
@@ -5348,13 +5348,13 @@
             </a:r>
           </a:p>
           <a:p>
-            <a:pPr defTabSz="922648">
+            <a:pPr defTabSz="935934">
               <a:defRPr/>
             </a:pPr>
             <a:endParaRPr lang="en-US" dirty="0"/>
           </a:p>
           <a:p>
-            <a:pPr defTabSz="922648">
+            <a:pPr defTabSz="935934">
               <a:defRPr/>
             </a:pPr>
             <a:r>
@@ -5363,13 +5363,13 @@
             </a:r>
           </a:p>
           <a:p>
-            <a:pPr defTabSz="922648">
+            <a:pPr defTabSz="935934">
               <a:defRPr/>
             </a:pPr>
             <a:endParaRPr lang="en-US" dirty="0"/>
           </a:p>
           <a:p>
-            <a:pPr defTabSz="922648">
+            <a:pPr defTabSz="935934">
               <a:defRPr/>
             </a:pPr>
             <a:r>
@@ -5378,13 +5378,13 @@
             </a:r>
           </a:p>
           <a:p>
-            <a:pPr defTabSz="922648">
+            <a:pPr defTabSz="935934">
               <a:defRPr/>
             </a:pPr>
             <a:endParaRPr lang="en-US" dirty="0"/>
           </a:p>
           <a:p>
-            <a:pPr defTabSz="922648">
+            <a:pPr defTabSz="935934">
               <a:defRPr/>
             </a:pPr>
             <a:r>
@@ -5393,7 +5393,7 @@
             </a:r>
           </a:p>
           <a:p>
-            <a:pPr defTabSz="922648">
+            <a:pPr defTabSz="935934">
               <a:defRPr/>
             </a:pPr>
             <a:endParaRPr lang="en-US" dirty="0"/>
@@ -5421,7 +5421,7 @@
           <a:bodyPr/>
           <a:lstStyle/>
           <a:p>
-            <a:pPr defTabSz="918515">
+            <a:pPr defTabSz="931742">
               <a:defRPr/>
             </a:pPr>
             <a:fld id="{E13FB3FA-C830-445B-A142-1E421B2C8A7E}" type="slidenum">
@@ -5431,7 +5431,7 @@
                 </a:solidFill>
                 <a:latin typeface="Arial"/>
               </a:rPr>
-              <a:pPr defTabSz="918515">
+              <a:pPr defTabSz="931742">
                 <a:defRPr/>
               </a:pPr>
               <a:t>4</a:t>
@@ -5511,7 +5511,7 @@
             <a:endParaRPr lang="en-US" dirty="0"/>
           </a:p>
           <a:p>
-            <a:pPr marL="172222" indent="-172222">
+            <a:pPr marL="174702" indent="-174702">
               <a:buFont typeface="Arial" panose="020B0604020202020204" pitchFamily="34" charset="0"/>
               <a:buChar char="•"/>
             </a:pPr>
@@ -5521,7 +5521,7 @@
             </a:r>
           </a:p>
           <a:p>
-            <a:pPr marL="172222" indent="-172222">
+            <a:pPr marL="174702" indent="-174702">
               <a:buFont typeface="Arial" panose="020B0604020202020204" pitchFamily="34" charset="0"/>
               <a:buChar char="•"/>
             </a:pPr>
@@ -5531,7 +5531,7 @@
             </a:r>
           </a:p>
           <a:p>
-            <a:pPr marL="172222" indent="-172222">
+            <a:pPr marL="174702" indent="-174702">
               <a:buFont typeface="Arial" panose="020B0604020202020204" pitchFamily="34" charset="0"/>
               <a:buChar char="•"/>
             </a:pPr>
@@ -5545,7 +5545,7 @@
             </a:r>
           </a:p>
           <a:p>
-            <a:pPr marL="172222" indent="-172222">
+            <a:pPr marL="174702" indent="-174702">
               <a:buFont typeface="Arial" panose="020B0604020202020204" pitchFamily="34" charset="0"/>
               <a:buChar char="•"/>
             </a:pPr>
@@ -5559,7 +5559,7 @@
             </a:r>
           </a:p>
           <a:p>
-            <a:pPr marL="172222" indent="-172222">
+            <a:pPr marL="174702" indent="-174702">
               <a:buFont typeface="Arial" panose="020B0604020202020204" pitchFamily="34" charset="0"/>
               <a:buChar char="•"/>
             </a:pPr>
@@ -5609,7 +5609,7 @@
           <a:bodyPr/>
           <a:lstStyle/>
           <a:p>
-            <a:pPr defTabSz="918515">
+            <a:pPr defTabSz="931742">
               <a:defRPr/>
             </a:pPr>
             <a:fld id="{B300C0B2-ACA4-4BD9-906B-4A182183C3D1}" type="slidenum">
@@ -5619,7 +5619,7 @@
                 </a:solidFill>
                 <a:latin typeface="Arial"/>
               </a:rPr>
-              <a:pPr defTabSz="918515">
+              <a:pPr defTabSz="931742">
                 <a:defRPr/>
               </a:pPr>
               <a:t>5</a:t>
@@ -5775,7 +5775,7 @@
           <a:bodyPr/>
           <a:lstStyle/>
           <a:p>
-            <a:pPr defTabSz="918515">
+            <a:pPr defTabSz="931742">
               <a:defRPr/>
             </a:pPr>
             <a:fld id="{E13FB3FA-C830-445B-A142-1E421B2C8A7E}" type="slidenum">
@@ -5785,7 +5785,7 @@
                 </a:solidFill>
                 <a:latin typeface="Arial"/>
               </a:rPr>
-              <a:pPr defTabSz="918515">
+              <a:pPr defTabSz="931742">
                 <a:defRPr/>
               </a:pPr>
               <a:t>6</a:t>
@@ -6017,7 +6017,7 @@
             <a:endParaRPr lang="en-US" b="1" dirty="0"/>
           </a:p>
           <a:p>
-            <a:pPr defTabSz="918515"/>
+            <a:pPr defTabSz="931742"/>
             <a:r>
               <a:rPr lang="en-US" dirty="0"/>
               <a:t>“A definite improvement over previous Intel products, which I heard were difficult to get up and running</a:t>
@@ -6039,11 +6039,11 @@
             </a:r>
           </a:p>
           <a:p>
-            <a:pPr defTabSz="918515"/>
+            <a:pPr defTabSz="931742"/>
             <a:endParaRPr lang="en-US" i="1" dirty="0"/>
           </a:p>
           <a:p>
-            <a:pPr defTabSz="918515"/>
+            <a:pPr defTabSz="931742"/>
             <a:r>
               <a:rPr lang="en-US" dirty="0"/>
               <a:t>“Once I can see what the device can do [*the CV Sample], I get really motivated to get to do and surpass the level”</a:t>
@@ -6057,11 +6057,11 @@
             </a:r>
           </a:p>
           <a:p>
-            <a:pPr defTabSz="918515"/>
+            <a:pPr defTabSz="931742"/>
             <a:endParaRPr lang="en-US" i="1" dirty="0"/>
           </a:p>
           <a:p>
-            <a:pPr defTabSz="918515"/>
+            <a:pPr defTabSz="931742"/>
             <a:r>
               <a:rPr lang="en-US" dirty="0"/>
               <a:t>“It was a lot simpler than my prior experiences with hardware, which is why I decided to go for software (professionally), very satisfied</a:t>
@@ -6083,22 +6083,22 @@
             </a:r>
           </a:p>
           <a:p>
-            <a:pPr defTabSz="918515"/>
+            <a:pPr defTabSz="931742"/>
             <a:endParaRPr lang="en-US" i="1" dirty="0"/>
           </a:p>
           <a:p>
-            <a:pPr defTabSz="918515"/>
+            <a:pPr defTabSz="931742"/>
             <a:r>
               <a:rPr lang="en-US" b="1" dirty="0"/>
               <a:t>User Results at EW Workshop:</a:t>
             </a:r>
           </a:p>
           <a:p>
-            <a:pPr defTabSz="918515"/>
+            <a:pPr defTabSz="931742"/>
             <a:endParaRPr lang="en-US" i="1" dirty="0"/>
           </a:p>
           <a:p>
-            <a:pPr defTabSz="612328"/>
+            <a:pPr defTabSz="621146"/>
             <a:r>
               <a:rPr lang="en-US" b="1" dirty="0">
                 <a:latin typeface="Intel Clear" panose="020B0604020203020204" pitchFamily="34" charset="0"/>
@@ -6133,7 +6133,7 @@
             </a:r>
           </a:p>
           <a:p>
-            <a:pPr defTabSz="612328"/>
+            <a:pPr defTabSz="621146"/>
             <a:r>
               <a:rPr lang="en-US" dirty="0">
                 <a:latin typeface="Intel Clear" panose="020B0604020203020204" pitchFamily="34" charset="0"/>
@@ -6152,11 +6152,11 @@
             </a:r>
           </a:p>
           <a:p>
-            <a:pPr defTabSz="918515"/>
+            <a:pPr defTabSz="931742"/>
             <a:endParaRPr lang="en-US" i="1" dirty="0"/>
           </a:p>
           <a:p>
-            <a:pPr defTabSz="918515"/>
+            <a:pPr defTabSz="931742"/>
             <a:endParaRPr lang="en-US" i="1" dirty="0"/>
           </a:p>
           <a:p>
@@ -6188,7 +6188,7 @@
           <a:bodyPr/>
           <a:lstStyle/>
           <a:p>
-            <a:pPr defTabSz="918515">
+            <a:pPr defTabSz="931742">
               <a:defRPr/>
             </a:pPr>
             <a:fld id="{E13FB3FA-C830-445B-A142-1E421B2C8A7E}" type="slidenum">
@@ -6198,7 +6198,7 @@
                 </a:solidFill>
                 <a:latin typeface="Arial"/>
               </a:rPr>
-              <a:pPr defTabSz="918515">
+              <a:pPr defTabSz="931742">
                 <a:defRPr/>
               </a:pPr>
               <a:t>7</a:t>
@@ -6451,7 +6451,7 @@
           <a:bodyPr/>
           <a:lstStyle/>
           <a:p>
-            <a:pPr defTabSz="918515">
+            <a:pPr defTabSz="931742">
               <a:defRPr/>
             </a:pPr>
             <a:fld id="{E13FB3FA-C830-445B-A142-1E421B2C8A7E}" type="slidenum">
@@ -6461,7 +6461,7 @@
                 </a:solidFill>
                 <a:latin typeface="Arial"/>
               </a:rPr>
-              <a:pPr defTabSz="918515">
+              <a:pPr defTabSz="931742">
                 <a:defRPr/>
               </a:pPr>
               <a:t>8</a:t>
@@ -6550,7 +6550,7 @@
             <a:endParaRPr lang="en-US" dirty="0"/>
           </a:p>
           <a:p>
-            <a:pPr marL="172222" indent="-172222">
+            <a:pPr marL="174702" indent="-174702">
               <a:buFont typeface="Arial" panose="020B0604020202020204" pitchFamily="34" charset="0"/>
               <a:buChar char="•"/>
             </a:pPr>
@@ -6560,14 +6560,14 @@
             </a:r>
           </a:p>
           <a:p>
-            <a:pPr marL="172222" indent="-172222">
+            <a:pPr marL="174702" indent="-174702">
               <a:buFont typeface="Arial" panose="020B0604020202020204" pitchFamily="34" charset="0"/>
               <a:buChar char="•"/>
             </a:pPr>
             <a:endParaRPr lang="en-US" dirty="0"/>
           </a:p>
           <a:p>
-            <a:pPr marL="172222" indent="-172222">
+            <a:pPr marL="174702" indent="-174702">
               <a:buFont typeface="Arial" panose="020B0604020202020204" pitchFamily="34" charset="0"/>
               <a:buChar char="•"/>
             </a:pPr>
@@ -6577,14 +6577,14 @@
             </a:r>
           </a:p>
           <a:p>
-            <a:pPr marL="172222" indent="-172222">
+            <a:pPr marL="174702" indent="-174702">
               <a:buFont typeface="Arial" panose="020B0604020202020204" pitchFamily="34" charset="0"/>
               <a:buChar char="•"/>
             </a:pPr>
             <a:endParaRPr lang="en-US" dirty="0"/>
           </a:p>
           <a:p>
-            <a:pPr marL="172222" indent="-172222">
+            <a:pPr marL="174702" indent="-174702">
               <a:buFont typeface="Arial" panose="020B0604020202020204" pitchFamily="34" charset="0"/>
               <a:buChar char="•"/>
             </a:pPr>
@@ -6619,7 +6619,7 @@
           <a:bodyPr/>
           <a:lstStyle/>
           <a:p>
-            <a:pPr defTabSz="918515">
+            <a:pPr defTabSz="931742">
               <a:defRPr/>
             </a:pPr>
             <a:fld id="{905880A2-B34E-4B2D-A642-495C374BCEFE}" type="slidenum">
@@ -6629,7 +6629,7 @@
                 </a:solidFill>
                 <a:latin typeface="Arial"/>
               </a:rPr>
-              <a:pPr defTabSz="918515">
+              <a:pPr defTabSz="931742">
                 <a:defRPr/>
               </a:pPr>
               <a:t>9</a:t>
@@ -17022,7 +17022,7 @@
           <p:cNvPr id="2" name="Title 1">
             <a:extLst>
               <a:ext uri="{FF2B5EF4-FFF2-40B4-BE49-F238E27FC236}">
-                <a16:creationId xmlns="" xmlns:a16="http://schemas.microsoft.com/office/drawing/2014/main" id="{E4C28C6B-778E-EC49-A80B-7413D44B7BAF}"/>
+                <a16:creationId xmlns:a16="http://schemas.microsoft.com/office/drawing/2014/main" xmlns="" id="{E4C28C6B-778E-EC49-A80B-7413D44B7BAF}"/>
               </a:ext>
             </a:extLst>
           </p:cNvPr>
@@ -17055,7 +17055,7 @@
           <p:cNvPr id="5" name="Slide Number Placeholder 4">
             <a:extLst>
               <a:ext uri="{FF2B5EF4-FFF2-40B4-BE49-F238E27FC236}">
-                <a16:creationId xmlns="" xmlns:a16="http://schemas.microsoft.com/office/drawing/2014/main" id="{731A5867-21D5-7047-81DA-28F21F1EF8F1}"/>
+                <a16:creationId xmlns:a16="http://schemas.microsoft.com/office/drawing/2014/main" xmlns="" id="{731A5867-21D5-7047-81DA-28F21F1EF8F1}"/>
               </a:ext>
             </a:extLst>
           </p:cNvPr>
@@ -17122,7 +17122,7 @@
           <p:cNvPr id="32" name="Group 31">
             <a:extLst>
               <a:ext uri="{FF2B5EF4-FFF2-40B4-BE49-F238E27FC236}">
-                <a16:creationId xmlns="" xmlns:a16="http://schemas.microsoft.com/office/drawing/2014/main" id="{0C1ADFB6-10A1-4EFC-97AC-2B63DDD07356}"/>
+                <a16:creationId xmlns:a16="http://schemas.microsoft.com/office/drawing/2014/main" xmlns="" id="{0C1ADFB6-10A1-4EFC-97AC-2B63DDD07356}"/>
               </a:ext>
             </a:extLst>
           </p:cNvPr>
@@ -17227,7 +17227,7 @@
             <p:cNvPr id="3" name="Rectangle 2">
               <a:extLst>
                 <a:ext uri="{FF2B5EF4-FFF2-40B4-BE49-F238E27FC236}">
-                  <a16:creationId xmlns="" xmlns:a16="http://schemas.microsoft.com/office/drawing/2014/main" id="{E2B5B2E2-4BA4-4BA7-A6D1-AEE5CC8E4DEF}"/>
+                  <a16:creationId xmlns:a16="http://schemas.microsoft.com/office/drawing/2014/main" xmlns="" id="{E2B5B2E2-4BA4-4BA7-A6D1-AEE5CC8E4DEF}"/>
                 </a:ext>
               </a:extLst>
             </p:cNvPr>
@@ -17276,7 +17276,7 @@
           <p:cNvPr id="33" name="Group 32">
             <a:extLst>
               <a:ext uri="{FF2B5EF4-FFF2-40B4-BE49-F238E27FC236}">
-                <a16:creationId xmlns="" xmlns:a16="http://schemas.microsoft.com/office/drawing/2014/main" id="{6A1CD87A-E9AE-4A01-B360-1F9BC6481B16}"/>
+                <a16:creationId xmlns:a16="http://schemas.microsoft.com/office/drawing/2014/main" xmlns="" id="{6A1CD87A-E9AE-4A01-B360-1F9BC6481B16}"/>
               </a:ext>
             </a:extLst>
           </p:cNvPr>
@@ -17330,7 +17330,7 @@
             <p:cNvPr id="18" name="Picture 17">
               <a:extLst>
                 <a:ext uri="{FF2B5EF4-FFF2-40B4-BE49-F238E27FC236}">
-                  <a16:creationId xmlns="" xmlns:a16="http://schemas.microsoft.com/office/drawing/2014/main" id="{65849AD0-D6DA-5444-AB0D-539B8B0B9021}"/>
+                  <a16:creationId xmlns:a16="http://schemas.microsoft.com/office/drawing/2014/main" xmlns="" id="{65849AD0-D6DA-5444-AB0D-539B8B0B9021}"/>
                 </a:ext>
               </a:extLst>
             </p:cNvPr>
@@ -17393,7 +17393,7 @@
             <p:cNvPr id="4" name="Rectangle 3">
               <a:extLst>
                 <a:ext uri="{FF2B5EF4-FFF2-40B4-BE49-F238E27FC236}">
-                  <a16:creationId xmlns="" xmlns:a16="http://schemas.microsoft.com/office/drawing/2014/main" id="{BA23FE24-9C6B-40DD-B22B-7E87069340A0}"/>
+                  <a16:creationId xmlns:a16="http://schemas.microsoft.com/office/drawing/2014/main" xmlns="" id="{BA23FE24-9C6B-40DD-B22B-7E87069340A0}"/>
                 </a:ext>
               </a:extLst>
             </p:cNvPr>
@@ -17433,7 +17433,7 @@
           <p:cNvPr id="34" name="Group 33">
             <a:extLst>
               <a:ext uri="{FF2B5EF4-FFF2-40B4-BE49-F238E27FC236}">
-                <a16:creationId xmlns="" xmlns:a16="http://schemas.microsoft.com/office/drawing/2014/main" id="{56D98D5C-2EA7-44D8-84A3-2BEAD1D5199F}"/>
+                <a16:creationId xmlns:a16="http://schemas.microsoft.com/office/drawing/2014/main" xmlns="" id="{56D98D5C-2EA7-44D8-84A3-2BEAD1D5199F}"/>
               </a:ext>
             </a:extLst>
           </p:cNvPr>
@@ -17535,7 +17535,7 @@
             <p:cNvPr id="6" name="Rectangle 5">
               <a:extLst>
                 <a:ext uri="{FF2B5EF4-FFF2-40B4-BE49-F238E27FC236}">
-                  <a16:creationId xmlns="" xmlns:a16="http://schemas.microsoft.com/office/drawing/2014/main" id="{C9E68FB0-9191-4C59-95BD-26E1DB963CEC}"/>
+                  <a16:creationId xmlns:a16="http://schemas.microsoft.com/office/drawing/2014/main" xmlns="" id="{C9E68FB0-9191-4C59-95BD-26E1DB963CEC}"/>
                 </a:ext>
               </a:extLst>
             </p:cNvPr>
@@ -17586,7 +17586,7 @@
           <p:cNvPr id="35" name="Group 34">
             <a:extLst>
               <a:ext uri="{FF2B5EF4-FFF2-40B4-BE49-F238E27FC236}">
-                <a16:creationId xmlns="" xmlns:a16="http://schemas.microsoft.com/office/drawing/2014/main" id="{17A00012-937C-460B-B1B4-CF3606A12F8C}"/>
+                <a16:creationId xmlns:a16="http://schemas.microsoft.com/office/drawing/2014/main" xmlns="" id="{17A00012-937C-460B-B1B4-CF3606A12F8C}"/>
               </a:ext>
             </a:extLst>
           </p:cNvPr>
@@ -17697,7 +17697,7 @@
             <p:cNvPr id="8" name="Rectangle 7">
               <a:extLst>
                 <a:ext uri="{FF2B5EF4-FFF2-40B4-BE49-F238E27FC236}">
-                  <a16:creationId xmlns="" xmlns:a16="http://schemas.microsoft.com/office/drawing/2014/main" id="{05D9921D-7134-41FE-9C96-8B0D6FED7C68}"/>
+                  <a16:creationId xmlns:a16="http://schemas.microsoft.com/office/drawing/2014/main" xmlns="" id="{05D9921D-7134-41FE-9C96-8B0D6FED7C68}"/>
                 </a:ext>
               </a:extLst>
             </p:cNvPr>
@@ -18207,7 +18207,7 @@
           <p:cNvPr id="6" name="Slide Number Placeholder 4">
             <a:extLst>
               <a:ext uri="{FF2B5EF4-FFF2-40B4-BE49-F238E27FC236}">
-                <a16:creationId xmlns="" xmlns:a16="http://schemas.microsoft.com/office/drawing/2014/main" id="{A2CC5965-A810-4428-AF69-DDA19DFEF8BC}"/>
+                <a16:creationId xmlns:a16="http://schemas.microsoft.com/office/drawing/2014/main" xmlns="" id="{A2CC5965-A810-4428-AF69-DDA19DFEF8BC}"/>
               </a:ext>
             </a:extLst>
           </p:cNvPr>
@@ -18404,7 +18404,7 @@
           <p:cNvPr id="2" name="Title 1">
             <a:extLst>
               <a:ext uri="{FF2B5EF4-FFF2-40B4-BE49-F238E27FC236}">
-                <a16:creationId xmlns="" xmlns:a16="http://schemas.microsoft.com/office/drawing/2014/main" id="{FACF73CC-5842-B444-AA52-F8B2859561F6}"/>
+                <a16:creationId xmlns:a16="http://schemas.microsoft.com/office/drawing/2014/main" xmlns="" id="{FACF73CC-5842-B444-AA52-F8B2859561F6}"/>
               </a:ext>
             </a:extLst>
           </p:cNvPr>
@@ -18432,7 +18432,7 @@
           <p:cNvPr id="5" name="Slide Number Placeholder 4">
             <a:extLst>
               <a:ext uri="{FF2B5EF4-FFF2-40B4-BE49-F238E27FC236}">
-                <a16:creationId xmlns="" xmlns:a16="http://schemas.microsoft.com/office/drawing/2014/main" id="{4A9B822A-75E2-EE41-ACC5-79CAF32923C3}"/>
+                <a16:creationId xmlns:a16="http://schemas.microsoft.com/office/drawing/2014/main" xmlns="" id="{4A9B822A-75E2-EE41-ACC5-79CAF32923C3}"/>
               </a:ext>
             </a:extLst>
           </p:cNvPr>
@@ -18477,7 +18477,7 @@
           <p:cNvPr id="4" name="Arrow: Circular 3">
             <a:extLst>
               <a:ext uri="{FF2B5EF4-FFF2-40B4-BE49-F238E27FC236}">
-                <a16:creationId xmlns="" xmlns:a16="http://schemas.microsoft.com/office/drawing/2014/main" id="{EF1EFB53-1824-4F68-A0A2-4071EC20A426}"/>
+                <a16:creationId xmlns:a16="http://schemas.microsoft.com/office/drawing/2014/main" xmlns="" id="{EF1EFB53-1824-4F68-A0A2-4071EC20A426}"/>
               </a:ext>
             </a:extLst>
           </p:cNvPr>
@@ -18553,7 +18553,7 @@
           <p:cNvPr id="10" name="Arrow: Circular 9">
             <a:extLst>
               <a:ext uri="{FF2B5EF4-FFF2-40B4-BE49-F238E27FC236}">
-                <a16:creationId xmlns="" xmlns:a16="http://schemas.microsoft.com/office/drawing/2014/main" id="{799F586B-B4A1-45AA-99FA-C9342D2CA027}"/>
+                <a16:creationId xmlns:a16="http://schemas.microsoft.com/office/drawing/2014/main" xmlns="" id="{799F586B-B4A1-45AA-99FA-C9342D2CA027}"/>
               </a:ext>
             </a:extLst>
           </p:cNvPr>
@@ -18626,7 +18626,7 @@
           <p:cNvPr id="3" name="Group 2">
             <a:extLst>
               <a:ext uri="{FF2B5EF4-FFF2-40B4-BE49-F238E27FC236}">
-                <a16:creationId xmlns="" xmlns:a16="http://schemas.microsoft.com/office/drawing/2014/main" id="{2CA20B68-F42B-4E72-920D-4E780C3AEFCE}"/>
+                <a16:creationId xmlns:a16="http://schemas.microsoft.com/office/drawing/2014/main" xmlns="" id="{2CA20B68-F42B-4E72-920D-4E780C3AEFCE}"/>
               </a:ext>
             </a:extLst>
           </p:cNvPr>
@@ -18646,7 +18646,7 @@
             <p:cNvPr id="28" name="Oval 27">
               <a:extLst>
                 <a:ext uri="{FF2B5EF4-FFF2-40B4-BE49-F238E27FC236}">
-                  <a16:creationId xmlns="" xmlns:a16="http://schemas.microsoft.com/office/drawing/2014/main" id="{A545E8B5-DAAB-47F1-9F73-2F2E22116C43}"/>
+                  <a16:creationId xmlns:a16="http://schemas.microsoft.com/office/drawing/2014/main" xmlns="" id="{A545E8B5-DAAB-47F1-9F73-2F2E22116C43}"/>
                 </a:ext>
               </a:extLst>
             </p:cNvPr>
@@ -18700,7 +18700,7 @@
             <p:cNvPr id="31" name="TextBox 30">
               <a:extLst>
                 <a:ext uri="{FF2B5EF4-FFF2-40B4-BE49-F238E27FC236}">
-                  <a16:creationId xmlns="" xmlns:a16="http://schemas.microsoft.com/office/drawing/2014/main" id="{D0795A7D-58B0-498B-B9A1-B356623AC5AB}"/>
+                  <a16:creationId xmlns:a16="http://schemas.microsoft.com/office/drawing/2014/main" xmlns="" id="{D0795A7D-58B0-498B-B9A1-B356623AC5AB}"/>
                 </a:ext>
               </a:extLst>
             </p:cNvPr>
@@ -18756,7 +18756,7 @@
           <p:cNvPr id="6" name="Group 5">
             <a:extLst>
               <a:ext uri="{FF2B5EF4-FFF2-40B4-BE49-F238E27FC236}">
-                <a16:creationId xmlns="" xmlns:a16="http://schemas.microsoft.com/office/drawing/2014/main" id="{0E33E798-E2B8-4C48-9680-D4FC46417087}"/>
+                <a16:creationId xmlns:a16="http://schemas.microsoft.com/office/drawing/2014/main" xmlns="" id="{0E33E798-E2B8-4C48-9680-D4FC46417087}"/>
               </a:ext>
             </a:extLst>
           </p:cNvPr>
@@ -18776,7 +18776,7 @@
             <p:cNvPr id="23" name="Oval 22">
               <a:extLst>
                 <a:ext uri="{FF2B5EF4-FFF2-40B4-BE49-F238E27FC236}">
-                  <a16:creationId xmlns="" xmlns:a16="http://schemas.microsoft.com/office/drawing/2014/main" id="{1BEE176C-3D1C-4829-A579-F432414F9AEB}"/>
+                  <a16:creationId xmlns:a16="http://schemas.microsoft.com/office/drawing/2014/main" xmlns="" id="{1BEE176C-3D1C-4829-A579-F432414F9AEB}"/>
                 </a:ext>
               </a:extLst>
             </p:cNvPr>
@@ -18830,7 +18830,7 @@
             <p:cNvPr id="32" name="TextBox 31">
               <a:extLst>
                 <a:ext uri="{FF2B5EF4-FFF2-40B4-BE49-F238E27FC236}">
-                  <a16:creationId xmlns="" xmlns:a16="http://schemas.microsoft.com/office/drawing/2014/main" id="{3038B85C-D2C8-473C-9328-AA625BC93DEB}"/>
+                  <a16:creationId xmlns:a16="http://schemas.microsoft.com/office/drawing/2014/main" xmlns="" id="{3038B85C-D2C8-473C-9328-AA625BC93DEB}"/>
                 </a:ext>
               </a:extLst>
             </p:cNvPr>
@@ -18871,7 +18871,7 @@
           <p:cNvPr id="35" name="TextBox 34">
             <a:extLst>
               <a:ext uri="{FF2B5EF4-FFF2-40B4-BE49-F238E27FC236}">
-                <a16:creationId xmlns="" xmlns:a16="http://schemas.microsoft.com/office/drawing/2014/main" id="{37362E30-01EF-46F0-88B0-051F1BCFDE28}"/>
+                <a16:creationId xmlns:a16="http://schemas.microsoft.com/office/drawing/2014/main" xmlns="" id="{37362E30-01EF-46F0-88B0-051F1BCFDE28}"/>
               </a:ext>
             </a:extLst>
           </p:cNvPr>
@@ -18918,7 +18918,7 @@
           <p:cNvPr id="47" name="TextBox 46">
             <a:extLst>
               <a:ext uri="{FF2B5EF4-FFF2-40B4-BE49-F238E27FC236}">
-                <a16:creationId xmlns="" xmlns:a16="http://schemas.microsoft.com/office/drawing/2014/main" id="{2F1F5975-B535-4B80-B36D-F35B520EDDFC}"/>
+                <a16:creationId xmlns:a16="http://schemas.microsoft.com/office/drawing/2014/main" xmlns="" id="{2F1F5975-B535-4B80-B36D-F35B520EDDFC}"/>
               </a:ext>
             </a:extLst>
           </p:cNvPr>
@@ -19011,7 +19011,7 @@
           <p:cNvPr id="37" name="Group 36">
             <a:extLst>
               <a:ext uri="{FF2B5EF4-FFF2-40B4-BE49-F238E27FC236}">
-                <a16:creationId xmlns="" xmlns:a16="http://schemas.microsoft.com/office/drawing/2014/main" id="{13487262-9949-42AE-92DC-C9EE9AE07FDD}"/>
+                <a16:creationId xmlns:a16="http://schemas.microsoft.com/office/drawing/2014/main" xmlns="" id="{13487262-9949-42AE-92DC-C9EE9AE07FDD}"/>
               </a:ext>
             </a:extLst>
           </p:cNvPr>
@@ -19031,7 +19031,7 @@
             <p:cNvPr id="48" name="Oval 47">
               <a:extLst>
                 <a:ext uri="{FF2B5EF4-FFF2-40B4-BE49-F238E27FC236}">
-                  <a16:creationId xmlns="" xmlns:a16="http://schemas.microsoft.com/office/drawing/2014/main" id="{FA5EC9D7-D680-4577-BC49-336CB60B5AC2}"/>
+                  <a16:creationId xmlns:a16="http://schemas.microsoft.com/office/drawing/2014/main" xmlns="" id="{FA5EC9D7-D680-4577-BC49-336CB60B5AC2}"/>
                 </a:ext>
               </a:extLst>
             </p:cNvPr>
@@ -19085,7 +19085,7 @@
             <p:cNvPr id="49" name="TextBox 48">
               <a:extLst>
                 <a:ext uri="{FF2B5EF4-FFF2-40B4-BE49-F238E27FC236}">
-                  <a16:creationId xmlns="" xmlns:a16="http://schemas.microsoft.com/office/drawing/2014/main" id="{992B661E-5AA1-4642-82ED-D01D5ADB614B}"/>
+                  <a16:creationId xmlns:a16="http://schemas.microsoft.com/office/drawing/2014/main" xmlns="" id="{992B661E-5AA1-4642-82ED-D01D5ADB614B}"/>
                 </a:ext>
               </a:extLst>
             </p:cNvPr>
@@ -19130,7 +19130,7 @@
           <p:cNvPr id="50" name="TextBox 49">
             <a:extLst>
               <a:ext uri="{FF2B5EF4-FFF2-40B4-BE49-F238E27FC236}">
-                <a16:creationId xmlns="" xmlns:a16="http://schemas.microsoft.com/office/drawing/2014/main" id="{966223FD-18E7-46AA-B0FE-CB33B6DF04EF}"/>
+                <a16:creationId xmlns:a16="http://schemas.microsoft.com/office/drawing/2014/main" xmlns="" id="{966223FD-18E7-46AA-B0FE-CB33B6DF04EF}"/>
               </a:ext>
             </a:extLst>
           </p:cNvPr>
@@ -19170,7 +19170,7 @@
           <p:cNvPr id="51" name="Arrow: Circular 50">
             <a:extLst>
               <a:ext uri="{FF2B5EF4-FFF2-40B4-BE49-F238E27FC236}">
-                <a16:creationId xmlns="" xmlns:a16="http://schemas.microsoft.com/office/drawing/2014/main" id="{9B4FD1A2-B37A-4EFC-9E86-FB42ED0E33E5}"/>
+                <a16:creationId xmlns:a16="http://schemas.microsoft.com/office/drawing/2014/main" xmlns="" id="{9B4FD1A2-B37A-4EFC-9E86-FB42ED0E33E5}"/>
               </a:ext>
             </a:extLst>
           </p:cNvPr>
@@ -19232,7 +19232,7 @@
           <p:cNvPr id="52" name="TextBox 51">
             <a:extLst>
               <a:ext uri="{FF2B5EF4-FFF2-40B4-BE49-F238E27FC236}">
-                <a16:creationId xmlns="" xmlns:a16="http://schemas.microsoft.com/office/drawing/2014/main" id="{A9603462-3B71-454B-8AB8-210271D7E889}"/>
+                <a16:creationId xmlns:a16="http://schemas.microsoft.com/office/drawing/2014/main" xmlns="" id="{A9603462-3B71-454B-8AB8-210271D7E889}"/>
               </a:ext>
             </a:extLst>
           </p:cNvPr>
@@ -19276,7 +19276,7 @@
           <p:cNvPr id="53" name="Arrow: Circular 52">
             <a:extLst>
               <a:ext uri="{FF2B5EF4-FFF2-40B4-BE49-F238E27FC236}">
-                <a16:creationId xmlns="" xmlns:a16="http://schemas.microsoft.com/office/drawing/2014/main" id="{F82396A3-FB72-457A-8070-CF32B3F52D05}"/>
+                <a16:creationId xmlns:a16="http://schemas.microsoft.com/office/drawing/2014/main" xmlns="" id="{F82396A3-FB72-457A-8070-CF32B3F52D05}"/>
               </a:ext>
             </a:extLst>
           </p:cNvPr>
@@ -19347,7 +19347,7 @@
           <p:cNvPr id="54" name="TextBox 53">
             <a:extLst>
               <a:ext uri="{FF2B5EF4-FFF2-40B4-BE49-F238E27FC236}">
-                <a16:creationId xmlns="" xmlns:a16="http://schemas.microsoft.com/office/drawing/2014/main" id="{BB6563D8-71C0-4375-A53A-7B92BED6F2BA}"/>
+                <a16:creationId xmlns:a16="http://schemas.microsoft.com/office/drawing/2014/main" xmlns="" id="{BB6563D8-71C0-4375-A53A-7B92BED6F2BA}"/>
               </a:ext>
             </a:extLst>
           </p:cNvPr>
@@ -19391,7 +19391,7 @@
           <p:cNvPr id="55" name="TextBox 54">
             <a:extLst>
               <a:ext uri="{FF2B5EF4-FFF2-40B4-BE49-F238E27FC236}">
-                <a16:creationId xmlns="" xmlns:a16="http://schemas.microsoft.com/office/drawing/2014/main" id="{ADF7AD79-529A-4C9B-B501-D651746AE6E5}"/>
+                <a16:creationId xmlns:a16="http://schemas.microsoft.com/office/drawing/2014/main" xmlns="" id="{ADF7AD79-529A-4C9B-B501-D651746AE6E5}"/>
               </a:ext>
             </a:extLst>
           </p:cNvPr>
@@ -19435,7 +19435,7 @@
           <p:cNvPr id="27" name="Arrow: Circular 26">
             <a:extLst>
               <a:ext uri="{FF2B5EF4-FFF2-40B4-BE49-F238E27FC236}">
-                <a16:creationId xmlns="" xmlns:a16="http://schemas.microsoft.com/office/drawing/2014/main" id="{5E4E934E-5D83-4198-AA0B-F028CD47D915}"/>
+                <a16:creationId xmlns:a16="http://schemas.microsoft.com/office/drawing/2014/main" xmlns="" id="{5E4E934E-5D83-4198-AA0B-F028CD47D915}"/>
               </a:ext>
             </a:extLst>
           </p:cNvPr>
@@ -19499,7 +19499,7 @@
           <p:cNvPr id="29" name="TextBox 28">
             <a:extLst>
               <a:ext uri="{FF2B5EF4-FFF2-40B4-BE49-F238E27FC236}">
-                <a16:creationId xmlns="" xmlns:a16="http://schemas.microsoft.com/office/drawing/2014/main" id="{FB4D8486-8A0C-4714-BCF4-81D877F6C2C8}"/>
+                <a16:creationId xmlns:a16="http://schemas.microsoft.com/office/drawing/2014/main" xmlns="" id="{FB4D8486-8A0C-4714-BCF4-81D877F6C2C8}"/>
               </a:ext>
             </a:extLst>
           </p:cNvPr>
@@ -19554,7 +19554,7 @@
           <p:cNvPr id="30" name="Arrow: Circular 29">
             <a:extLst>
               <a:ext uri="{FF2B5EF4-FFF2-40B4-BE49-F238E27FC236}">
-                <a16:creationId xmlns="" xmlns:a16="http://schemas.microsoft.com/office/drawing/2014/main" id="{07A3702E-7F1A-4B7F-8F11-2F2E609B68FD}"/>
+                <a16:creationId xmlns:a16="http://schemas.microsoft.com/office/drawing/2014/main" xmlns="" id="{07A3702E-7F1A-4B7F-8F11-2F2E609B68FD}"/>
               </a:ext>
             </a:extLst>
           </p:cNvPr>
@@ -19625,7 +19625,7 @@
           <p:cNvPr id="33" name="Arrow: Circular 32">
             <a:extLst>
               <a:ext uri="{FF2B5EF4-FFF2-40B4-BE49-F238E27FC236}">
-                <a16:creationId xmlns="" xmlns:a16="http://schemas.microsoft.com/office/drawing/2014/main" id="{308FC62C-E243-4C2C-81F0-505A22D93148}"/>
+                <a16:creationId xmlns:a16="http://schemas.microsoft.com/office/drawing/2014/main" xmlns="" id="{308FC62C-E243-4C2C-81F0-505A22D93148}"/>
               </a:ext>
             </a:extLst>
           </p:cNvPr>
@@ -19687,7 +19687,7 @@
           <p:cNvPr id="34" name="TextBox 33">
             <a:extLst>
               <a:ext uri="{FF2B5EF4-FFF2-40B4-BE49-F238E27FC236}">
-                <a16:creationId xmlns="" xmlns:a16="http://schemas.microsoft.com/office/drawing/2014/main" id="{524A4B51-05E6-4C5F-B9BD-85474FA80C1B}"/>
+                <a16:creationId xmlns:a16="http://schemas.microsoft.com/office/drawing/2014/main" xmlns="" id="{524A4B51-05E6-4C5F-B9BD-85474FA80C1B}"/>
               </a:ext>
             </a:extLst>
           </p:cNvPr>
@@ -19738,7 +19738,7 @@
           <p:cNvPr id="36" name="Arrow: Circular 35">
             <a:extLst>
               <a:ext uri="{FF2B5EF4-FFF2-40B4-BE49-F238E27FC236}">
-                <a16:creationId xmlns="" xmlns:a16="http://schemas.microsoft.com/office/drawing/2014/main" id="{541D1FF3-C7B8-4591-B875-BCDEFB24305A}"/>
+                <a16:creationId xmlns:a16="http://schemas.microsoft.com/office/drawing/2014/main" xmlns="" id="{541D1FF3-C7B8-4591-B875-BCDEFB24305A}"/>
               </a:ext>
             </a:extLst>
           </p:cNvPr>
@@ -19809,7 +19809,7 @@
           <p:cNvPr id="38" name="Arrow: Circular 37">
             <a:extLst>
               <a:ext uri="{FF2B5EF4-FFF2-40B4-BE49-F238E27FC236}">
-                <a16:creationId xmlns="" xmlns:a16="http://schemas.microsoft.com/office/drawing/2014/main" id="{5BE7C7C3-76F0-498A-9C6B-162B1E6CB4A6}"/>
+                <a16:creationId xmlns:a16="http://schemas.microsoft.com/office/drawing/2014/main" xmlns="" id="{5BE7C7C3-76F0-498A-9C6B-162B1E6CB4A6}"/>
               </a:ext>
             </a:extLst>
           </p:cNvPr>
@@ -19871,7 +19871,7 @@
           <p:cNvPr id="39" name="TextBox 38">
             <a:extLst>
               <a:ext uri="{FF2B5EF4-FFF2-40B4-BE49-F238E27FC236}">
-                <a16:creationId xmlns="" xmlns:a16="http://schemas.microsoft.com/office/drawing/2014/main" id="{C4768057-DEF0-49C9-AED9-90017A6B6E76}"/>
+                <a16:creationId xmlns:a16="http://schemas.microsoft.com/office/drawing/2014/main" xmlns="" id="{C4768057-DEF0-49C9-AED9-90017A6B6E76}"/>
               </a:ext>
             </a:extLst>
           </p:cNvPr>
@@ -19941,7 +19941,7 @@
           <p:cNvPr id="40" name="Arrow: Circular 39">
             <a:extLst>
               <a:ext uri="{FF2B5EF4-FFF2-40B4-BE49-F238E27FC236}">
-                <a16:creationId xmlns="" xmlns:a16="http://schemas.microsoft.com/office/drawing/2014/main" id="{A6D9D948-32C4-46CC-B6B5-324143737174}"/>
+                <a16:creationId xmlns:a16="http://schemas.microsoft.com/office/drawing/2014/main" xmlns="" id="{A6D9D948-32C4-46CC-B6B5-324143737174}"/>
               </a:ext>
             </a:extLst>
           </p:cNvPr>
@@ -20012,7 +20012,7 @@
           <p:cNvPr id="41" name="Arrow: Circular 40">
             <a:extLst>
               <a:ext uri="{FF2B5EF4-FFF2-40B4-BE49-F238E27FC236}">
-                <a16:creationId xmlns="" xmlns:a16="http://schemas.microsoft.com/office/drawing/2014/main" id="{B2221E3A-515C-4CD7-B7FB-AFDDC0D68579}"/>
+                <a16:creationId xmlns:a16="http://schemas.microsoft.com/office/drawing/2014/main" xmlns="" id="{B2221E3A-515C-4CD7-B7FB-AFDDC0D68579}"/>
               </a:ext>
             </a:extLst>
           </p:cNvPr>
@@ -20077,7 +20077,7 @@
           <p:cNvPr id="42" name="TextBox 41">
             <a:extLst>
               <a:ext uri="{FF2B5EF4-FFF2-40B4-BE49-F238E27FC236}">
-                <a16:creationId xmlns="" xmlns:a16="http://schemas.microsoft.com/office/drawing/2014/main" id="{729F4A50-2983-4082-9944-3CA583D608E0}"/>
+                <a16:creationId xmlns:a16="http://schemas.microsoft.com/office/drawing/2014/main" xmlns="" id="{729F4A50-2983-4082-9944-3CA583D608E0}"/>
               </a:ext>
             </a:extLst>
           </p:cNvPr>
@@ -20124,7 +20124,7 @@
           <p:cNvPr id="43" name="Arrow: Circular 42">
             <a:extLst>
               <a:ext uri="{FF2B5EF4-FFF2-40B4-BE49-F238E27FC236}">
-                <a16:creationId xmlns="" xmlns:a16="http://schemas.microsoft.com/office/drawing/2014/main" id="{09D6AB5E-C547-455C-B22D-80BAF8230E85}"/>
+                <a16:creationId xmlns:a16="http://schemas.microsoft.com/office/drawing/2014/main" xmlns="" id="{09D6AB5E-C547-455C-B22D-80BAF8230E85}"/>
               </a:ext>
             </a:extLst>
           </p:cNvPr>
@@ -20195,7 +20195,7 @@
           <p:cNvPr id="15" name="TextBox 14">
             <a:extLst>
               <a:ext uri="{FF2B5EF4-FFF2-40B4-BE49-F238E27FC236}">
-                <a16:creationId xmlns="" xmlns:a16="http://schemas.microsoft.com/office/drawing/2014/main" id="{7D14B4C4-E80E-451C-9C33-F9B5DCCCC3E1}"/>
+                <a16:creationId xmlns:a16="http://schemas.microsoft.com/office/drawing/2014/main" xmlns="" id="{7D14B4C4-E80E-451C-9C33-F9B5DCCCC3E1}"/>
               </a:ext>
             </a:extLst>
           </p:cNvPr>
@@ -20239,7 +20239,7 @@
           <p:cNvPr id="17" name="TextBox 16">
             <a:extLst>
               <a:ext uri="{FF2B5EF4-FFF2-40B4-BE49-F238E27FC236}">
-                <a16:creationId xmlns="" xmlns:a16="http://schemas.microsoft.com/office/drawing/2014/main" id="{56315337-E54F-4367-B0AB-F40316498CDD}"/>
+                <a16:creationId xmlns:a16="http://schemas.microsoft.com/office/drawing/2014/main" xmlns="" id="{56315337-E54F-4367-B0AB-F40316498CDD}"/>
               </a:ext>
             </a:extLst>
           </p:cNvPr>
@@ -20283,7 +20283,7 @@
           <p:cNvPr id="18" name="TextBox 17">
             <a:extLst>
               <a:ext uri="{FF2B5EF4-FFF2-40B4-BE49-F238E27FC236}">
-                <a16:creationId xmlns="" xmlns:a16="http://schemas.microsoft.com/office/drawing/2014/main" id="{39217B59-4AFE-47B6-96E4-C2A75B2C9B42}"/>
+                <a16:creationId xmlns:a16="http://schemas.microsoft.com/office/drawing/2014/main" xmlns="" id="{39217B59-4AFE-47B6-96E4-C2A75B2C9B42}"/>
               </a:ext>
             </a:extLst>
           </p:cNvPr>
@@ -20327,7 +20327,7 @@
           <p:cNvPr id="19" name="TextBox 18">
             <a:extLst>
               <a:ext uri="{FF2B5EF4-FFF2-40B4-BE49-F238E27FC236}">
-                <a16:creationId xmlns="" xmlns:a16="http://schemas.microsoft.com/office/drawing/2014/main" id="{06D567A4-D49C-4045-9CC6-92365672DFF6}"/>
+                <a16:creationId xmlns:a16="http://schemas.microsoft.com/office/drawing/2014/main" xmlns="" id="{06D567A4-D49C-4045-9CC6-92365672DFF6}"/>
               </a:ext>
             </a:extLst>
           </p:cNvPr>
@@ -20371,7 +20371,7 @@
           <p:cNvPr id="44" name="TextBox 43">
             <a:extLst>
               <a:ext uri="{FF2B5EF4-FFF2-40B4-BE49-F238E27FC236}">
-                <a16:creationId xmlns="" xmlns:a16="http://schemas.microsoft.com/office/drawing/2014/main" id="{0A626415-74E1-471E-9AB4-B681A325887B}"/>
+                <a16:creationId xmlns:a16="http://schemas.microsoft.com/office/drawing/2014/main" xmlns="" id="{0A626415-74E1-471E-9AB4-B681A325887B}"/>
               </a:ext>
             </a:extLst>
           </p:cNvPr>
@@ -21992,7 +21992,7 @@
           <p:cNvPr id="23" name="Picture 22">
             <a:extLst>
               <a:ext uri="{FF2B5EF4-FFF2-40B4-BE49-F238E27FC236}">
-                <a16:creationId xmlns="" xmlns:a16="http://schemas.microsoft.com/office/drawing/2014/main" id="{B9405E35-C08D-4F80-A137-036B28E78684}"/>
+                <a16:creationId xmlns:a16="http://schemas.microsoft.com/office/drawing/2014/main" xmlns="" id="{B9405E35-C08D-4F80-A137-036B28E78684}"/>
               </a:ext>
             </a:extLst>
           </p:cNvPr>
@@ -22021,7 +22021,7 @@
           <p:cNvPr id="21" name="Rectangle 20">
             <a:extLst>
               <a:ext uri="{FF2B5EF4-FFF2-40B4-BE49-F238E27FC236}">
-                <a16:creationId xmlns="" xmlns:a16="http://schemas.microsoft.com/office/drawing/2014/main" id="{CD352CD5-70E2-4791-B274-DE988574DD33}"/>
+                <a16:creationId xmlns:a16="http://schemas.microsoft.com/office/drawing/2014/main" xmlns="" id="{CD352CD5-70E2-4791-B274-DE988574DD33}"/>
               </a:ext>
             </a:extLst>
           </p:cNvPr>
@@ -22091,7 +22091,7 @@
           <p:cNvPr id="2" name="Title 1">
             <a:extLst>
               <a:ext uri="{FF2B5EF4-FFF2-40B4-BE49-F238E27FC236}">
-                <a16:creationId xmlns="" xmlns:a16="http://schemas.microsoft.com/office/drawing/2014/main" id="{1EE04D7C-934C-4C06-8A1D-628D6E71A659}"/>
+                <a16:creationId xmlns:a16="http://schemas.microsoft.com/office/drawing/2014/main" xmlns="" id="{1EE04D7C-934C-4C06-8A1D-628D6E71A659}"/>
               </a:ext>
             </a:extLst>
           </p:cNvPr>
@@ -22134,7 +22134,7 @@
           <p:cNvPr id="3" name="Group 2">
             <a:extLst>
               <a:ext uri="{FF2B5EF4-FFF2-40B4-BE49-F238E27FC236}">
-                <a16:creationId xmlns="" xmlns:a16="http://schemas.microsoft.com/office/drawing/2014/main" id="{EABB6D39-2BB3-4787-932E-3B7E9ACB3E61}"/>
+                <a16:creationId xmlns:a16="http://schemas.microsoft.com/office/drawing/2014/main" xmlns="" id="{EABB6D39-2BB3-4787-932E-3B7E9ACB3E61}"/>
               </a:ext>
             </a:extLst>
           </p:cNvPr>
@@ -22154,7 +22154,7 @@
             <p:cNvPr id="10" name="Rounded Rectangle 15">
               <a:extLst>
                 <a:ext uri="{FF2B5EF4-FFF2-40B4-BE49-F238E27FC236}">
-                  <a16:creationId xmlns="" xmlns:a16="http://schemas.microsoft.com/office/drawing/2014/main" id="{99BDB82C-2B0D-4442-8568-B80922E9A94C}"/>
+                  <a16:creationId xmlns:a16="http://schemas.microsoft.com/office/drawing/2014/main" xmlns="" id="{99BDB82C-2B0D-4442-8568-B80922E9A94C}"/>
                 </a:ext>
               </a:extLst>
             </p:cNvPr>
@@ -22245,7 +22245,7 @@
             <p:cNvPr id="11" name="TextBox 10">
               <a:extLst>
                 <a:ext uri="{FF2B5EF4-FFF2-40B4-BE49-F238E27FC236}">
-                  <a16:creationId xmlns="" xmlns:a16="http://schemas.microsoft.com/office/drawing/2014/main" id="{12DBE1DC-BADA-4A45-A951-A5C906B38737}"/>
+                  <a16:creationId xmlns:a16="http://schemas.microsoft.com/office/drawing/2014/main" xmlns="" id="{12DBE1DC-BADA-4A45-A951-A5C906B38737}"/>
                 </a:ext>
               </a:extLst>
             </p:cNvPr>
@@ -22319,7 +22319,7 @@
             <p:cNvPr id="12" name="TextBox 11">
               <a:extLst>
                 <a:ext uri="{FF2B5EF4-FFF2-40B4-BE49-F238E27FC236}">
-                  <a16:creationId xmlns="" xmlns:a16="http://schemas.microsoft.com/office/drawing/2014/main" id="{46AE31CE-48B7-4930-9AFE-291D02965DC6}"/>
+                  <a16:creationId xmlns:a16="http://schemas.microsoft.com/office/drawing/2014/main" xmlns="" id="{46AE31CE-48B7-4930-9AFE-291D02965DC6}"/>
                 </a:ext>
               </a:extLst>
             </p:cNvPr>
@@ -22378,7 +22378,7 @@
             <p:cNvPr id="13" name="TextBox 12">
               <a:extLst>
                 <a:ext uri="{FF2B5EF4-FFF2-40B4-BE49-F238E27FC236}">
-                  <a16:creationId xmlns="" xmlns:a16="http://schemas.microsoft.com/office/drawing/2014/main" id="{E66674D2-00F2-444A-AEEB-FF3FA50D87B3}"/>
+                  <a16:creationId xmlns:a16="http://schemas.microsoft.com/office/drawing/2014/main" xmlns="" id="{E66674D2-00F2-444A-AEEB-FF3FA50D87B3}"/>
                 </a:ext>
               </a:extLst>
             </p:cNvPr>
@@ -22437,7 +22437,7 @@
             <p:cNvPr id="14" name="TextBox 13">
               <a:extLst>
                 <a:ext uri="{FF2B5EF4-FFF2-40B4-BE49-F238E27FC236}">
-                  <a16:creationId xmlns="" xmlns:a16="http://schemas.microsoft.com/office/drawing/2014/main" id="{74846D46-98A5-4A1E-8078-B45021BDE10F}"/>
+                  <a16:creationId xmlns:a16="http://schemas.microsoft.com/office/drawing/2014/main" xmlns="" id="{74846D46-98A5-4A1E-8078-B45021BDE10F}"/>
                 </a:ext>
               </a:extLst>
             </p:cNvPr>
@@ -22481,7 +22481,7 @@
             <p:cNvPr id="16" name="Rectangle 15">
               <a:extLst>
                 <a:ext uri="{FF2B5EF4-FFF2-40B4-BE49-F238E27FC236}">
-                  <a16:creationId xmlns="" xmlns:a16="http://schemas.microsoft.com/office/drawing/2014/main" id="{D1620322-7C93-4FF7-805E-963D8B61C251}"/>
+                  <a16:creationId xmlns:a16="http://schemas.microsoft.com/office/drawing/2014/main" xmlns="" id="{D1620322-7C93-4FF7-805E-963D8B61C251}"/>
                 </a:ext>
               </a:extLst>
             </p:cNvPr>
@@ -22534,7 +22534,7 @@
             <p:cNvPr id="17" name="Rectangle 16">
               <a:extLst>
                 <a:ext uri="{FF2B5EF4-FFF2-40B4-BE49-F238E27FC236}">
-                  <a16:creationId xmlns="" xmlns:a16="http://schemas.microsoft.com/office/drawing/2014/main" id="{44113ECF-77DE-4858-AE0B-36687CECAB27}"/>
+                  <a16:creationId xmlns:a16="http://schemas.microsoft.com/office/drawing/2014/main" xmlns="" id="{44113ECF-77DE-4858-AE0B-36687CECAB27}"/>
                 </a:ext>
               </a:extLst>
             </p:cNvPr>
@@ -22610,7 +22610,7 @@
             <p:cNvPr id="18" name="Rectangle 17">
               <a:extLst>
                 <a:ext uri="{FF2B5EF4-FFF2-40B4-BE49-F238E27FC236}">
-                  <a16:creationId xmlns="" xmlns:a16="http://schemas.microsoft.com/office/drawing/2014/main" id="{7A9617A7-A0B3-4946-B500-3464A0050E9B}"/>
+                  <a16:creationId xmlns:a16="http://schemas.microsoft.com/office/drawing/2014/main" xmlns="" id="{7A9617A7-A0B3-4946-B500-3464A0050E9B}"/>
                 </a:ext>
               </a:extLst>
             </p:cNvPr>
@@ -22663,7 +22663,7 @@
             <p:cNvPr id="19" name="Rectangle 18">
               <a:extLst>
                 <a:ext uri="{FF2B5EF4-FFF2-40B4-BE49-F238E27FC236}">
-                  <a16:creationId xmlns="" xmlns:a16="http://schemas.microsoft.com/office/drawing/2014/main" id="{B3E5C5E1-178A-46B8-8DFE-CD5A02D73437}"/>
+                  <a16:creationId xmlns:a16="http://schemas.microsoft.com/office/drawing/2014/main" xmlns="" id="{B3E5C5E1-178A-46B8-8DFE-CD5A02D73437}"/>
                 </a:ext>
               </a:extLst>
             </p:cNvPr>
@@ -22717,7 +22717,7 @@
           <p:cNvPr id="15" name="Slide Number Placeholder 4">
             <a:extLst>
               <a:ext uri="{FF2B5EF4-FFF2-40B4-BE49-F238E27FC236}">
-                <a16:creationId xmlns="" xmlns:a16="http://schemas.microsoft.com/office/drawing/2014/main" id="{E0143BCE-5809-4339-B731-3ED1FCB5CB9A}"/>
+                <a16:creationId xmlns:a16="http://schemas.microsoft.com/office/drawing/2014/main" xmlns="" id="{E0143BCE-5809-4339-B731-3ED1FCB5CB9A}"/>
               </a:ext>
             </a:extLst>
           </p:cNvPr>
@@ -22919,7 +22919,7 @@
           <p:cNvPr id="27" name="Rounded Rectangle 50">
             <a:extLst>
               <a:ext uri="{FF2B5EF4-FFF2-40B4-BE49-F238E27FC236}">
-                <a16:creationId xmlns="" xmlns:a16="http://schemas.microsoft.com/office/drawing/2014/main" id="{E269E63E-C4AD-4DDC-A199-5D6645A42CD6}"/>
+                <a16:creationId xmlns:a16="http://schemas.microsoft.com/office/drawing/2014/main" xmlns="" id="{E269E63E-C4AD-4DDC-A199-5D6645A42CD6}"/>
               </a:ext>
             </a:extLst>
           </p:cNvPr>
@@ -22973,7 +22973,7 @@
           <p:cNvPr id="28" name="Rectangle 27">
             <a:extLst>
               <a:ext uri="{FF2B5EF4-FFF2-40B4-BE49-F238E27FC236}">
-                <a16:creationId xmlns="" xmlns:a16="http://schemas.microsoft.com/office/drawing/2014/main" id="{A7C03315-E453-441F-9D54-42C8FEC6F7EA}"/>
+                <a16:creationId xmlns:a16="http://schemas.microsoft.com/office/drawing/2014/main" xmlns="" id="{A7C03315-E453-441F-9D54-42C8FEC6F7EA}"/>
               </a:ext>
             </a:extLst>
           </p:cNvPr>
@@ -23027,7 +23027,7 @@
           <p:cNvPr id="29" name="Rounded Rectangle 50">
             <a:extLst>
               <a:ext uri="{FF2B5EF4-FFF2-40B4-BE49-F238E27FC236}">
-                <a16:creationId xmlns="" xmlns:a16="http://schemas.microsoft.com/office/drawing/2014/main" id="{7C3D6061-1748-41B4-B891-A7C3618AF9B9}"/>
+                <a16:creationId xmlns:a16="http://schemas.microsoft.com/office/drawing/2014/main" xmlns="" id="{7C3D6061-1748-41B4-B891-A7C3618AF9B9}"/>
               </a:ext>
             </a:extLst>
           </p:cNvPr>
@@ -23075,7 +23075,7 @@
           <p:cNvPr id="30" name="Rounded Rectangle 50">
             <a:extLst>
               <a:ext uri="{FF2B5EF4-FFF2-40B4-BE49-F238E27FC236}">
-                <a16:creationId xmlns="" xmlns:a16="http://schemas.microsoft.com/office/drawing/2014/main" id="{70496BE9-B009-42B7-BBDE-9B1126D7A161}"/>
+                <a16:creationId xmlns:a16="http://schemas.microsoft.com/office/drawing/2014/main" xmlns="" id="{70496BE9-B009-42B7-BBDE-9B1126D7A161}"/>
               </a:ext>
             </a:extLst>
           </p:cNvPr>
@@ -23132,7 +23132,7 @@
           <p:cNvPr id="31" name="Rounded Rectangle 50">
             <a:extLst>
               <a:ext uri="{FF2B5EF4-FFF2-40B4-BE49-F238E27FC236}">
-                <a16:creationId xmlns="" xmlns:a16="http://schemas.microsoft.com/office/drawing/2014/main" id="{2BB603A2-A19D-4C04-9388-4BB9CF32B4FB}"/>
+                <a16:creationId xmlns:a16="http://schemas.microsoft.com/office/drawing/2014/main" xmlns="" id="{2BB603A2-A19D-4C04-9388-4BB9CF32B4FB}"/>
               </a:ext>
             </a:extLst>
           </p:cNvPr>
@@ -23180,7 +23180,7 @@
           <p:cNvPr id="32" name="Picture 4" descr="Image result for arduino create logo">
             <a:extLst>
               <a:ext uri="{FF2B5EF4-FFF2-40B4-BE49-F238E27FC236}">
-                <a16:creationId xmlns="" xmlns:a16="http://schemas.microsoft.com/office/drawing/2014/main" id="{7F6C0F33-5638-49A8-BE81-85A46941558D}"/>
+                <a16:creationId xmlns:a16="http://schemas.microsoft.com/office/drawing/2014/main" xmlns="" id="{7F6C0F33-5638-49A8-BE81-85A46941558D}"/>
               </a:ext>
             </a:extLst>
           </p:cNvPr>
@@ -23227,7 +23227,7 @@
           <p:cNvPr id="33" name="Picture 12" descr="Image result for intel system studio logo">
             <a:extLst>
               <a:ext uri="{FF2B5EF4-FFF2-40B4-BE49-F238E27FC236}">
-                <a16:creationId xmlns="" xmlns:a16="http://schemas.microsoft.com/office/drawing/2014/main" id="{D3071ABB-96D2-4424-B400-EA35E8813927}"/>
+                <a16:creationId xmlns:a16="http://schemas.microsoft.com/office/drawing/2014/main" xmlns="" id="{D3071ABB-96D2-4424-B400-EA35E8813927}"/>
               </a:ext>
             </a:extLst>
           </p:cNvPr>
@@ -23274,7 +23274,7 @@
           <p:cNvPr id="34" name="Rectangle 33">
             <a:extLst>
               <a:ext uri="{FF2B5EF4-FFF2-40B4-BE49-F238E27FC236}">
-                <a16:creationId xmlns="" xmlns:a16="http://schemas.microsoft.com/office/drawing/2014/main" id="{DD7BCBA0-6439-498E-B604-7298DF54B26E}"/>
+                <a16:creationId xmlns:a16="http://schemas.microsoft.com/office/drawing/2014/main" xmlns="" id="{DD7BCBA0-6439-498E-B604-7298DF54B26E}"/>
               </a:ext>
             </a:extLst>
           </p:cNvPr>
@@ -23335,7 +23335,7 @@
           <p:cNvPr id="35" name="Rectangle 34">
             <a:extLst>
               <a:ext uri="{FF2B5EF4-FFF2-40B4-BE49-F238E27FC236}">
-                <a16:creationId xmlns="" xmlns:a16="http://schemas.microsoft.com/office/drawing/2014/main" id="{56A5446F-7B73-41D2-88C1-3359C5BC8F04}"/>
+                <a16:creationId xmlns:a16="http://schemas.microsoft.com/office/drawing/2014/main" xmlns="" id="{56A5446F-7B73-41D2-88C1-3359C5BC8F04}"/>
               </a:ext>
             </a:extLst>
           </p:cNvPr>
@@ -23410,7 +23410,7 @@
           <p:cNvPr id="36" name="Rectangle 35">
             <a:extLst>
               <a:ext uri="{FF2B5EF4-FFF2-40B4-BE49-F238E27FC236}">
-                <a16:creationId xmlns="" xmlns:a16="http://schemas.microsoft.com/office/drawing/2014/main" id="{71F2FF01-682F-4841-81C2-E3F7596330E2}"/>
+                <a16:creationId xmlns:a16="http://schemas.microsoft.com/office/drawing/2014/main" xmlns="" id="{71F2FF01-682F-4841-81C2-E3F7596330E2}"/>
               </a:ext>
             </a:extLst>
           </p:cNvPr>
@@ -23472,7 +23472,7 @@
           <p:cNvPr id="37" name="Picture 36">
             <a:extLst>
               <a:ext uri="{FF2B5EF4-FFF2-40B4-BE49-F238E27FC236}">
-                <a16:creationId xmlns="" xmlns:a16="http://schemas.microsoft.com/office/drawing/2014/main" id="{0BDEFC21-93AC-4E1B-9E3F-CB6A12B7E80C}"/>
+                <a16:creationId xmlns:a16="http://schemas.microsoft.com/office/drawing/2014/main" xmlns="" id="{0BDEFC21-93AC-4E1B-9E3F-CB6A12B7E80C}"/>
               </a:ext>
             </a:extLst>
           </p:cNvPr>
@@ -23502,7 +23502,7 @@
           <p:cNvPr id="38" name="Picture 37">
             <a:extLst>
               <a:ext uri="{FF2B5EF4-FFF2-40B4-BE49-F238E27FC236}">
-                <a16:creationId xmlns="" xmlns:a16="http://schemas.microsoft.com/office/drawing/2014/main" id="{AF1593E9-3A68-4DDA-B2A6-435A148F1ED4}"/>
+                <a16:creationId xmlns:a16="http://schemas.microsoft.com/office/drawing/2014/main" xmlns="" id="{AF1593E9-3A68-4DDA-B2A6-435A148F1ED4}"/>
               </a:ext>
             </a:extLst>
           </p:cNvPr>
@@ -23532,7 +23532,7 @@
           <p:cNvPr id="39" name="Rectangle 38">
             <a:extLst>
               <a:ext uri="{FF2B5EF4-FFF2-40B4-BE49-F238E27FC236}">
-                <a16:creationId xmlns="" xmlns:a16="http://schemas.microsoft.com/office/drawing/2014/main" id="{FD70DF3C-CF07-42D2-A805-AE242CE326F7}"/>
+                <a16:creationId xmlns:a16="http://schemas.microsoft.com/office/drawing/2014/main" xmlns="" id="{FD70DF3C-CF07-42D2-A805-AE242CE326F7}"/>
               </a:ext>
             </a:extLst>
           </p:cNvPr>
@@ -23611,7 +23611,7 @@
           <p:cNvPr id="40" name="Rectangle 39">
             <a:extLst>
               <a:ext uri="{FF2B5EF4-FFF2-40B4-BE49-F238E27FC236}">
-                <a16:creationId xmlns="" xmlns:a16="http://schemas.microsoft.com/office/drawing/2014/main" id="{892064D2-9F02-4BF8-83AE-6C5A681E9B4D}"/>
+                <a16:creationId xmlns:a16="http://schemas.microsoft.com/office/drawing/2014/main" xmlns="" id="{892064D2-9F02-4BF8-83AE-6C5A681E9B4D}"/>
               </a:ext>
             </a:extLst>
           </p:cNvPr>
@@ -23672,7 +23672,7 @@
           <p:cNvPr id="41" name="Rectangle 40">
             <a:extLst>
               <a:ext uri="{FF2B5EF4-FFF2-40B4-BE49-F238E27FC236}">
-                <a16:creationId xmlns="" xmlns:a16="http://schemas.microsoft.com/office/drawing/2014/main" id="{BA2D0DA9-8BAE-4FD6-A742-8442C1C6C0E3}"/>
+                <a16:creationId xmlns:a16="http://schemas.microsoft.com/office/drawing/2014/main" xmlns="" id="{BA2D0DA9-8BAE-4FD6-A742-8442C1C6C0E3}"/>
               </a:ext>
             </a:extLst>
           </p:cNvPr>
@@ -23717,7 +23717,7 @@
           <p:cNvPr id="42" name="Rectangle 41">
             <a:extLst>
               <a:ext uri="{FF2B5EF4-FFF2-40B4-BE49-F238E27FC236}">
-                <a16:creationId xmlns="" xmlns:a16="http://schemas.microsoft.com/office/drawing/2014/main" id="{589D1699-C63E-4EC4-B246-128247FB335C}"/>
+                <a16:creationId xmlns:a16="http://schemas.microsoft.com/office/drawing/2014/main" xmlns="" id="{589D1699-C63E-4EC4-B246-128247FB335C}"/>
               </a:ext>
             </a:extLst>
           </p:cNvPr>
@@ -23762,7 +23762,7 @@
           <p:cNvPr id="43" name="Rectangle 42">
             <a:extLst>
               <a:ext uri="{FF2B5EF4-FFF2-40B4-BE49-F238E27FC236}">
-                <a16:creationId xmlns="" xmlns:a16="http://schemas.microsoft.com/office/drawing/2014/main" id="{ADD94120-20B8-403E-B577-C0A50F0B87B2}"/>
+                <a16:creationId xmlns:a16="http://schemas.microsoft.com/office/drawing/2014/main" xmlns="" id="{ADD94120-20B8-403E-B577-C0A50F0B87B2}"/>
               </a:ext>
             </a:extLst>
           </p:cNvPr>
@@ -23807,7 +23807,7 @@
           <p:cNvPr id="44" name="Picture 43">
             <a:extLst>
               <a:ext uri="{FF2B5EF4-FFF2-40B4-BE49-F238E27FC236}">
-                <a16:creationId xmlns="" xmlns:a16="http://schemas.microsoft.com/office/drawing/2014/main" id="{0B4AF8C2-F312-45B2-ACA5-6614C1229122}"/>
+                <a16:creationId xmlns:a16="http://schemas.microsoft.com/office/drawing/2014/main" xmlns="" id="{0B4AF8C2-F312-45B2-ACA5-6614C1229122}"/>
               </a:ext>
             </a:extLst>
           </p:cNvPr>
@@ -23836,7 +23836,7 @@
           <p:cNvPr id="45" name="Slide Number Placeholder 4">
             <a:extLst>
               <a:ext uri="{FF2B5EF4-FFF2-40B4-BE49-F238E27FC236}">
-                <a16:creationId xmlns="" xmlns:a16="http://schemas.microsoft.com/office/drawing/2014/main" id="{3ED74A7D-0D3E-47B9-A187-847354E8C7BE}"/>
+                <a16:creationId xmlns:a16="http://schemas.microsoft.com/office/drawing/2014/main" xmlns="" id="{3ED74A7D-0D3E-47B9-A187-847354E8C7BE}"/>
               </a:ext>
             </a:extLst>
           </p:cNvPr>
@@ -23928,7 +23928,7 @@
           <p:cNvPr id="2" name="Title 1">
             <a:extLst>
               <a:ext uri="{FF2B5EF4-FFF2-40B4-BE49-F238E27FC236}">
-                <a16:creationId xmlns="" xmlns:a16="http://schemas.microsoft.com/office/drawing/2014/main" id="{3BF9101D-7C12-F545-8521-C4101CBDEC91}"/>
+                <a16:creationId xmlns:a16="http://schemas.microsoft.com/office/drawing/2014/main" xmlns="" id="{3BF9101D-7C12-F545-8521-C4101CBDEC91}"/>
               </a:ext>
             </a:extLst>
           </p:cNvPr>
@@ -23956,7 +23956,7 @@
           <p:cNvPr id="17" name="Circular Arrow 24">
             <a:extLst>
               <a:ext uri="{FF2B5EF4-FFF2-40B4-BE49-F238E27FC236}">
-                <a16:creationId xmlns="" xmlns:a16="http://schemas.microsoft.com/office/drawing/2014/main" id="{33CE4F94-9690-4A3E-B9EA-CC4AC0D71CA5}"/>
+                <a16:creationId xmlns:a16="http://schemas.microsoft.com/office/drawing/2014/main" xmlns="" id="{33CE4F94-9690-4A3E-B9EA-CC4AC0D71CA5}"/>
               </a:ext>
             </a:extLst>
           </p:cNvPr>
@@ -24014,7 +24014,7 @@
           <p:cNvPr id="18" name="Circular Arrow 25">
             <a:extLst>
               <a:ext uri="{FF2B5EF4-FFF2-40B4-BE49-F238E27FC236}">
-                <a16:creationId xmlns="" xmlns:a16="http://schemas.microsoft.com/office/drawing/2014/main" id="{A6385A16-0114-4382-82EB-E2B97EE4EA8F}"/>
+                <a16:creationId xmlns:a16="http://schemas.microsoft.com/office/drawing/2014/main" xmlns="" id="{A6385A16-0114-4382-82EB-E2B97EE4EA8F}"/>
               </a:ext>
             </a:extLst>
           </p:cNvPr>
@@ -24072,7 +24072,7 @@
           <p:cNvPr id="19" name="Picture 4" descr="Image result for arduino create logo">
             <a:extLst>
               <a:ext uri="{FF2B5EF4-FFF2-40B4-BE49-F238E27FC236}">
-                <a16:creationId xmlns="" xmlns:a16="http://schemas.microsoft.com/office/drawing/2014/main" id="{5BA1F566-8663-48C0-AF4A-2E8ED3A051AC}"/>
+                <a16:creationId xmlns:a16="http://schemas.microsoft.com/office/drawing/2014/main" xmlns="" id="{5BA1F566-8663-48C0-AF4A-2E8ED3A051AC}"/>
               </a:ext>
             </a:extLst>
           </p:cNvPr>
@@ -24119,7 +24119,7 @@
           <p:cNvPr id="20" name="TextBox 19">
             <a:extLst>
               <a:ext uri="{FF2B5EF4-FFF2-40B4-BE49-F238E27FC236}">
-                <a16:creationId xmlns="" xmlns:a16="http://schemas.microsoft.com/office/drawing/2014/main" id="{AAE33BDC-1132-4330-B49B-304B167ACFB9}"/>
+                <a16:creationId xmlns:a16="http://schemas.microsoft.com/office/drawing/2014/main" xmlns="" id="{AAE33BDC-1132-4330-B49B-304B167ACFB9}"/>
               </a:ext>
             </a:extLst>
           </p:cNvPr>
@@ -24300,7 +24300,7 @@
           <p:cNvPr id="21" name="Picture 12" descr="Image result for intel system studio logo">
             <a:extLst>
               <a:ext uri="{FF2B5EF4-FFF2-40B4-BE49-F238E27FC236}">
-                <a16:creationId xmlns="" xmlns:a16="http://schemas.microsoft.com/office/drawing/2014/main" id="{13DEB3D1-EB08-48A4-975F-3B4D2A2C4A7A}"/>
+                <a16:creationId xmlns:a16="http://schemas.microsoft.com/office/drawing/2014/main" xmlns="" id="{13DEB3D1-EB08-48A4-975F-3B4D2A2C4A7A}"/>
               </a:ext>
             </a:extLst>
           </p:cNvPr>
@@ -24347,7 +24347,7 @@
           <p:cNvPr id="22" name="TextBox 21">
             <a:extLst>
               <a:ext uri="{FF2B5EF4-FFF2-40B4-BE49-F238E27FC236}">
-                <a16:creationId xmlns="" xmlns:a16="http://schemas.microsoft.com/office/drawing/2014/main" id="{5D7AB35B-430F-449E-986D-263BD18138D7}"/>
+                <a16:creationId xmlns:a16="http://schemas.microsoft.com/office/drawing/2014/main" xmlns="" id="{5D7AB35B-430F-449E-986D-263BD18138D7}"/>
               </a:ext>
             </a:extLst>
           </p:cNvPr>
@@ -24528,7 +24528,7 @@
           <p:cNvPr id="23" name="Slide Number Placeholder 4">
             <a:extLst>
               <a:ext uri="{FF2B5EF4-FFF2-40B4-BE49-F238E27FC236}">
-                <a16:creationId xmlns="" xmlns:a16="http://schemas.microsoft.com/office/drawing/2014/main" id="{E583EABD-40FC-4914-B932-1DE198B1A588}"/>
+                <a16:creationId xmlns:a16="http://schemas.microsoft.com/office/drawing/2014/main" xmlns="" id="{E583EABD-40FC-4914-B932-1DE198B1A588}"/>
               </a:ext>
             </a:extLst>
           </p:cNvPr>
@@ -24923,7 +24923,7 @@
           <p:cNvPr id="2" name="Title 1">
             <a:extLst>
               <a:ext uri="{FF2B5EF4-FFF2-40B4-BE49-F238E27FC236}">
-                <a16:creationId xmlns="" xmlns:a16="http://schemas.microsoft.com/office/drawing/2014/main" id="{B33A0AE8-5F72-404F-9460-5B8781F449A9}"/>
+                <a16:creationId xmlns:a16="http://schemas.microsoft.com/office/drawing/2014/main" xmlns="" id="{B33A0AE8-5F72-404F-9460-5B8781F449A9}"/>
               </a:ext>
             </a:extLst>
           </p:cNvPr>
@@ -24956,7 +24956,7 @@
           <p:cNvPr id="14" name="Group 13">
             <a:extLst>
               <a:ext uri="{FF2B5EF4-FFF2-40B4-BE49-F238E27FC236}">
-                <a16:creationId xmlns="" xmlns:a16="http://schemas.microsoft.com/office/drawing/2014/main" id="{1EA2520D-D3A0-4ED4-99FF-FFBBBEA14E22}"/>
+                <a16:creationId xmlns:a16="http://schemas.microsoft.com/office/drawing/2014/main" xmlns="" id="{1EA2520D-D3A0-4ED4-99FF-FFBBBEA14E22}"/>
               </a:ext>
             </a:extLst>
           </p:cNvPr>
@@ -24976,7 +24976,7 @@
             <p:cNvPr id="30" name="Rounded Rectangle 50">
               <a:extLst>
                 <a:ext uri="{FF2B5EF4-FFF2-40B4-BE49-F238E27FC236}">
-                  <a16:creationId xmlns="" xmlns:a16="http://schemas.microsoft.com/office/drawing/2014/main" id="{FC45E4F6-93F3-4CFA-88F3-17E715C9325D}"/>
+                  <a16:creationId xmlns:a16="http://schemas.microsoft.com/office/drawing/2014/main" xmlns="" id="{FC45E4F6-93F3-4CFA-88F3-17E715C9325D}"/>
                 </a:ext>
               </a:extLst>
             </p:cNvPr>
@@ -25030,7 +25030,7 @@
             <p:cNvPr id="11" name="Rectangle 10">
               <a:extLst>
                 <a:ext uri="{FF2B5EF4-FFF2-40B4-BE49-F238E27FC236}">
-                  <a16:creationId xmlns="" xmlns:a16="http://schemas.microsoft.com/office/drawing/2014/main" id="{F0DEBBAE-39CA-423D-8F3B-3BDFE4790F68}"/>
+                  <a16:creationId xmlns:a16="http://schemas.microsoft.com/office/drawing/2014/main" xmlns="" id="{F0DEBBAE-39CA-423D-8F3B-3BDFE4790F68}"/>
                 </a:ext>
               </a:extLst>
             </p:cNvPr>
@@ -25087,7 +25087,7 @@
             <p:cNvPr id="5" name="Picture 4">
               <a:extLst>
                 <a:ext uri="{FF2B5EF4-FFF2-40B4-BE49-F238E27FC236}">
-                  <a16:creationId xmlns="" xmlns:a16="http://schemas.microsoft.com/office/drawing/2014/main" id="{9E3085EE-F337-4B72-AACC-ED2EA061F2AA}"/>
+                  <a16:creationId xmlns:a16="http://schemas.microsoft.com/office/drawing/2014/main" xmlns="" id="{9E3085EE-F337-4B72-AACC-ED2EA061F2AA}"/>
                 </a:ext>
               </a:extLst>
             </p:cNvPr>
@@ -25253,7 +25253,7 @@
           <p:cNvPr id="8" name="Group 7">
             <a:extLst>
               <a:ext uri="{FF2B5EF4-FFF2-40B4-BE49-F238E27FC236}">
-                <a16:creationId xmlns="" xmlns:a16="http://schemas.microsoft.com/office/drawing/2014/main" id="{C393EFA0-B9F6-41EB-A86D-65295F31F02F}"/>
+                <a16:creationId xmlns:a16="http://schemas.microsoft.com/office/drawing/2014/main" xmlns="" id="{C393EFA0-B9F6-41EB-A86D-65295F31F02F}"/>
               </a:ext>
             </a:extLst>
           </p:cNvPr>
@@ -25273,7 +25273,7 @@
             <p:cNvPr id="31" name="Rounded Rectangle 50">
               <a:extLst>
                 <a:ext uri="{FF2B5EF4-FFF2-40B4-BE49-F238E27FC236}">
-                  <a16:creationId xmlns="" xmlns:a16="http://schemas.microsoft.com/office/drawing/2014/main" id="{0B293476-29C2-4F2C-97E8-3FA40573CBCB}"/>
+                  <a16:creationId xmlns:a16="http://schemas.microsoft.com/office/drawing/2014/main" xmlns="" id="{0B293476-29C2-4F2C-97E8-3FA40573CBCB}"/>
                 </a:ext>
               </a:extLst>
             </p:cNvPr>
@@ -25327,7 +25327,7 @@
             <p:cNvPr id="13" name="Rectangle 12">
               <a:extLst>
                 <a:ext uri="{FF2B5EF4-FFF2-40B4-BE49-F238E27FC236}">
-                  <a16:creationId xmlns="" xmlns:a16="http://schemas.microsoft.com/office/drawing/2014/main" id="{E5A806FA-A273-4C97-B3F7-2DCE1834129B}"/>
+                  <a16:creationId xmlns:a16="http://schemas.microsoft.com/office/drawing/2014/main" xmlns="" id="{E5A806FA-A273-4C97-B3F7-2DCE1834129B}"/>
                 </a:ext>
               </a:extLst>
             </p:cNvPr>
@@ -25511,7 +25511,7 @@
           <p:cNvPr id="12" name="Group 11">
             <a:extLst>
               <a:ext uri="{FF2B5EF4-FFF2-40B4-BE49-F238E27FC236}">
-                <a16:creationId xmlns="" xmlns:a16="http://schemas.microsoft.com/office/drawing/2014/main" id="{FD8297AB-0D31-44DC-91DF-CDD437913D63}"/>
+                <a16:creationId xmlns:a16="http://schemas.microsoft.com/office/drawing/2014/main" xmlns="" id="{FD8297AB-0D31-44DC-91DF-CDD437913D63}"/>
               </a:ext>
             </a:extLst>
           </p:cNvPr>
@@ -25531,7 +25531,7 @@
             <p:cNvPr id="29" name="Rounded Rectangle 50">
               <a:extLst>
                 <a:ext uri="{FF2B5EF4-FFF2-40B4-BE49-F238E27FC236}">
-                  <a16:creationId xmlns="" xmlns:a16="http://schemas.microsoft.com/office/drawing/2014/main" id="{989CA1E5-02C6-4303-B105-96F9D22833FB}"/>
+                  <a16:creationId xmlns:a16="http://schemas.microsoft.com/office/drawing/2014/main" xmlns="" id="{989CA1E5-02C6-4303-B105-96F9D22833FB}"/>
                 </a:ext>
               </a:extLst>
             </p:cNvPr>
@@ -25585,7 +25585,7 @@
             <p:cNvPr id="10" name="Picture 9">
               <a:extLst>
                 <a:ext uri="{FF2B5EF4-FFF2-40B4-BE49-F238E27FC236}">
-                  <a16:creationId xmlns="" xmlns:a16="http://schemas.microsoft.com/office/drawing/2014/main" id="{3E1D15D3-82C6-4F66-9B26-DC1DE44A17C4}"/>
+                  <a16:creationId xmlns:a16="http://schemas.microsoft.com/office/drawing/2014/main" xmlns="" id="{3E1D15D3-82C6-4F66-9B26-DC1DE44A17C4}"/>
                 </a:ext>
               </a:extLst>
             </p:cNvPr>
@@ -25615,7 +25615,7 @@
             <p:cNvPr id="23" name="Rectangle 22">
               <a:extLst>
                 <a:ext uri="{FF2B5EF4-FFF2-40B4-BE49-F238E27FC236}">
-                  <a16:creationId xmlns="" xmlns:a16="http://schemas.microsoft.com/office/drawing/2014/main" id="{E5A806FA-A273-4C97-B3F7-2DCE1834129B}"/>
+                  <a16:creationId xmlns:a16="http://schemas.microsoft.com/office/drawing/2014/main" xmlns="" id="{E5A806FA-A273-4C97-B3F7-2DCE1834129B}"/>
                 </a:ext>
               </a:extLst>
             </p:cNvPr>
@@ -25775,7 +25775,7 @@
           <p:cNvPr id="20" name="Slide Number Placeholder 4">
             <a:extLst>
               <a:ext uri="{FF2B5EF4-FFF2-40B4-BE49-F238E27FC236}">
-                <a16:creationId xmlns="" xmlns:a16="http://schemas.microsoft.com/office/drawing/2014/main" id="{3E6BBC28-5D37-4A1A-99BE-80F48E2BFDAF}"/>
+                <a16:creationId xmlns:a16="http://schemas.microsoft.com/office/drawing/2014/main" xmlns="" id="{3E6BBC28-5D37-4A1A-99BE-80F48E2BFDAF}"/>
               </a:ext>
             </a:extLst>
           </p:cNvPr>
@@ -25825,7 +25825,7 @@
           <p:cNvPr id="15" name="Group 14">
             <a:extLst>
               <a:ext uri="{FF2B5EF4-FFF2-40B4-BE49-F238E27FC236}">
-                <a16:creationId xmlns="" xmlns:a16="http://schemas.microsoft.com/office/drawing/2014/main" id="{828A8C78-7BCE-4A60-A188-9362AC87D7F9}"/>
+                <a16:creationId xmlns:a16="http://schemas.microsoft.com/office/drawing/2014/main" xmlns="" id="{828A8C78-7BCE-4A60-A188-9362AC87D7F9}"/>
               </a:ext>
             </a:extLst>
           </p:cNvPr>
@@ -25845,7 +25845,7 @@
             <p:cNvPr id="3" name="Arrow: Left-Right 2">
               <a:extLst>
                 <a:ext uri="{FF2B5EF4-FFF2-40B4-BE49-F238E27FC236}">
-                  <a16:creationId xmlns="" xmlns:a16="http://schemas.microsoft.com/office/drawing/2014/main" id="{263CC668-AFFB-4386-83A1-87CF658B98DD}"/>
+                  <a16:creationId xmlns:a16="http://schemas.microsoft.com/office/drawing/2014/main" xmlns="" id="{263CC668-AFFB-4386-83A1-87CF658B98DD}"/>
                 </a:ext>
               </a:extLst>
             </p:cNvPr>
@@ -25900,7 +25900,7 @@
             <p:cNvPr id="32" name="Pentagon 14">
               <a:extLst>
                 <a:ext uri="{FF2B5EF4-FFF2-40B4-BE49-F238E27FC236}">
-                  <a16:creationId xmlns="" xmlns:a16="http://schemas.microsoft.com/office/drawing/2014/main" id="{A013EE47-00CE-4512-9109-E5ADC2E9AA7F}"/>
+                  <a16:creationId xmlns:a16="http://schemas.microsoft.com/office/drawing/2014/main" xmlns="" id="{A013EE47-00CE-4512-9109-E5ADC2E9AA7F}"/>
                 </a:ext>
               </a:extLst>
             </p:cNvPr>
@@ -26229,7 +26229,7 @@
           <p:cNvPr id="2" name="Title 1">
             <a:extLst>
               <a:ext uri="{FF2B5EF4-FFF2-40B4-BE49-F238E27FC236}">
-                <a16:creationId xmlns="" xmlns:a16="http://schemas.microsoft.com/office/drawing/2014/main" id="{9E16840E-A609-9A45-8261-E71A907675FB}"/>
+                <a16:creationId xmlns:a16="http://schemas.microsoft.com/office/drawing/2014/main" xmlns="" id="{9E16840E-A609-9A45-8261-E71A907675FB}"/>
               </a:ext>
             </a:extLst>
           </p:cNvPr>
@@ -26262,7 +26262,7 @@
           <p:cNvPr id="7" name="Group 6">
             <a:extLst>
               <a:ext uri="{FF2B5EF4-FFF2-40B4-BE49-F238E27FC236}">
-                <a16:creationId xmlns="" xmlns:a16="http://schemas.microsoft.com/office/drawing/2014/main" id="{3E0F312C-9F5A-4534-9667-19B28AF7312F}"/>
+                <a16:creationId xmlns:a16="http://schemas.microsoft.com/office/drawing/2014/main" xmlns="" id="{3E0F312C-9F5A-4534-9667-19B28AF7312F}"/>
               </a:ext>
             </a:extLst>
           </p:cNvPr>
@@ -26282,7 +26282,7 @@
             <p:cNvPr id="20" name="Rounded Rectangle 50">
               <a:extLst>
                 <a:ext uri="{FF2B5EF4-FFF2-40B4-BE49-F238E27FC236}">
-                  <a16:creationId xmlns="" xmlns:a16="http://schemas.microsoft.com/office/drawing/2014/main" id="{A35A9723-856A-495B-A1CA-33FD80B37C46}"/>
+                  <a16:creationId xmlns:a16="http://schemas.microsoft.com/office/drawing/2014/main" xmlns="" id="{A35A9723-856A-495B-A1CA-33FD80B37C46}"/>
                 </a:ext>
               </a:extLst>
             </p:cNvPr>
@@ -26336,7 +26336,7 @@
             <p:cNvPr id="5" name="Rectangle 4">
               <a:extLst>
                 <a:ext uri="{FF2B5EF4-FFF2-40B4-BE49-F238E27FC236}">
-                  <a16:creationId xmlns="" xmlns:a16="http://schemas.microsoft.com/office/drawing/2014/main" id="{EB953D86-1ED4-4774-AF58-57F21FF5570C}"/>
+                  <a16:creationId xmlns:a16="http://schemas.microsoft.com/office/drawing/2014/main" xmlns="" id="{EB953D86-1ED4-4774-AF58-57F21FF5570C}"/>
                 </a:ext>
               </a:extLst>
             </p:cNvPr>
@@ -26444,7 +26444,7 @@
             <p:cNvPr id="16" name="Rectangle 15">
               <a:extLst>
                 <a:ext uri="{FF2B5EF4-FFF2-40B4-BE49-F238E27FC236}">
-                  <a16:creationId xmlns="" xmlns:a16="http://schemas.microsoft.com/office/drawing/2014/main" id="{6D7C18F4-168B-4500-8D4A-D58D974991A4}"/>
+                  <a16:creationId xmlns:a16="http://schemas.microsoft.com/office/drawing/2014/main" xmlns="" id="{6D7C18F4-168B-4500-8D4A-D58D974991A4}"/>
                 </a:ext>
               </a:extLst>
             </p:cNvPr>
@@ -26512,7 +26512,7 @@
           <p:cNvPr id="8" name="Group 7">
             <a:extLst>
               <a:ext uri="{FF2B5EF4-FFF2-40B4-BE49-F238E27FC236}">
-                <a16:creationId xmlns="" xmlns:a16="http://schemas.microsoft.com/office/drawing/2014/main" id="{50FF559C-4F01-48FD-A8F9-A4E278CE9D84}"/>
+                <a16:creationId xmlns:a16="http://schemas.microsoft.com/office/drawing/2014/main" xmlns="" id="{50FF559C-4F01-48FD-A8F9-A4E278CE9D84}"/>
               </a:ext>
             </a:extLst>
           </p:cNvPr>
@@ -26532,7 +26532,7 @@
             <p:cNvPr id="27" name="Rounded Rectangle 50">
               <a:extLst>
                 <a:ext uri="{FF2B5EF4-FFF2-40B4-BE49-F238E27FC236}">
-                  <a16:creationId xmlns="" xmlns:a16="http://schemas.microsoft.com/office/drawing/2014/main" id="{E44405A5-7E82-479F-B301-488EF2189B48}"/>
+                  <a16:creationId xmlns:a16="http://schemas.microsoft.com/office/drawing/2014/main" xmlns="" id="{E44405A5-7E82-479F-B301-488EF2189B48}"/>
                 </a:ext>
               </a:extLst>
             </p:cNvPr>
@@ -26586,7 +26586,7 @@
             <p:cNvPr id="6" name="Rectangle 5">
               <a:extLst>
                 <a:ext uri="{FF2B5EF4-FFF2-40B4-BE49-F238E27FC236}">
-                  <a16:creationId xmlns="" xmlns:a16="http://schemas.microsoft.com/office/drawing/2014/main" id="{17911325-B0DC-407B-B23D-ADE1B3977898}"/>
+                  <a16:creationId xmlns:a16="http://schemas.microsoft.com/office/drawing/2014/main" xmlns="" id="{17911325-B0DC-407B-B23D-ADE1B3977898}"/>
                 </a:ext>
               </a:extLst>
             </p:cNvPr>
@@ -26694,7 +26694,7 @@
             <p:cNvPr id="17" name="Rectangle 16">
               <a:extLst>
                 <a:ext uri="{FF2B5EF4-FFF2-40B4-BE49-F238E27FC236}">
-                  <a16:creationId xmlns="" xmlns:a16="http://schemas.microsoft.com/office/drawing/2014/main" id="{59304AA1-1E28-41B7-A7D8-F73D5A7E1EFC}"/>
+                  <a16:creationId xmlns:a16="http://schemas.microsoft.com/office/drawing/2014/main" xmlns="" id="{59304AA1-1E28-41B7-A7D8-F73D5A7E1EFC}"/>
                 </a:ext>
               </a:extLst>
             </p:cNvPr>
@@ -26768,7 +26768,7 @@
           <p:cNvPr id="3" name="Group 2">
             <a:extLst>
               <a:ext uri="{FF2B5EF4-FFF2-40B4-BE49-F238E27FC236}">
-                <a16:creationId xmlns="" xmlns:a16="http://schemas.microsoft.com/office/drawing/2014/main" id="{8CEE8181-A115-4B8B-A520-F659BB2FF4F6}"/>
+                <a16:creationId xmlns:a16="http://schemas.microsoft.com/office/drawing/2014/main" xmlns="" id="{8CEE8181-A115-4B8B-A520-F659BB2FF4F6}"/>
               </a:ext>
             </a:extLst>
           </p:cNvPr>
@@ -26788,7 +26788,7 @@
             <p:cNvPr id="30" name="Rounded Rectangle 50">
               <a:extLst>
                 <a:ext uri="{FF2B5EF4-FFF2-40B4-BE49-F238E27FC236}">
-                  <a16:creationId xmlns="" xmlns:a16="http://schemas.microsoft.com/office/drawing/2014/main" id="{1DA64B8F-BDB5-45AF-A993-3A82AEF8E699}"/>
+                  <a16:creationId xmlns:a16="http://schemas.microsoft.com/office/drawing/2014/main" xmlns="" id="{1DA64B8F-BDB5-45AF-A993-3A82AEF8E699}"/>
                 </a:ext>
               </a:extLst>
             </p:cNvPr>
@@ -26842,7 +26842,7 @@
             <p:cNvPr id="4" name="Rectangle 3">
               <a:extLst>
                 <a:ext uri="{FF2B5EF4-FFF2-40B4-BE49-F238E27FC236}">
-                  <a16:creationId xmlns="" xmlns:a16="http://schemas.microsoft.com/office/drawing/2014/main" id="{EECA6280-7BAE-43DE-A6F3-D5242A2C7949}"/>
+                  <a16:creationId xmlns:a16="http://schemas.microsoft.com/office/drawing/2014/main" xmlns="" id="{EECA6280-7BAE-43DE-A6F3-D5242A2C7949}"/>
                 </a:ext>
               </a:extLst>
             </p:cNvPr>
@@ -26933,7 +26933,7 @@
             <p:cNvPr id="18" name="Rectangle 17">
               <a:extLst>
                 <a:ext uri="{FF2B5EF4-FFF2-40B4-BE49-F238E27FC236}">
-                  <a16:creationId xmlns="" xmlns:a16="http://schemas.microsoft.com/office/drawing/2014/main" id="{53946606-3D7A-4373-A99F-F0F3B5C08BD1}"/>
+                  <a16:creationId xmlns:a16="http://schemas.microsoft.com/office/drawing/2014/main" xmlns="" id="{53946606-3D7A-4373-A99F-F0F3B5C08BD1}"/>
                 </a:ext>
               </a:extLst>
             </p:cNvPr>
@@ -26996,7 +26996,7 @@
           <p:cNvPr id="9" name="Group 8">
             <a:extLst>
               <a:ext uri="{FF2B5EF4-FFF2-40B4-BE49-F238E27FC236}">
-                <a16:creationId xmlns="" xmlns:a16="http://schemas.microsoft.com/office/drawing/2014/main" id="{CAE38BD3-FA08-400E-B59A-FB0AF7A48E82}"/>
+                <a16:creationId xmlns:a16="http://schemas.microsoft.com/office/drawing/2014/main" xmlns="" id="{CAE38BD3-FA08-400E-B59A-FB0AF7A48E82}"/>
               </a:ext>
             </a:extLst>
           </p:cNvPr>
@@ -27016,7 +27016,7 @@
             <p:cNvPr id="28" name="Rounded Rectangle 50">
               <a:extLst>
                 <a:ext uri="{FF2B5EF4-FFF2-40B4-BE49-F238E27FC236}">
-                  <a16:creationId xmlns="" xmlns:a16="http://schemas.microsoft.com/office/drawing/2014/main" id="{213030C5-568D-4C6C-807C-5A3CCF8A7229}"/>
+                  <a16:creationId xmlns:a16="http://schemas.microsoft.com/office/drawing/2014/main" xmlns="" id="{213030C5-568D-4C6C-807C-5A3CCF8A7229}"/>
                 </a:ext>
               </a:extLst>
             </p:cNvPr>
@@ -27070,7 +27070,7 @@
             <p:cNvPr id="22" name="Rectangle 21">
               <a:extLst>
                 <a:ext uri="{FF2B5EF4-FFF2-40B4-BE49-F238E27FC236}">
-                  <a16:creationId xmlns="" xmlns:a16="http://schemas.microsoft.com/office/drawing/2014/main" id="{23624481-7A4A-124F-86D2-1A330BAFA024}"/>
+                  <a16:creationId xmlns:a16="http://schemas.microsoft.com/office/drawing/2014/main" xmlns="" id="{23624481-7A4A-124F-86D2-1A330BAFA024}"/>
                 </a:ext>
               </a:extLst>
             </p:cNvPr>
@@ -27165,7 +27165,7 @@
             <p:cNvPr id="23" name="Rectangle 22">
               <a:extLst>
                 <a:ext uri="{FF2B5EF4-FFF2-40B4-BE49-F238E27FC236}">
-                  <a16:creationId xmlns="" xmlns:a16="http://schemas.microsoft.com/office/drawing/2014/main" id="{B3E29B5E-61DD-A849-B320-BF9E6403BA2D}"/>
+                  <a16:creationId xmlns:a16="http://schemas.microsoft.com/office/drawing/2014/main" xmlns="" id="{B3E29B5E-61DD-A849-B320-BF9E6403BA2D}"/>
                 </a:ext>
               </a:extLst>
             </p:cNvPr>
@@ -27233,7 +27233,7 @@
           <p:cNvPr id="10" name="Group 9">
             <a:extLst>
               <a:ext uri="{FF2B5EF4-FFF2-40B4-BE49-F238E27FC236}">
-                <a16:creationId xmlns="" xmlns:a16="http://schemas.microsoft.com/office/drawing/2014/main" id="{C7785CFC-2BE2-4876-B818-4E90EBC6A6CB}"/>
+                <a16:creationId xmlns:a16="http://schemas.microsoft.com/office/drawing/2014/main" xmlns="" id="{C7785CFC-2BE2-4876-B818-4E90EBC6A6CB}"/>
               </a:ext>
             </a:extLst>
           </p:cNvPr>
@@ -27253,7 +27253,7 @@
             <p:cNvPr id="29" name="Rounded Rectangle 50">
               <a:extLst>
                 <a:ext uri="{FF2B5EF4-FFF2-40B4-BE49-F238E27FC236}">
-                  <a16:creationId xmlns="" xmlns:a16="http://schemas.microsoft.com/office/drawing/2014/main" id="{30FAD36E-6ACE-46B0-AE06-13D7FBA53BC0}"/>
+                  <a16:creationId xmlns:a16="http://schemas.microsoft.com/office/drawing/2014/main" xmlns="" id="{30FAD36E-6ACE-46B0-AE06-13D7FBA53BC0}"/>
                 </a:ext>
               </a:extLst>
             </p:cNvPr>
@@ -27307,7 +27307,7 @@
             <p:cNvPr id="25" name="Rectangle 24">
               <a:extLst>
                 <a:ext uri="{FF2B5EF4-FFF2-40B4-BE49-F238E27FC236}">
-                  <a16:creationId xmlns="" xmlns:a16="http://schemas.microsoft.com/office/drawing/2014/main" id="{D85CCEF3-9BAC-3A4C-A277-2C87E2354400}"/>
+                  <a16:creationId xmlns:a16="http://schemas.microsoft.com/office/drawing/2014/main" xmlns="" id="{D85CCEF3-9BAC-3A4C-A277-2C87E2354400}"/>
                 </a:ext>
               </a:extLst>
             </p:cNvPr>
@@ -27374,7 +27374,7 @@
             <p:cNvPr id="26" name="Rectangle 25">
               <a:extLst>
                 <a:ext uri="{FF2B5EF4-FFF2-40B4-BE49-F238E27FC236}">
-                  <a16:creationId xmlns="" xmlns:a16="http://schemas.microsoft.com/office/drawing/2014/main" id="{AA91D74E-D61C-5145-A52E-049E8DCF55FB}"/>
+                  <a16:creationId xmlns:a16="http://schemas.microsoft.com/office/drawing/2014/main" xmlns="" id="{AA91D74E-D61C-5145-A52E-049E8DCF55FB}"/>
                 </a:ext>
               </a:extLst>
             </p:cNvPr>
@@ -27428,7 +27428,7 @@
           <p:cNvPr id="19" name="Slide Number Placeholder 4">
             <a:extLst>
               <a:ext uri="{FF2B5EF4-FFF2-40B4-BE49-F238E27FC236}">
-                <a16:creationId xmlns="" xmlns:a16="http://schemas.microsoft.com/office/drawing/2014/main" id="{2B28488E-547A-4B01-8D5B-EB16FDF36E15}"/>
+                <a16:creationId xmlns:a16="http://schemas.microsoft.com/office/drawing/2014/main" xmlns="" id="{2B28488E-547A-4B01-8D5B-EB16FDF36E15}"/>
               </a:ext>
             </a:extLst>
           </p:cNvPr>
@@ -27782,7 +27782,7 @@
           <p:cNvPr id="6" name="Group 5">
             <a:extLst>
               <a:ext uri="{FF2B5EF4-FFF2-40B4-BE49-F238E27FC236}">
-                <a16:creationId xmlns="" xmlns:a16="http://schemas.microsoft.com/office/drawing/2014/main" id="{583F7C57-572A-48EA-9B60-BC0A5F9CAE97}"/>
+                <a16:creationId xmlns:a16="http://schemas.microsoft.com/office/drawing/2014/main" xmlns="" id="{583F7C57-572A-48EA-9B60-BC0A5F9CAE97}"/>
               </a:ext>
             </a:extLst>
           </p:cNvPr>
@@ -27802,7 +27802,7 @@
             <p:cNvPr id="49" name="Pentagon 11">
               <a:extLst>
                 <a:ext uri="{FF2B5EF4-FFF2-40B4-BE49-F238E27FC236}">
-                  <a16:creationId xmlns="" xmlns:a16="http://schemas.microsoft.com/office/drawing/2014/main" id="{F591BF96-01E8-42DA-B04A-7AD289CBE578}"/>
+                  <a16:creationId xmlns:a16="http://schemas.microsoft.com/office/drawing/2014/main" xmlns="" id="{F591BF96-01E8-42DA-B04A-7AD289CBE578}"/>
                 </a:ext>
               </a:extLst>
             </p:cNvPr>
@@ -27876,7 +27876,7 @@
             <p:cNvPr id="2" name="Rectangle 1">
               <a:extLst>
                 <a:ext uri="{FF2B5EF4-FFF2-40B4-BE49-F238E27FC236}">
-                  <a16:creationId xmlns="" xmlns:a16="http://schemas.microsoft.com/office/drawing/2014/main" id="{02357776-AE78-435F-B267-6969C90D4DF0}"/>
+                  <a16:creationId xmlns:a16="http://schemas.microsoft.com/office/drawing/2014/main" xmlns="" id="{02357776-AE78-435F-B267-6969C90D4DF0}"/>
                 </a:ext>
               </a:extLst>
             </p:cNvPr>
@@ -27945,7 +27945,7 @@
             <p:cNvPr id="50" name="TextBox 49">
               <a:extLst>
                 <a:ext uri="{FF2B5EF4-FFF2-40B4-BE49-F238E27FC236}">
-                  <a16:creationId xmlns="" xmlns:a16="http://schemas.microsoft.com/office/drawing/2014/main" id="{65C52912-C695-436E-B242-76E393B6D722}"/>
+                  <a16:creationId xmlns:a16="http://schemas.microsoft.com/office/drawing/2014/main" xmlns="" id="{65C52912-C695-436E-B242-76E393B6D722}"/>
                 </a:ext>
               </a:extLst>
             </p:cNvPr>
@@ -27991,7 +27991,7 @@
           <p:cNvPr id="3" name="Group 2">
             <a:extLst>
               <a:ext uri="{FF2B5EF4-FFF2-40B4-BE49-F238E27FC236}">
-                <a16:creationId xmlns="" xmlns:a16="http://schemas.microsoft.com/office/drawing/2014/main" id="{66DD6E8A-B236-4EA9-9C55-229392307D13}"/>
+                <a16:creationId xmlns:a16="http://schemas.microsoft.com/office/drawing/2014/main" xmlns="" id="{66DD6E8A-B236-4EA9-9C55-229392307D13}"/>
               </a:ext>
             </a:extLst>
           </p:cNvPr>
@@ -28011,7 +28011,7 @@
             <p:cNvPr id="54" name="Pentagon 11">
               <a:extLst>
                 <a:ext uri="{FF2B5EF4-FFF2-40B4-BE49-F238E27FC236}">
-                  <a16:creationId xmlns="" xmlns:a16="http://schemas.microsoft.com/office/drawing/2014/main" id="{C53EB407-F223-4FEA-BB41-4E9693252480}"/>
+                  <a16:creationId xmlns:a16="http://schemas.microsoft.com/office/drawing/2014/main" xmlns="" id="{C53EB407-F223-4FEA-BB41-4E9693252480}"/>
                 </a:ext>
               </a:extLst>
             </p:cNvPr>
@@ -28085,7 +28085,7 @@
             <p:cNvPr id="55" name="Rectangle 54">
               <a:extLst>
                 <a:ext uri="{FF2B5EF4-FFF2-40B4-BE49-F238E27FC236}">
-                  <a16:creationId xmlns="" xmlns:a16="http://schemas.microsoft.com/office/drawing/2014/main" id="{340FE98F-FB0F-46F8-9B20-0D50D7718790}"/>
+                  <a16:creationId xmlns:a16="http://schemas.microsoft.com/office/drawing/2014/main" xmlns="" id="{340FE98F-FB0F-46F8-9B20-0D50D7718790}"/>
                 </a:ext>
               </a:extLst>
             </p:cNvPr>
@@ -28158,7 +28158,7 @@
             <p:cNvPr id="56" name="TextBox 55">
               <a:extLst>
                 <a:ext uri="{FF2B5EF4-FFF2-40B4-BE49-F238E27FC236}">
-                  <a16:creationId xmlns="" xmlns:a16="http://schemas.microsoft.com/office/drawing/2014/main" id="{09E0A4DA-AF01-44E7-96BF-4E230FD91AA2}"/>
+                  <a16:creationId xmlns:a16="http://schemas.microsoft.com/office/drawing/2014/main" xmlns="" id="{09E0A4DA-AF01-44E7-96BF-4E230FD91AA2}"/>
                 </a:ext>
               </a:extLst>
             </p:cNvPr>
@@ -28204,7 +28204,7 @@
           <p:cNvPr id="7" name="Group 6">
             <a:extLst>
               <a:ext uri="{FF2B5EF4-FFF2-40B4-BE49-F238E27FC236}">
-                <a16:creationId xmlns="" xmlns:a16="http://schemas.microsoft.com/office/drawing/2014/main" id="{4F6B53E1-B19A-4F08-9867-9CAB55D5D13C}"/>
+                <a16:creationId xmlns:a16="http://schemas.microsoft.com/office/drawing/2014/main" xmlns="" id="{4F6B53E1-B19A-4F08-9867-9CAB55D5D13C}"/>
               </a:ext>
             </a:extLst>
           </p:cNvPr>
@@ -28224,7 +28224,7 @@
             <p:cNvPr id="57" name="Pentagon 11">
               <a:extLst>
                 <a:ext uri="{FF2B5EF4-FFF2-40B4-BE49-F238E27FC236}">
-                  <a16:creationId xmlns="" xmlns:a16="http://schemas.microsoft.com/office/drawing/2014/main" id="{F7E2DF7C-690D-4E82-9363-EFDD6203D99B}"/>
+                  <a16:creationId xmlns:a16="http://schemas.microsoft.com/office/drawing/2014/main" xmlns="" id="{F7E2DF7C-690D-4E82-9363-EFDD6203D99B}"/>
                 </a:ext>
               </a:extLst>
             </p:cNvPr>
@@ -28300,7 +28300,7 @@
             <p:cNvPr id="59" name="TextBox 58">
               <a:extLst>
                 <a:ext uri="{FF2B5EF4-FFF2-40B4-BE49-F238E27FC236}">
-                  <a16:creationId xmlns="" xmlns:a16="http://schemas.microsoft.com/office/drawing/2014/main" id="{8E17D1E1-12A1-47F7-86DB-E19C338C670E}"/>
+                  <a16:creationId xmlns:a16="http://schemas.microsoft.com/office/drawing/2014/main" xmlns="" id="{8E17D1E1-12A1-47F7-86DB-E19C338C670E}"/>
                 </a:ext>
               </a:extLst>
             </p:cNvPr>
@@ -28345,7 +28345,7 @@
             <p:cNvPr id="25" name="Rectangle 24">
               <a:extLst>
                 <a:ext uri="{FF2B5EF4-FFF2-40B4-BE49-F238E27FC236}">
-                  <a16:creationId xmlns="" xmlns:a16="http://schemas.microsoft.com/office/drawing/2014/main" id="{FB184961-9141-B04E-BCCE-DC12E8146F8A}"/>
+                  <a16:creationId xmlns:a16="http://schemas.microsoft.com/office/drawing/2014/main" xmlns="" id="{FB184961-9141-B04E-BCCE-DC12E8146F8A}"/>
                 </a:ext>
               </a:extLst>
             </p:cNvPr>
@@ -28408,7 +28408,7 @@
           <p:cNvPr id="5" name="Group 4">
             <a:extLst>
               <a:ext uri="{FF2B5EF4-FFF2-40B4-BE49-F238E27FC236}">
-                <a16:creationId xmlns="" xmlns:a16="http://schemas.microsoft.com/office/drawing/2014/main" id="{D7613564-8B44-458C-82A9-9B859798CB96}"/>
+                <a16:creationId xmlns:a16="http://schemas.microsoft.com/office/drawing/2014/main" xmlns="" id="{D7613564-8B44-458C-82A9-9B859798CB96}"/>
               </a:ext>
             </a:extLst>
           </p:cNvPr>
@@ -28428,7 +28428,7 @@
             <p:cNvPr id="51" name="Pentagon 11">
               <a:extLst>
                 <a:ext uri="{FF2B5EF4-FFF2-40B4-BE49-F238E27FC236}">
-                  <a16:creationId xmlns="" xmlns:a16="http://schemas.microsoft.com/office/drawing/2014/main" id="{17282381-607C-4C28-8FC7-B5EC7520EE2B}"/>
+                  <a16:creationId xmlns:a16="http://schemas.microsoft.com/office/drawing/2014/main" xmlns="" id="{17282381-607C-4C28-8FC7-B5EC7520EE2B}"/>
                 </a:ext>
               </a:extLst>
             </p:cNvPr>
@@ -28502,7 +28502,7 @@
             <p:cNvPr id="53" name="TextBox 52">
               <a:extLst>
                 <a:ext uri="{FF2B5EF4-FFF2-40B4-BE49-F238E27FC236}">
-                  <a16:creationId xmlns="" xmlns:a16="http://schemas.microsoft.com/office/drawing/2014/main" id="{6AEE4BE0-0F9E-46A3-ACB3-82E558B97F97}"/>
+                  <a16:creationId xmlns:a16="http://schemas.microsoft.com/office/drawing/2014/main" xmlns="" id="{6AEE4BE0-0F9E-46A3-ACB3-82E558B97F97}"/>
                 </a:ext>
               </a:extLst>
             </p:cNvPr>
@@ -28547,7 +28547,7 @@
             <p:cNvPr id="27" name="Rectangle 26">
               <a:extLst>
                 <a:ext uri="{FF2B5EF4-FFF2-40B4-BE49-F238E27FC236}">
-                  <a16:creationId xmlns="" xmlns:a16="http://schemas.microsoft.com/office/drawing/2014/main" id="{30735153-AC3C-424F-97DC-A64D94238193}"/>
+                  <a16:creationId xmlns:a16="http://schemas.microsoft.com/office/drawing/2014/main" xmlns="" id="{30735153-AC3C-424F-97DC-A64D94238193}"/>
                 </a:ext>
               </a:extLst>
             </p:cNvPr>
@@ -28699,7 +28699,7 @@
           <p:cNvPr id="21" name="Picture 20">
             <a:extLst>
               <a:ext uri="{FF2B5EF4-FFF2-40B4-BE49-F238E27FC236}">
-                <a16:creationId xmlns="" xmlns:a16="http://schemas.microsoft.com/office/drawing/2014/main" id="{D73E8D94-FBD2-42D8-8C22-2DF1BEA7B876}"/>
+                <a16:creationId xmlns:a16="http://schemas.microsoft.com/office/drawing/2014/main" xmlns="" id="{D73E8D94-FBD2-42D8-8C22-2DF1BEA7B876}"/>
               </a:ext>
             </a:extLst>
           </p:cNvPr>
@@ -28728,7 +28728,7 @@
           <p:cNvPr id="22" name="Slide Number Placeholder 4">
             <a:extLst>
               <a:ext uri="{FF2B5EF4-FFF2-40B4-BE49-F238E27FC236}">
-                <a16:creationId xmlns="" xmlns:a16="http://schemas.microsoft.com/office/drawing/2014/main" id="{407C5DBA-81E3-46DF-8D2B-DDE0075CEFD3}"/>
+                <a16:creationId xmlns:a16="http://schemas.microsoft.com/office/drawing/2014/main" xmlns="" id="{407C5DBA-81E3-46DF-8D2B-DDE0075CEFD3}"/>
               </a:ext>
             </a:extLst>
           </p:cNvPr>

</xml_diff>